<commit_message>
Update: added a few changes to deck
</commit_message>
<xml_diff>
--- a/ufo_presentation_v3.pptx
+++ b/ufo_presentation_v3.pptx
@@ -479,6 +479,267 @@
     </a:lvl9pPr>
   </p:notesStyle>
 </p:notesMaster>
+</file>
+
+<file path=ppt/notesSlides/notesSlide1.xml><?xml version="1.0" encoding="utf-8"?>
+<p:notes xmlns:a="http://schemas.openxmlformats.org/drawingml/2006/main" xmlns:r="http://schemas.openxmlformats.org/officeDocument/2006/relationships" xmlns:p="http://schemas.openxmlformats.org/presentationml/2006/main">
+  <p:cSld>
+    <p:spTree>
+      <p:nvGrpSpPr>
+        <p:cNvPr id="1" name=""/>
+        <p:cNvGrpSpPr/>
+        <p:nvPr/>
+      </p:nvGrpSpPr>
+      <p:grpSpPr>
+        <a:xfrm>
+          <a:off x="0" y="0"/>
+          <a:ext cx="0" cy="0"/>
+          <a:chOff x="0" y="0"/>
+          <a:chExt cx="0" cy="0"/>
+        </a:xfrm>
+      </p:grpSpPr>
+      <p:sp>
+        <p:nvSpPr>
+          <p:cNvPr id="2" name="Slide Image Placeholder 1"/>
+          <p:cNvSpPr>
+            <a:spLocks noGrp="1" noRot="1" noChangeAspect="1"/>
+          </p:cNvSpPr>
+          <p:nvPr>
+            <p:ph type="sldImg"/>
+          </p:nvPr>
+        </p:nvSpPr>
+        <p:spPr/>
+      </p:sp>
+      <p:sp>
+        <p:nvSpPr>
+          <p:cNvPr id="3" name="Notes Placeholder 2"/>
+          <p:cNvSpPr>
+            <a:spLocks noGrp="1"/>
+          </p:cNvSpPr>
+          <p:nvPr>
+            <p:ph type="body" idx="1"/>
+          </p:nvPr>
+        </p:nvSpPr>
+        <p:spPr/>
+        <p:txBody>
+          <a:bodyPr/>
+          <a:lstStyle/>
+          <a:p>
+            <a:r>
+              <a:rPr lang="en-US" dirty="0"/>
+              <a:t>How many total clusters? Explainable or unexplainable? </a:t>
+            </a:r>
+          </a:p>
+        </p:txBody>
+      </p:sp>
+      <p:sp>
+        <p:nvSpPr>
+          <p:cNvPr id="4" name="Slide Number Placeholder 3"/>
+          <p:cNvSpPr>
+            <a:spLocks noGrp="1"/>
+          </p:cNvSpPr>
+          <p:nvPr>
+            <p:ph type="sldNum" sz="quarter" idx="10"/>
+          </p:nvPr>
+        </p:nvSpPr>
+        <p:spPr/>
+        <p:txBody>
+          <a:bodyPr/>
+          <a:lstStyle/>
+          <a:p>
+            <a:fld id="{4D2ED366-9BC9-4336-AD97-E8FA9A06B63B}" type="slidenum">
+              <a:rPr lang="en-US" smtClean="0"/>
+              <a:t>15</a:t>
+            </a:fld>
+            <a:endParaRPr lang="en-US"/>
+          </a:p>
+        </p:txBody>
+      </p:sp>
+    </p:spTree>
+    <p:extLst>
+      <p:ext uri="{BB962C8B-B14F-4D97-AF65-F5344CB8AC3E}">
+        <p14:creationId xmlns:p14="http://schemas.microsoft.com/office/powerpoint/2010/main" val="3433859079"/>
+      </p:ext>
+    </p:extLst>
+  </p:cSld>
+  <p:clrMapOvr>
+    <a:masterClrMapping/>
+  </p:clrMapOvr>
+</p:notes>
+</file>
+
+<file path=ppt/notesSlides/notesSlide2.xml><?xml version="1.0" encoding="utf-8"?>
+<p:notes xmlns:a="http://schemas.openxmlformats.org/drawingml/2006/main" xmlns:r="http://schemas.openxmlformats.org/officeDocument/2006/relationships" xmlns:p="http://schemas.openxmlformats.org/presentationml/2006/main">
+  <p:cSld>
+    <p:spTree>
+      <p:nvGrpSpPr>
+        <p:cNvPr id="1" name=""/>
+        <p:cNvGrpSpPr/>
+        <p:nvPr/>
+      </p:nvGrpSpPr>
+      <p:grpSpPr>
+        <a:xfrm>
+          <a:off x="0" y="0"/>
+          <a:ext cx="0" cy="0"/>
+          <a:chOff x="0" y="0"/>
+          <a:chExt cx="0" cy="0"/>
+        </a:xfrm>
+      </p:grpSpPr>
+      <p:sp>
+        <p:nvSpPr>
+          <p:cNvPr id="2" name="Slide Image Placeholder 1"/>
+          <p:cNvSpPr>
+            <a:spLocks noGrp="1" noRot="1" noChangeAspect="1"/>
+          </p:cNvSpPr>
+          <p:nvPr>
+            <p:ph type="sldImg"/>
+          </p:nvPr>
+        </p:nvSpPr>
+        <p:spPr/>
+      </p:sp>
+      <p:sp>
+        <p:nvSpPr>
+          <p:cNvPr id="3" name="Notes Placeholder 2"/>
+          <p:cNvSpPr>
+            <a:spLocks noGrp="1"/>
+          </p:cNvSpPr>
+          <p:nvPr>
+            <p:ph type="body" idx="1"/>
+          </p:nvPr>
+        </p:nvSpPr>
+        <p:spPr/>
+        <p:txBody>
+          <a:bodyPr/>
+          <a:lstStyle/>
+          <a:p>
+            <a:r>
+              <a:rPr lang="en-US" dirty="0"/>
+              <a:t>How many total clusters? Explainable or unexplainable? </a:t>
+            </a:r>
+          </a:p>
+        </p:txBody>
+      </p:sp>
+      <p:sp>
+        <p:nvSpPr>
+          <p:cNvPr id="4" name="Slide Number Placeholder 3"/>
+          <p:cNvSpPr>
+            <a:spLocks noGrp="1"/>
+          </p:cNvSpPr>
+          <p:nvPr>
+            <p:ph type="sldNum" sz="quarter" idx="10"/>
+          </p:nvPr>
+        </p:nvSpPr>
+        <p:spPr/>
+        <p:txBody>
+          <a:bodyPr/>
+          <a:lstStyle/>
+          <a:p>
+            <a:fld id="{4D2ED366-9BC9-4336-AD97-E8FA9A06B63B}" type="slidenum">
+              <a:rPr lang="en-US" smtClean="0"/>
+              <a:t>16</a:t>
+            </a:fld>
+            <a:endParaRPr lang="en-US"/>
+          </a:p>
+        </p:txBody>
+      </p:sp>
+    </p:spTree>
+    <p:extLst>
+      <p:ext uri="{BB962C8B-B14F-4D97-AF65-F5344CB8AC3E}">
+        <p14:creationId xmlns:p14="http://schemas.microsoft.com/office/powerpoint/2010/main" val="1180180655"/>
+      </p:ext>
+    </p:extLst>
+  </p:cSld>
+  <p:clrMapOvr>
+    <a:masterClrMapping/>
+  </p:clrMapOvr>
+</p:notes>
+</file>
+
+<file path=ppt/notesSlides/notesSlide3.xml><?xml version="1.0" encoding="utf-8"?>
+<p:notes xmlns:a="http://schemas.openxmlformats.org/drawingml/2006/main" xmlns:r="http://schemas.openxmlformats.org/officeDocument/2006/relationships" xmlns:p="http://schemas.openxmlformats.org/presentationml/2006/main">
+  <p:cSld>
+    <p:spTree>
+      <p:nvGrpSpPr>
+        <p:cNvPr id="1" name=""/>
+        <p:cNvGrpSpPr/>
+        <p:nvPr/>
+      </p:nvGrpSpPr>
+      <p:grpSpPr>
+        <a:xfrm>
+          <a:off x="0" y="0"/>
+          <a:ext cx="0" cy="0"/>
+          <a:chOff x="0" y="0"/>
+          <a:chExt cx="0" cy="0"/>
+        </a:xfrm>
+      </p:grpSpPr>
+      <p:sp>
+        <p:nvSpPr>
+          <p:cNvPr id="2" name="Slide Image Placeholder 1"/>
+          <p:cNvSpPr>
+            <a:spLocks noGrp="1" noRot="1" noChangeAspect="1"/>
+          </p:cNvSpPr>
+          <p:nvPr>
+            <p:ph type="sldImg"/>
+          </p:nvPr>
+        </p:nvSpPr>
+        <p:spPr/>
+      </p:sp>
+      <p:sp>
+        <p:nvSpPr>
+          <p:cNvPr id="3" name="Notes Placeholder 2"/>
+          <p:cNvSpPr>
+            <a:spLocks noGrp="1"/>
+          </p:cNvSpPr>
+          <p:nvPr>
+            <p:ph type="body" idx="1"/>
+          </p:nvPr>
+        </p:nvSpPr>
+        <p:spPr/>
+        <p:txBody>
+          <a:bodyPr/>
+          <a:lstStyle/>
+          <a:p>
+            <a:r>
+              <a:rPr lang="en-US" dirty="0"/>
+              <a:t>Filter out “explainable” observances? </a:t>
+            </a:r>
+          </a:p>
+        </p:txBody>
+      </p:sp>
+      <p:sp>
+        <p:nvSpPr>
+          <p:cNvPr id="4" name="Slide Number Placeholder 3"/>
+          <p:cNvSpPr>
+            <a:spLocks noGrp="1"/>
+          </p:cNvSpPr>
+          <p:nvPr>
+            <p:ph type="sldNum" sz="quarter" idx="10"/>
+          </p:nvPr>
+        </p:nvSpPr>
+        <p:spPr/>
+        <p:txBody>
+          <a:bodyPr/>
+          <a:lstStyle/>
+          <a:p>
+            <a:fld id="{4D2ED366-9BC9-4336-AD97-E8FA9A06B63B}" type="slidenum">
+              <a:rPr lang="en-US" smtClean="0"/>
+              <a:t>18</a:t>
+            </a:fld>
+            <a:endParaRPr lang="en-US"/>
+          </a:p>
+        </p:txBody>
+      </p:sp>
+    </p:spTree>
+    <p:extLst>
+      <p:ext uri="{BB962C8B-B14F-4D97-AF65-F5344CB8AC3E}">
+        <p14:creationId xmlns:p14="http://schemas.microsoft.com/office/powerpoint/2010/main" val="2025833345"/>
+      </p:ext>
+    </p:extLst>
+  </p:cSld>
+  <p:clrMapOvr>
+    <a:masterClrMapping/>
+  </p:clrMapOvr>
+</p:notes>
 </file>
 
 <file path=ppt/slideLayouts/slideLayout1.xml><?xml version="1.0" encoding="utf-8"?>
@@ -9155,7 +9416,7 @@
         </p:nvSpPr>
         <p:spPr>
           <a:xfrm>
-            <a:off x="1371600" y="685799"/>
+            <a:off x="1371600" y="473145"/>
             <a:ext cx="9601200" cy="831801"/>
           </a:xfrm>
         </p:spPr>
@@ -9167,7 +9428,7 @@
           <a:p>
             <a:r>
               <a:rPr lang="en-US" dirty="0"/>
-              <a:t>K Means Clustering: Cluster x</a:t>
+              <a:t>K Means Clustering: Cluster 3</a:t>
             </a:r>
             <a:br>
               <a:rPr lang="en-US" sz="2400" dirty="0"/>
@@ -9198,7 +9459,7 @@
           <p:nvPr/>
         </p:nvPicPr>
         <p:blipFill>
-          <a:blip r:embed="rId2"/>
+          <a:blip r:embed="rId3"/>
           <a:stretch>
             <a:fillRect/>
           </a:stretch>
@@ -9240,7 +9501,7 @@
           <p:nvPr/>
         </p:nvPicPr>
         <p:blipFill>
-          <a:blip r:embed="rId3"/>
+          <a:blip r:embed="rId4"/>
           <a:stretch>
             <a:fillRect/>
           </a:stretch>
@@ -9316,8 +9577,8 @@
         </p:nvSpPr>
         <p:spPr>
           <a:xfrm>
-            <a:off x="3586899" y="5635410"/>
-            <a:ext cx="4897225" cy="646331"/>
+            <a:off x="3818149" y="5494008"/>
+            <a:ext cx="4897225" cy="923330"/>
           </a:xfrm>
           <a:prstGeom prst="rect">
             <a:avLst/>
@@ -9330,23 +9591,29 @@
           </a:bodyPr>
           <a:lstStyle/>
           <a:p>
+            <a:r>
+              <a:rPr lang="en-US" dirty="0"/>
+              <a:t>Cluster 3:</a:t>
+            </a:r>
+          </a:p>
+          <a:p>
             <a:pPr marL="285750" indent="-285750">
-              <a:buFontTx/>
-              <a:buChar char="-"/>
+              <a:buFont typeface="Arial" panose="020B0604020202020204" pitchFamily="34" charset="0"/>
+              <a:buChar char="•"/>
             </a:pPr>
             <a:r>
               <a:rPr lang="en-US" dirty="0"/>
-              <a:t>Predominately sightings in Alaska and Hawaii </a:t>
+              <a:t>Alaska and Hawaii </a:t>
             </a:r>
           </a:p>
           <a:p>
             <a:pPr marL="285750" indent="-285750">
-              <a:buFontTx/>
-              <a:buChar char="-"/>
+              <a:buFont typeface="Arial" panose="020B0604020202020204" pitchFamily="34" charset="0"/>
+              <a:buChar char="•"/>
             </a:pPr>
             <a:r>
               <a:rPr lang="en-US" dirty="0"/>
-              <a:t>Mostly &gt;=1500 miles from an </a:t>
+              <a:t>&gt;=1500 miles from an </a:t>
             </a:r>
             <a:r>
               <a:rPr lang="en-US" dirty="0" err="1"/>
@@ -9560,15 +9827,15 @@
           <p:nvPr/>
         </p:nvPicPr>
         <p:blipFill>
-          <a:blip r:embed="rId2"/>
+          <a:blip r:embed="rId3"/>
           <a:stretch>
             <a:fillRect/>
           </a:stretch>
         </p:blipFill>
         <p:spPr>
           <a:xfrm>
-            <a:off x="1304042" y="1949631"/>
-            <a:ext cx="4934189" cy="3904414"/>
+            <a:off x="1660579" y="1721719"/>
+            <a:ext cx="4315139" cy="3414561"/>
           </a:xfrm>
           <a:prstGeom prst="rect">
             <a:avLst/>
@@ -9587,39 +9854,6 @@
           </a:effectLst>
         </p:spPr>
       </p:pic>
-      <p:sp>
-        <p:nvSpPr>
-          <p:cNvPr id="2" name="Title 1">
-            <a:extLst>
-              <a:ext uri="{FF2B5EF4-FFF2-40B4-BE49-F238E27FC236}">
-                <a16:creationId xmlns:a16="http://schemas.microsoft.com/office/drawing/2014/main" id="{95251384-CA12-4E4D-AEEB-6407E3415E0D}"/>
-              </a:ext>
-            </a:extLst>
-          </p:cNvPr>
-          <p:cNvSpPr>
-            <a:spLocks noGrp="1"/>
-          </p:cNvSpPr>
-          <p:nvPr>
-            <p:ph type="title"/>
-          </p:nvPr>
-        </p:nvSpPr>
-        <p:spPr>
-          <a:xfrm>
-            <a:off x="1371600" y="685800"/>
-            <a:ext cx="9601200" cy="822489"/>
-          </a:xfrm>
-        </p:spPr>
-        <p:txBody>
-          <a:bodyPr/>
-          <a:lstStyle/>
-          <a:p>
-            <a:r>
-              <a:rPr lang="en-US" dirty="0"/>
-              <a:t>K Means Clustering: Cluster x</a:t>
-            </a:r>
-          </a:p>
-        </p:txBody>
-      </p:sp>
       <p:pic>
         <p:nvPicPr>
           <p:cNvPr id="4" name="Picture 3">
@@ -9635,15 +9869,15 @@
           <p:nvPr/>
         </p:nvPicPr>
         <p:blipFill>
-          <a:blip r:embed="rId3"/>
+          <a:blip r:embed="rId4"/>
           <a:stretch>
             <a:fillRect/>
           </a:stretch>
         </p:blipFill>
         <p:spPr>
           <a:xfrm>
-            <a:off x="6572820" y="1949631"/>
-            <a:ext cx="5170761" cy="3904414"/>
+            <a:off x="6553967" y="1721719"/>
+            <a:ext cx="4588515" cy="3464763"/>
           </a:xfrm>
           <a:prstGeom prst="rect">
             <a:avLst/>
@@ -9662,6 +9896,126 @@
           </a:effectLst>
         </p:spPr>
       </p:pic>
+      <p:sp>
+        <p:nvSpPr>
+          <p:cNvPr id="5" name="TextBox 4">
+            <a:extLst>
+              <a:ext uri="{FF2B5EF4-FFF2-40B4-BE49-F238E27FC236}">
+                <a16:creationId xmlns:a16="http://schemas.microsoft.com/office/drawing/2014/main" id="{D2844C38-E153-43F8-92C7-4CCE6F2B4687}"/>
+              </a:ext>
+            </a:extLst>
+          </p:cNvPr>
+          <p:cNvSpPr txBox="1"/>
+          <p:nvPr/>
+        </p:nvSpPr>
+        <p:spPr>
+          <a:xfrm>
+            <a:off x="3818149" y="5494008"/>
+            <a:ext cx="4897225" cy="923330"/>
+          </a:xfrm>
+          <a:prstGeom prst="rect">
+            <a:avLst/>
+          </a:prstGeom>
+          <a:noFill/>
+        </p:spPr>
+        <p:txBody>
+          <a:bodyPr wrap="square" rtlCol="0">
+            <a:spAutoFit/>
+          </a:bodyPr>
+          <a:lstStyle/>
+          <a:p>
+            <a:r>
+              <a:rPr lang="en-US" dirty="0"/>
+              <a:t>Cluster 7:</a:t>
+            </a:r>
+          </a:p>
+          <a:p>
+            <a:pPr marL="285750" indent="-285750">
+              <a:buFont typeface="Arial" panose="020B0604020202020204" pitchFamily="34" charset="0"/>
+              <a:buChar char="•"/>
+            </a:pPr>
+            <a:r>
+              <a:rPr lang="en-US" dirty="0"/>
+              <a:t>Spherical UFOs</a:t>
+            </a:r>
+          </a:p>
+          <a:p>
+            <a:pPr marL="285750" indent="-285750">
+              <a:buFont typeface="Arial" panose="020B0604020202020204" pitchFamily="34" charset="0"/>
+              <a:buChar char="•"/>
+            </a:pPr>
+            <a:r>
+              <a:rPr lang="en-US" dirty="0"/>
+              <a:t>January</a:t>
+            </a:r>
+          </a:p>
+        </p:txBody>
+      </p:sp>
+      <p:sp>
+        <p:nvSpPr>
+          <p:cNvPr id="6" name="Title 1">
+            <a:extLst>
+              <a:ext uri="{FF2B5EF4-FFF2-40B4-BE49-F238E27FC236}">
+                <a16:creationId xmlns:a16="http://schemas.microsoft.com/office/drawing/2014/main" id="{11D7055D-64F3-4104-ABCE-A61F7D672FFD}"/>
+              </a:ext>
+            </a:extLst>
+          </p:cNvPr>
+          <p:cNvSpPr txBox="1">
+            <a:spLocks/>
+          </p:cNvSpPr>
+          <p:nvPr/>
+        </p:nvSpPr>
+        <p:spPr>
+          <a:xfrm>
+            <a:off x="1466161" y="462489"/>
+            <a:ext cx="9601200" cy="831801"/>
+          </a:xfrm>
+          <a:prstGeom prst="rect">
+            <a:avLst/>
+          </a:prstGeom>
+        </p:spPr>
+        <p:txBody>
+          <a:bodyPr vert="horz" lIns="91440" tIns="45720" rIns="91440" bIns="45720" rtlCol="0" anchor="t">
+            <a:noAutofit/>
+          </a:bodyPr>
+          <a:lstStyle>
+            <a:lvl1pPr algn="l" defTabSz="914400" rtl="0" eaLnBrk="1" latinLnBrk="0" hangingPunct="1">
+              <a:lnSpc>
+                <a:spcPct val="89000"/>
+              </a:lnSpc>
+              <a:spcBef>
+                <a:spcPct val="0"/>
+              </a:spcBef>
+              <a:buNone/>
+              <a:defRPr sz="4400" kern="1200" baseline="0">
+                <a:solidFill>
+                  <a:schemeClr val="tx2"/>
+                </a:solidFill>
+                <a:latin typeface="+mj-lt"/>
+                <a:ea typeface="+mj-ea"/>
+                <a:cs typeface="+mj-cs"/>
+              </a:defRPr>
+            </a:lvl1pPr>
+          </a:lstStyle>
+          <a:p>
+            <a:r>
+              <a:rPr lang="en-US" sz="4000" dirty="0"/>
+              <a:t>K Means Clustering: Cluster 7</a:t>
+            </a:r>
+            <a:br>
+              <a:rPr lang="en-US" sz="4000" dirty="0"/>
+            </a:br>
+            <a:r>
+              <a:rPr lang="en-US" sz="4000" dirty="0"/>
+              <a:t>	</a:t>
+            </a:r>
+            <a:br>
+              <a:rPr lang="en-US" sz="4000" dirty="0"/>
+            </a:br>
+            <a:endParaRPr lang="en-US" sz="4000" dirty="0"/>
+          </a:p>
+        </p:txBody>
+      </p:sp>
     </p:spTree>
     <p:extLst>
       <p:ext uri="{BB962C8B-B14F-4D97-AF65-F5344CB8AC3E}">
@@ -9750,6 +10104,41 @@
           <a:chExt cx="0" cy="0"/>
         </a:xfrm>
       </p:grpSpPr>
+      <p:sp>
+        <p:nvSpPr>
+          <p:cNvPr id="2" name="TextBox 1">
+            <a:extLst>
+              <a:ext uri="{FF2B5EF4-FFF2-40B4-BE49-F238E27FC236}">
+                <a16:creationId xmlns:a16="http://schemas.microsoft.com/office/drawing/2014/main" id="{FB4785E2-8152-496A-A7EB-66332968DDF5}"/>
+              </a:ext>
+            </a:extLst>
+          </p:cNvPr>
+          <p:cNvSpPr txBox="1"/>
+          <p:nvPr/>
+        </p:nvSpPr>
+        <p:spPr>
+          <a:xfrm>
+            <a:off x="4072270" y="425303"/>
+            <a:ext cx="6730409" cy="707886"/>
+          </a:xfrm>
+          <a:prstGeom prst="rect">
+            <a:avLst/>
+          </a:prstGeom>
+          <a:noFill/>
+        </p:spPr>
+        <p:txBody>
+          <a:bodyPr wrap="square" rtlCol="0">
+            <a:spAutoFit/>
+          </a:bodyPr>
+          <a:lstStyle/>
+          <a:p>
+            <a:r>
+              <a:rPr lang="en-US" sz="4000" dirty="0"/>
+              <a:t>How to See a UFO</a:t>
+            </a:r>
+          </a:p>
+        </p:txBody>
+      </p:sp>
     </p:spTree>
     <p:extLst>
       <p:ext uri="{BB962C8B-B14F-4D97-AF65-F5344CB8AC3E}">
@@ -10822,41 +11211,6 @@
       </p:sp>
       <p:sp>
         <p:nvSpPr>
-          <p:cNvPr id="22" name="TextBox 21">
-            <a:extLst>
-              <a:ext uri="{FF2B5EF4-FFF2-40B4-BE49-F238E27FC236}">
-                <a16:creationId xmlns:a16="http://schemas.microsoft.com/office/drawing/2014/main" id="{1E1E3BC8-113D-4C07-B2CA-D16F980C35F4}"/>
-              </a:ext>
-            </a:extLst>
-          </p:cNvPr>
-          <p:cNvSpPr txBox="1"/>
-          <p:nvPr/>
-        </p:nvSpPr>
-        <p:spPr>
-          <a:xfrm>
-            <a:off x="1469142" y="210813"/>
-            <a:ext cx="4584361" cy="584775"/>
-          </a:xfrm>
-          <a:prstGeom prst="rect">
-            <a:avLst/>
-          </a:prstGeom>
-          <a:noFill/>
-        </p:spPr>
-        <p:txBody>
-          <a:bodyPr wrap="square" rtlCol="0">
-            <a:spAutoFit/>
-          </a:bodyPr>
-          <a:lstStyle/>
-          <a:p>
-            <a:r>
-              <a:rPr lang="en-US" sz="3200" dirty="0"/>
-              <a:t>Where Will I see a UFO?</a:t>
-            </a:r>
-          </a:p>
-        </p:txBody>
-      </p:sp>
-      <p:sp>
-        <p:nvSpPr>
           <p:cNvPr id="3" name="TextBox 2">
             <a:extLst>
               <a:ext uri="{FF2B5EF4-FFF2-40B4-BE49-F238E27FC236}">
@@ -11062,6 +11416,50 @@
               <a:rPr lang="en-US" sz="1100" dirty="0"/>
               <a:t># of Sightings</a:t>
             </a:r>
+          </a:p>
+        </p:txBody>
+      </p:sp>
+      <p:sp>
+        <p:nvSpPr>
+          <p:cNvPr id="24" name="TextBox 23">
+            <a:extLst>
+              <a:ext uri="{FF2B5EF4-FFF2-40B4-BE49-F238E27FC236}">
+                <a16:creationId xmlns:a16="http://schemas.microsoft.com/office/drawing/2014/main" id="{967B0CA2-A682-454A-962C-05F92637232B}"/>
+              </a:ext>
+            </a:extLst>
+          </p:cNvPr>
+          <p:cNvSpPr txBox="1"/>
+          <p:nvPr/>
+        </p:nvSpPr>
+        <p:spPr>
+          <a:xfrm>
+            <a:off x="1359084" y="163477"/>
+            <a:ext cx="4496871" cy="584775"/>
+          </a:xfrm>
+          <a:prstGeom prst="rect">
+            <a:avLst/>
+          </a:prstGeom>
+          <a:noFill/>
+        </p:spPr>
+        <p:txBody>
+          <a:bodyPr wrap="square" rtlCol="0">
+            <a:spAutoFit/>
+          </a:bodyPr>
+          <a:lstStyle/>
+          <a:p>
+            <a:r>
+              <a:rPr lang="en-US" sz="3200" dirty="0"/>
+              <a:t>Where Will I See</a:t>
+            </a:r>
+            <a:r>
+              <a:rPr lang="en-US" sz="2800" dirty="0"/>
+              <a:t> </a:t>
+            </a:r>
+            <a:r>
+              <a:rPr lang="en-US" sz="3200" dirty="0"/>
+              <a:t>a UFO?</a:t>
+            </a:r>
+            <a:endParaRPr lang="en-US" sz="2800" dirty="0"/>
           </a:p>
         </p:txBody>
       </p:sp>
@@ -11969,10 +12367,10 @@
       </p:pic>
       <p:sp>
         <p:nvSpPr>
-          <p:cNvPr id="5" name="TextBox 4">
+          <p:cNvPr id="7" name="TextBox 6">
             <a:extLst>
               <a:ext uri="{FF2B5EF4-FFF2-40B4-BE49-F238E27FC236}">
-                <a16:creationId xmlns:a16="http://schemas.microsoft.com/office/drawing/2014/main" id="{A5907F3C-C6C1-4774-9FF5-477F00F25631}"/>
+                <a16:creationId xmlns:a16="http://schemas.microsoft.com/office/drawing/2014/main" id="{4E30BC1A-8EB7-4605-95F1-866952A6E84C}"/>
               </a:ext>
             </a:extLst>
           </p:cNvPr>
@@ -11981,8 +12379,8 @@
         </p:nvSpPr>
         <p:spPr>
           <a:xfrm>
-            <a:off x="1395167" y="490194"/>
-            <a:ext cx="3016578" cy="584775"/>
+            <a:off x="1359084" y="163477"/>
+            <a:ext cx="4178115" cy="584775"/>
           </a:xfrm>
           <a:prstGeom prst="rect">
             <a:avLst/>
@@ -11999,6 +12397,7 @@
               <a:rPr lang="en-US" sz="3200" dirty="0"/>
               <a:t>What Will I See?</a:t>
             </a:r>
+            <a:endParaRPr lang="en-US" sz="2800" dirty="0"/>
           </a:p>
         </p:txBody>
       </p:sp>

</xml_diff>

<commit_message>
UPDATE: Add xlabels name for plots
</commit_message>
<xml_diff>
--- a/ufo_presentation_v3.pptx
+++ b/ufo_presentation_v3.pptx
@@ -4208,7 +4208,7 @@
             <a:lum/>
             <a:extLst>
               <a:ext uri="{837473B0-CC2E-450A-ABE3-18F120FF3D39}">
-                <a1611:picAttrSrcUrl xmlns="" xmlns:a1611="http://schemas.microsoft.com/office/drawing/2016/11/main" r:id="rId3"/>
+                <a1611:picAttrSrcUrl xmlns:a1611="http://schemas.microsoft.com/office/drawing/2016/11/main" xmlns="" r:id="rId3"/>
               </a:ext>
             </a:extLst>
           </a:blip>
@@ -7173,7 +7173,7 @@
                 <a14:useLocalDpi xmlns:a14="http://schemas.microsoft.com/office/drawing/2010/main" val="0"/>
               </a:ext>
               <a:ext uri="{96DAC541-7B7A-43D3-8B79-37D633B846F1}">
-                <asvg:svgBlip xmlns="" xmlns:asvg="http://schemas.microsoft.com/office/drawing/2016/SVG/main" r:embed="rId3"/>
+                <asvg:svgBlip xmlns:asvg="http://schemas.microsoft.com/office/drawing/2016/SVG/main" xmlns="" r:embed="rId3"/>
               </a:ext>
             </a:extLst>
           </a:blip>
@@ -8406,11 +8406,7 @@
           <a:p>
             <a:r>
               <a:rPr lang="en-US" dirty="0" smtClean="0"/>
-              <a:t>Accuracy : </a:t>
-            </a:r>
-            <a:r>
-              <a:rPr lang="en-US" dirty="0" smtClean="0"/>
-              <a:t>0.8039</a:t>
+              <a:t>Accuracy : 0.8039</a:t>
             </a:r>
             <a:endParaRPr lang="en-US" dirty="0"/>
           </a:p>
@@ -9522,7 +9518,7 @@
                 <a14:useLocalDpi xmlns:a14="http://schemas.microsoft.com/office/drawing/2010/main" val="0"/>
               </a:ext>
               <a:ext uri="{96DAC541-7B7A-43D3-8B79-37D633B846F1}">
-                <asvg:svgBlip xmlns="" xmlns:asvg="http://schemas.microsoft.com/office/drawing/2016/SVG/main" r:embed="rId3"/>
+                <asvg:svgBlip xmlns:asvg="http://schemas.microsoft.com/office/drawing/2016/SVG/main" xmlns="" r:embed="rId3"/>
               </a:ext>
             </a:extLst>
           </a:blip>
@@ -9854,7 +9850,7 @@
                 <a14:useLocalDpi xmlns:a14="http://schemas.microsoft.com/office/drawing/2010/main" val="0"/>
               </a:ext>
               <a:ext uri="{96DAC541-7B7A-43D3-8B79-37D633B846F1}">
-                <asvg:svgBlip xmlns="" xmlns:asvg="http://schemas.microsoft.com/office/drawing/2016/SVG/main" r:embed="rId3"/>
+                <asvg:svgBlip xmlns:asvg="http://schemas.microsoft.com/office/drawing/2016/SVG/main" xmlns="" r:embed="rId3"/>
               </a:ext>
             </a:extLst>
           </a:blip>
@@ -10260,7 +10256,7 @@
                 <a14:useLocalDpi xmlns:a14="http://schemas.microsoft.com/office/drawing/2010/main" val="0"/>
               </a:ext>
               <a:ext uri="{96DAC541-7B7A-43D3-8B79-37D633B846F1}">
-                <asvg:svgBlip xmlns="" xmlns:asvg="http://schemas.microsoft.com/office/drawing/2016/SVG/main" r:embed="rId3"/>
+                <asvg:svgBlip xmlns:asvg="http://schemas.microsoft.com/office/drawing/2016/SVG/main" xmlns="" r:embed="rId3"/>
               </a:ext>
             </a:extLst>
           </a:blip>
@@ -10594,7 +10590,7 @@
                 <a14:useLocalDpi xmlns:a14="http://schemas.microsoft.com/office/drawing/2010/main" val="0"/>
               </a:ext>
               <a:ext uri="{96DAC541-7B7A-43D3-8B79-37D633B846F1}">
-                <asvg:svgBlip xmlns="" xmlns:asvg="http://schemas.microsoft.com/office/drawing/2016/SVG/main" r:embed="rId3"/>
+                <asvg:svgBlip xmlns:asvg="http://schemas.microsoft.com/office/drawing/2016/SVG/main" xmlns="" r:embed="rId3"/>
               </a:ext>
             </a:extLst>
           </a:blip>
@@ -11168,7 +11164,7 @@
                 <a14:useLocalDpi xmlns:a14="http://schemas.microsoft.com/office/drawing/2010/main" val="0"/>
               </a:ext>
               <a:ext uri="{96DAC541-7B7A-43D3-8B79-37D633B846F1}">
-                <asvg:svgBlip xmlns="" xmlns:asvg="http://schemas.microsoft.com/office/drawing/2016/SVG/main" r:embed="rId3"/>
+                <asvg:svgBlip xmlns:asvg="http://schemas.microsoft.com/office/drawing/2016/SVG/main" xmlns="" r:embed="rId3"/>
               </a:ext>
             </a:extLst>
           </a:blip>

</xml_diff>

<commit_message>
Updated: deck aesthetics and conclusion
</commit_message>
<xml_diff>
--- a/ufo_presentation_v3.pptx
+++ b/ufo_presentation_v3.pptx
@@ -14,9 +14,9 @@
     <p:sldId id="264" r:id="rId5"/>
     <p:sldId id="257" r:id="rId6"/>
     <p:sldId id="263" r:id="rId7"/>
-    <p:sldId id="260" r:id="rId8"/>
-    <p:sldId id="261" r:id="rId9"/>
-    <p:sldId id="277" r:id="rId10"/>
+    <p:sldId id="282" r:id="rId8"/>
+    <p:sldId id="283" r:id="rId9"/>
+    <p:sldId id="284" r:id="rId10"/>
     <p:sldId id="262" r:id="rId11"/>
     <p:sldId id="265" r:id="rId12"/>
     <p:sldId id="266" r:id="rId13"/>
@@ -220,7 +220,7 @@
           <a:p>
             <a:fld id="{0AA45E3A-A5A7-462E-A142-39CFB8208984}" type="datetimeFigureOut">
               <a:rPr lang="en-US" smtClean="0"/>
-              <a:t>8/12/2018</a:t>
+              <a:t>8/13/2018</a:t>
             </a:fld>
             <a:endParaRPr lang="en-US"/>
           </a:p>
@@ -531,7 +531,10 @@
           <a:bodyPr/>
           <a:lstStyle/>
           <a:p>
-            <a:endParaRPr lang="en-US" dirty="0"/>
+            <a:r>
+              <a:rPr lang="en-US" dirty="0"/>
+              <a:t>CA, FL, TX, NY, and IL the most populous</a:t>
+            </a:r>
           </a:p>
         </p:txBody>
       </p:sp>
@@ -561,7 +564,7 @@
     </p:spTree>
     <p:extLst>
       <p:ext uri="{BB962C8B-B14F-4D97-AF65-F5344CB8AC3E}">
-        <p14:creationId xmlns:p14="http://schemas.microsoft.com/office/powerpoint/2010/main" val="3048276156"/>
+        <p14:creationId xmlns:p14="http://schemas.microsoft.com/office/powerpoint/2010/main" val="1136570812"/>
       </p:ext>
     </p:extLst>
   </p:cSld>
@@ -744,7 +747,7 @@
     </p:spTree>
     <p:extLst>
       <p:ext uri="{BB962C8B-B14F-4D97-AF65-F5344CB8AC3E}">
-        <p14:creationId xmlns:p14="http://schemas.microsoft.com/office/powerpoint/2010/main" val="3098311071"/>
+        <p14:creationId xmlns:p14="http://schemas.microsoft.com/office/powerpoint/2010/main" val="355951875"/>
       </p:ext>
     </p:extLst>
   </p:cSld>
@@ -1554,7 +1557,7 @@
           <a:p>
             <a:fld id="{E8F48BBA-6D6A-4DFF-9FF9-60A6115AA27B}" type="datetimeFigureOut">
               <a:rPr lang="en-US" smtClean="0"/>
-              <a:t>8/12/2018</a:t>
+              <a:t>8/13/2018</a:t>
             </a:fld>
             <a:endParaRPr lang="en-US"/>
           </a:p>
@@ -1884,7 +1887,7 @@
           <a:p>
             <a:fld id="{E8F48BBA-6D6A-4DFF-9FF9-60A6115AA27B}" type="datetimeFigureOut">
               <a:rPr lang="en-US" smtClean="0"/>
-              <a:t>8/12/2018</a:t>
+              <a:t>8/13/2018</a:t>
             </a:fld>
             <a:endParaRPr lang="en-US"/>
           </a:p>
@@ -2064,7 +2067,7 @@
           <a:p>
             <a:fld id="{E8F48BBA-6D6A-4DFF-9FF9-60A6115AA27B}" type="datetimeFigureOut">
               <a:rPr lang="en-US" smtClean="0"/>
-              <a:t>8/12/2018</a:t>
+              <a:t>8/13/2018</a:t>
             </a:fld>
             <a:endParaRPr lang="en-US"/>
           </a:p>
@@ -2234,7 +2237,7 @@
           <a:p>
             <a:fld id="{E8F48BBA-6D6A-4DFF-9FF9-60A6115AA27B}" type="datetimeFigureOut">
               <a:rPr lang="en-US" smtClean="0"/>
-              <a:t>8/12/2018</a:t>
+              <a:t>8/13/2018</a:t>
             </a:fld>
             <a:endParaRPr lang="en-US"/>
           </a:p>
@@ -2511,7 +2514,7 @@
           <a:p>
             <a:fld id="{E8F48BBA-6D6A-4DFF-9FF9-60A6115AA27B}" type="datetimeFigureOut">
               <a:rPr lang="en-US" smtClean="0"/>
-              <a:t>8/12/2018</a:t>
+              <a:t>8/13/2018</a:t>
             </a:fld>
             <a:endParaRPr lang="en-US"/>
           </a:p>
@@ -2905,7 +2908,7 @@
           <a:p>
             <a:fld id="{E8F48BBA-6D6A-4DFF-9FF9-60A6115AA27B}" type="datetimeFigureOut">
               <a:rPr lang="en-US" smtClean="0"/>
-              <a:t>8/12/2018</a:t>
+              <a:t>8/13/2018</a:t>
             </a:fld>
             <a:endParaRPr lang="en-US"/>
           </a:p>
@@ -3382,7 +3385,7 @@
           <a:p>
             <a:fld id="{E8F48BBA-6D6A-4DFF-9FF9-60A6115AA27B}" type="datetimeFigureOut">
               <a:rPr lang="en-US" smtClean="0"/>
-              <a:t>8/12/2018</a:t>
+              <a:t>8/13/2018</a:t>
             </a:fld>
             <a:endParaRPr lang="en-US"/>
           </a:p>
@@ -3500,7 +3503,7 @@
           <a:p>
             <a:fld id="{E8F48BBA-6D6A-4DFF-9FF9-60A6115AA27B}" type="datetimeFigureOut">
               <a:rPr lang="en-US" smtClean="0"/>
-              <a:t>8/12/2018</a:t>
+              <a:t>8/13/2018</a:t>
             </a:fld>
             <a:endParaRPr lang="en-US"/>
           </a:p>
@@ -3595,7 +3598,7 @@
           <a:p>
             <a:fld id="{E8F48BBA-6D6A-4DFF-9FF9-60A6115AA27B}" type="datetimeFigureOut">
               <a:rPr lang="en-US" smtClean="0"/>
-              <a:t>8/12/2018</a:t>
+              <a:t>8/13/2018</a:t>
             </a:fld>
             <a:endParaRPr lang="en-US"/>
           </a:p>
@@ -3941,7 +3944,7 @@
           <a:p>
             <a:fld id="{E8F48BBA-6D6A-4DFF-9FF9-60A6115AA27B}" type="datetimeFigureOut">
               <a:rPr lang="en-US" smtClean="0"/>
-              <a:t>8/12/2018</a:t>
+              <a:t>8/13/2018</a:t>
             </a:fld>
             <a:endParaRPr lang="en-US"/>
           </a:p>
@@ -4329,7 +4332,7 @@
           <a:p>
             <a:fld id="{E8F48BBA-6D6A-4DFF-9FF9-60A6115AA27B}" type="datetimeFigureOut">
               <a:rPr lang="en-US" smtClean="0"/>
-              <a:t>8/12/2018</a:t>
+              <a:t>8/13/2018</a:t>
             </a:fld>
             <a:endParaRPr lang="en-US"/>
           </a:p>
@@ -4607,7 +4610,7 @@
           <a:p>
             <a:fld id="{E8F48BBA-6D6A-4DFF-9FF9-60A6115AA27B}" type="datetimeFigureOut">
               <a:rPr lang="en-US" smtClean="0"/>
-              <a:t>8/12/2018</a:t>
+              <a:t>8/13/2018</a:t>
             </a:fld>
             <a:endParaRPr lang="en-US"/>
           </a:p>
@@ -5112,7 +5115,7 @@
             <a:lum/>
             <a:extLst>
               <a:ext uri="{837473B0-CC2E-450A-ABE3-18F120FF3D39}">
-                <a1611:picAttrSrcUrl xmlns:a1611="http://schemas.microsoft.com/office/drawing/2016/11/main" xmlns="" r:id="rId3"/>
+                <a1611:picAttrSrcUrl xmlns:a1611="http://schemas.microsoft.com/office/drawing/2016/11/main" r:id="rId3"/>
               </a:ext>
             </a:extLst>
           </a:blip>
@@ -5445,7 +5448,7 @@
                 <a14:useLocalDpi xmlns:a14="http://schemas.microsoft.com/office/drawing/2010/main" val="0"/>
               </a:ext>
               <a:ext uri="{96DAC541-7B7A-43D3-8B79-37D633B846F1}">
-                <asvg:svgBlip xmlns:asvg="http://schemas.microsoft.com/office/drawing/2016/SVG/main" xmlns="" r:embed="rId3"/>
+                <asvg:svgBlip xmlns:asvg="http://schemas.microsoft.com/office/drawing/2016/SVG/main" r:embed="rId3"/>
               </a:ext>
             </a:extLst>
           </a:blip>
@@ -8482,7 +8485,7 @@
                 <a14:useLocalDpi xmlns:a14="http://schemas.microsoft.com/office/drawing/2010/main" val="0"/>
               </a:ext>
               <a:ext uri="{96DAC541-7B7A-43D3-8B79-37D633B846F1}">
-                <asvg:svgBlip xmlns:asvg="http://schemas.microsoft.com/office/drawing/2016/SVG/main" xmlns="" r:embed="rId4"/>
+                <asvg:svgBlip xmlns:asvg="http://schemas.microsoft.com/office/drawing/2016/SVG/main" r:embed="rId4"/>
               </a:ext>
             </a:extLst>
           </a:blip>
@@ -9198,7 +9201,7 @@
                 <a14:useLocalDpi xmlns:a14="http://schemas.microsoft.com/office/drawing/2010/main" val="0"/>
               </a:ext>
               <a:ext uri="{96DAC541-7B7A-43D3-8B79-37D633B846F1}">
-                <asvg:svgBlip xmlns:asvg="http://schemas.microsoft.com/office/drawing/2016/SVG/main" xmlns="" r:embed="rId4"/>
+                <asvg:svgBlip xmlns:asvg="http://schemas.microsoft.com/office/drawing/2016/SVG/main" r:embed="rId4"/>
               </a:ext>
             </a:extLst>
           </a:blip>
@@ -9896,7 +9899,7 @@
                 <a14:useLocalDpi xmlns:a14="http://schemas.microsoft.com/office/drawing/2010/main" val="0"/>
               </a:ext>
               <a:ext uri="{96DAC541-7B7A-43D3-8B79-37D633B846F1}">
-                <asvg:svgBlip xmlns:asvg="http://schemas.microsoft.com/office/drawing/2016/SVG/main" xmlns="" r:embed="rId4"/>
+                <asvg:svgBlip xmlns:asvg="http://schemas.microsoft.com/office/drawing/2016/SVG/main" r:embed="rId4"/>
               </a:ext>
             </a:extLst>
           </a:blip>
@@ -10017,7 +10020,7 @@
                 <a14:useLocalDpi xmlns:a14="http://schemas.microsoft.com/office/drawing/2010/main" val="0"/>
               </a:ext>
               <a:ext uri="{96DAC541-7B7A-43D3-8B79-37D633B846F1}">
-                <asvg:svgBlip xmlns:asvg="http://schemas.microsoft.com/office/drawing/2016/SVG/main" xmlns="" r:embed="rId3"/>
+                <asvg:svgBlip xmlns:asvg="http://schemas.microsoft.com/office/drawing/2016/SVG/main" r:embed="rId3"/>
               </a:ext>
             </a:extLst>
           </a:blip>
@@ -10569,20 +10572,12 @@
               <a:rPr lang="en-US" dirty="0"/>
               <a:t>K Means Clustering: Cluster 3</a:t>
             </a:r>
-            <a:r>
-              <a:rPr lang="en-US" sz="2400" dirty="0"/>
-              <a:t/>
-            </a:r>
             <a:br>
               <a:rPr lang="en-US" sz="2400" dirty="0"/>
             </a:br>
             <a:r>
               <a:rPr lang="en-US" sz="1800" dirty="0"/>
               <a:t>	</a:t>
-            </a:r>
-            <a:r>
-              <a:rPr lang="en-US" dirty="0"/>
-              <a:t/>
             </a:r>
             <a:br>
               <a:rPr lang="en-US" dirty="0"/>
@@ -10829,7 +10824,7 @@
                 <a14:useLocalDpi xmlns:a14="http://schemas.microsoft.com/office/drawing/2010/main" val="0"/>
               </a:ext>
               <a:ext uri="{96DAC541-7B7A-43D3-8B79-37D633B846F1}">
-                <asvg:svgBlip xmlns:asvg="http://schemas.microsoft.com/office/drawing/2016/SVG/main" xmlns="" r:embed="rId6"/>
+                <asvg:svgBlip xmlns:asvg="http://schemas.microsoft.com/office/drawing/2016/SVG/main" r:embed="rId6"/>
               </a:ext>
             </a:extLst>
           </a:blip>
@@ -11019,7 +11014,7 @@
                 <a14:useLocalDpi xmlns:a14="http://schemas.microsoft.com/office/drawing/2010/main" val="0"/>
               </a:ext>
               <a:ext uri="{96DAC541-7B7A-43D3-8B79-37D633B846F1}">
-                <asvg:svgBlip xmlns:asvg="http://schemas.microsoft.com/office/drawing/2016/SVG/main" xmlns="" r:embed="rId4"/>
+                <asvg:svgBlip xmlns:asvg="http://schemas.microsoft.com/office/drawing/2016/SVG/main" r:embed="rId4"/>
               </a:ext>
             </a:extLst>
           </a:blip>
@@ -11420,7 +11415,7 @@
                 <a14:useLocalDpi xmlns:a14="http://schemas.microsoft.com/office/drawing/2010/main" val="0"/>
               </a:ext>
               <a:ext uri="{96DAC541-7B7A-43D3-8B79-37D633B846F1}">
-                <asvg:svgBlip xmlns:asvg="http://schemas.microsoft.com/office/drawing/2016/SVG/main" xmlns="" r:embed="rId4"/>
+                <asvg:svgBlip xmlns:asvg="http://schemas.microsoft.com/office/drawing/2016/SVG/main" r:embed="rId4"/>
               </a:ext>
             </a:extLst>
           </a:blip>
@@ -11456,7 +11451,7 @@
         </p:nvSpPr>
         <p:spPr>
           <a:xfrm>
-            <a:off x="1371600" y="356189"/>
+            <a:off x="952084" y="234778"/>
             <a:ext cx="9601200" cy="940981"/>
           </a:xfrm>
         </p:spPr>
@@ -11493,7 +11488,7 @@
         </p:blipFill>
         <p:spPr>
           <a:xfrm>
-            <a:off x="1101607" y="1682479"/>
+            <a:off x="952084" y="2179020"/>
             <a:ext cx="4109487" cy="2980481"/>
           </a:xfrm>
           <a:prstGeom prst="rect">
@@ -11527,7 +11522,7 @@
         </p:nvSpPr>
         <p:spPr>
           <a:xfrm>
-            <a:off x="1925924" y="1297170"/>
+            <a:off x="1776401" y="1793711"/>
             <a:ext cx="2762053" cy="369332"/>
           </a:xfrm>
           <a:prstGeom prst="rect">
@@ -11570,7 +11565,7 @@
         </p:blipFill>
         <p:spPr>
           <a:xfrm>
-            <a:off x="5982537" y="3791976"/>
+            <a:off x="5355983" y="991170"/>
             <a:ext cx="5548051" cy="2950444"/>
           </a:xfrm>
           <a:prstGeom prst="rect">
@@ -11604,7 +11599,7 @@
         </p:nvSpPr>
         <p:spPr>
           <a:xfrm>
-            <a:off x="6980907" y="3329156"/>
+            <a:off x="9330402" y="606553"/>
             <a:ext cx="2762053" cy="369332"/>
           </a:xfrm>
           <a:prstGeom prst="rect">
@@ -11647,7 +11642,7 @@
         </p:blipFill>
         <p:spPr>
           <a:xfrm>
-            <a:off x="8439149" y="1297170"/>
+            <a:off x="5548683" y="4377517"/>
             <a:ext cx="3163495" cy="2245705"/>
           </a:xfrm>
           <a:prstGeom prst="rect">
@@ -11681,7 +11676,7 @@
         </p:nvSpPr>
         <p:spPr>
           <a:xfrm>
-            <a:off x="9016500" y="897267"/>
+            <a:off x="6126034" y="3977614"/>
             <a:ext cx="2762053" cy="369332"/>
           </a:xfrm>
           <a:prstGeom prst="rect">
@@ -11786,7 +11781,7 @@
                 <a14:useLocalDpi xmlns:a14="http://schemas.microsoft.com/office/drawing/2010/main" val="0"/>
               </a:ext>
               <a:ext uri="{96DAC541-7B7A-43D3-8B79-37D633B846F1}">
-                <asvg:svgBlip xmlns:asvg="http://schemas.microsoft.com/office/drawing/2016/SVG/main" xmlns="" r:embed="rId3"/>
+                <asvg:svgBlip xmlns:asvg="http://schemas.microsoft.com/office/drawing/2016/SVG/main" r:embed="rId3"/>
               </a:ext>
             </a:extLst>
           </a:blip>
@@ -11944,7 +11939,7 @@
                 <a14:useLocalDpi xmlns:a14="http://schemas.microsoft.com/office/drawing/2010/main" val="0"/>
               </a:ext>
               <a:ext uri="{96DAC541-7B7A-43D3-8B79-37D633B846F1}">
-                <asvg:svgBlip xmlns:asvg="http://schemas.microsoft.com/office/drawing/2016/SVG/main" xmlns="" r:embed="rId4"/>
+                <asvg:svgBlip xmlns:asvg="http://schemas.microsoft.com/office/drawing/2016/SVG/main" r:embed="rId4"/>
               </a:ext>
             </a:extLst>
           </a:blip>
@@ -11976,7 +11971,7 @@
         </p:nvSpPr>
         <p:spPr>
           <a:xfrm>
-            <a:off x="7143537" y="808285"/>
+            <a:off x="6822600" y="1493142"/>
             <a:ext cx="2752627" cy="369332"/>
           </a:xfrm>
           <a:prstGeom prst="rect">
@@ -12151,7 +12146,7 @@
         </p:nvSpPr>
         <p:spPr>
           <a:xfrm rot="16200000">
-            <a:off x="5497669" y="2378815"/>
+            <a:off x="5176732" y="3063672"/>
             <a:ext cx="1875934" cy="261610"/>
           </a:xfrm>
           <a:prstGeom prst="rect">
@@ -12280,7 +12275,7 @@
         </p:blipFill>
         <p:spPr>
           <a:xfrm>
-            <a:off x="6588564" y="1275900"/>
+            <a:off x="6267627" y="1960757"/>
             <a:ext cx="4112871" cy="3344304"/>
           </a:xfrm>
           <a:prstGeom prst="rect">
@@ -12393,7 +12388,7 @@
                 <a14:useLocalDpi xmlns:a14="http://schemas.microsoft.com/office/drawing/2010/main" val="0"/>
               </a:ext>
               <a:ext uri="{96DAC541-7B7A-43D3-8B79-37D633B846F1}">
-                <asvg:svgBlip xmlns:asvg="http://schemas.microsoft.com/office/drawing/2016/SVG/main" xmlns="" r:embed="rId4"/>
+                <asvg:svgBlip xmlns:asvg="http://schemas.microsoft.com/office/drawing/2016/SVG/main" r:embed="rId4"/>
               </a:ext>
             </a:extLst>
           </a:blip>
@@ -12460,7 +12455,7 @@
         </p:nvSpPr>
         <p:spPr>
           <a:xfrm>
-            <a:off x="1277599" y="998542"/>
+            <a:off x="2261167" y="748252"/>
             <a:ext cx="1903728" cy="338554"/>
           </a:xfrm>
           <a:prstGeom prst="rect">
@@ -12539,7 +12534,7 @@
         </p:nvSpPr>
         <p:spPr>
           <a:xfrm>
-            <a:off x="1201857" y="3771417"/>
+            <a:off x="2185425" y="3521127"/>
             <a:ext cx="1903728" cy="338554"/>
           </a:xfrm>
           <a:prstGeom prst="rect">
@@ -12582,7 +12577,7 @@
         </p:blipFill>
         <p:spPr>
           <a:xfrm>
-            <a:off x="1277599" y="1359775"/>
+            <a:off x="2261167" y="1109485"/>
             <a:ext cx="3508382" cy="2114715"/>
           </a:xfrm>
           <a:prstGeom prst="rect">
@@ -12813,7 +12808,7 @@
         </p:blipFill>
         <p:spPr>
           <a:xfrm>
-            <a:off x="1256301" y="4102608"/>
+            <a:off x="2239869" y="3852318"/>
             <a:ext cx="3770155" cy="2441683"/>
           </a:xfrm>
           <a:prstGeom prst="rect">
@@ -12884,7 +12879,7 @@
                 <a14:useLocalDpi xmlns:a14="http://schemas.microsoft.com/office/drawing/2010/main" val="0"/>
               </a:ext>
               <a:ext uri="{96DAC541-7B7A-43D3-8B79-37D633B846F1}">
-                <asvg:svgBlip xmlns:asvg="http://schemas.microsoft.com/office/drawing/2016/SVG/main" xmlns="" r:embed="rId3"/>
+                <asvg:svgBlip xmlns:asvg="http://schemas.microsoft.com/office/drawing/2016/SVG/main" r:embed="rId3"/>
               </a:ext>
             </a:extLst>
           </a:blip>
@@ -12923,7 +12918,7 @@
         </p:blipFill>
         <p:spPr>
           <a:xfrm>
-            <a:off x="7083648" y="2097920"/>
+            <a:off x="6298098" y="1960757"/>
             <a:ext cx="4724649" cy="3028419"/>
           </a:xfrm>
           <a:prstGeom prst="rect">
@@ -12957,7 +12952,7 @@
         </p:nvSpPr>
         <p:spPr>
           <a:xfrm>
-            <a:off x="7075115" y="1740821"/>
+            <a:off x="6289565" y="1603658"/>
             <a:ext cx="3362479" cy="338554"/>
           </a:xfrm>
           <a:prstGeom prst="rect">
@@ -13150,7 +13145,7 @@
                 <a14:useLocalDpi xmlns:a14="http://schemas.microsoft.com/office/drawing/2010/main" val="0"/>
               </a:ext>
               <a:ext uri="{96DAC541-7B7A-43D3-8B79-37D633B846F1}">
-                <asvg:svgBlip xmlns:asvg="http://schemas.microsoft.com/office/drawing/2016/SVG/main" xmlns="" r:embed="rId4"/>
+                <asvg:svgBlip xmlns:asvg="http://schemas.microsoft.com/office/drawing/2016/SVG/main" r:embed="rId4"/>
               </a:ext>
             </a:extLst>
           </a:blip>
@@ -13418,7 +13413,7 @@
           <a:p>
             <a:r>
               <a:rPr lang="en-US" sz="4000" dirty="0"/>
-              <a:t>How to See a “Real” UFO</a:t>
+              <a:t>How to See a “Real” UFO:</a:t>
             </a:r>
           </a:p>
         </p:txBody>
@@ -13437,8 +13432,8 @@
         </p:nvSpPr>
         <p:spPr>
           <a:xfrm>
-            <a:off x="3321289" y="1490870"/>
-            <a:ext cx="6428998" cy="1477328"/>
+            <a:off x="3471994" y="1850255"/>
+            <a:ext cx="6428998" cy="3046988"/>
           </a:xfrm>
           <a:prstGeom prst="rect">
             <a:avLst/>
@@ -13456,7 +13451,7 @@
               <a:buChar char="•"/>
             </a:pPr>
             <a:r>
-              <a:rPr lang="en-US" dirty="0"/>
+              <a:rPr lang="en-US" sz="3200" dirty="0"/>
               <a:t>Phoenix, AZ</a:t>
             </a:r>
           </a:p>
@@ -13466,7 +13461,7 @@
               <a:buChar char="•"/>
             </a:pPr>
             <a:r>
-              <a:rPr lang="en-US" dirty="0"/>
+              <a:rPr lang="en-US" sz="3200" dirty="0"/>
               <a:t>Look for a triangle or cigar</a:t>
             </a:r>
           </a:p>
@@ -13476,7 +13471,7 @@
               <a:buChar char="•"/>
             </a:pPr>
             <a:r>
-              <a:rPr lang="en-US" dirty="0"/>
+              <a:rPr lang="en-US" sz="3200" dirty="0"/>
               <a:t>Go at night time</a:t>
             </a:r>
           </a:p>
@@ -13486,7 +13481,7 @@
               <a:buChar char="•"/>
             </a:pPr>
             <a:r>
-              <a:rPr lang="en-US" dirty="0"/>
+              <a:rPr lang="en-US" sz="3200" dirty="0"/>
               <a:t>On the weekend</a:t>
             </a:r>
           </a:p>
@@ -13495,7 +13490,17 @@
               <a:buFont typeface="Arial" panose="020B0604020202020204" pitchFamily="34" charset="0"/>
               <a:buChar char="•"/>
             </a:pPr>
-            <a:endParaRPr lang="en-US" dirty="0"/>
+            <a:r>
+              <a:rPr lang="en-US" sz="3200" dirty="0"/>
+              <a:t>July through September</a:t>
+            </a:r>
+          </a:p>
+          <a:p>
+            <a:pPr marL="285750" indent="-285750">
+              <a:buFont typeface="Arial" panose="020B0604020202020204" pitchFamily="34" charset="0"/>
+              <a:buChar char="•"/>
+            </a:pPr>
+            <a:endParaRPr lang="en-US" sz="3200" dirty="0"/>
           </a:p>
         </p:txBody>
       </p:sp>
@@ -13520,7 +13525,7 @@
                 <a14:useLocalDpi xmlns:a14="http://schemas.microsoft.com/office/drawing/2010/main" val="0"/>
               </a:ext>
               <a:ext uri="{96DAC541-7B7A-43D3-8B79-37D633B846F1}">
-                <asvg:svgBlip xmlns:asvg="http://schemas.microsoft.com/office/drawing/2016/SVG/main" xmlns="" r:embed="rId4"/>
+                <asvg:svgBlip xmlns:asvg="http://schemas.microsoft.com/office/drawing/2016/SVG/main" r:embed="rId4"/>
               </a:ext>
             </a:extLst>
           </a:blip>
@@ -13763,7 +13768,7 @@
                 <a14:useLocalDpi xmlns:a14="http://schemas.microsoft.com/office/drawing/2010/main" val="0"/>
               </a:ext>
               <a:ext uri="{96DAC541-7B7A-43D3-8B79-37D633B846F1}">
-                <asvg:svgBlip xmlns:asvg="http://schemas.microsoft.com/office/drawing/2016/SVG/main" xmlns="" r:embed="rId3"/>
+                <asvg:svgBlip xmlns:asvg="http://schemas.microsoft.com/office/drawing/2016/SVG/main" r:embed="rId3"/>
               </a:ext>
             </a:extLst>
           </a:blip>
@@ -14169,7 +14174,7 @@
                 <a14:useLocalDpi xmlns:a14="http://schemas.microsoft.com/office/drawing/2010/main" val="0"/>
               </a:ext>
               <a:ext uri="{96DAC541-7B7A-43D3-8B79-37D633B846F1}">
-                <asvg:svgBlip xmlns:asvg="http://schemas.microsoft.com/office/drawing/2016/SVG/main" xmlns="" r:embed="rId4"/>
+                <asvg:svgBlip xmlns:asvg="http://schemas.microsoft.com/office/drawing/2016/SVG/main" r:embed="rId4"/>
               </a:ext>
             </a:extLst>
           </a:blip>
@@ -14201,7 +14206,7 @@
         </p:nvSpPr>
         <p:spPr>
           <a:xfrm>
-            <a:off x="7143537" y="808285"/>
+            <a:off x="6822600" y="1493142"/>
             <a:ext cx="2752627" cy="369332"/>
           </a:xfrm>
           <a:prstGeom prst="rect">
@@ -14376,7 +14381,7 @@
         </p:nvSpPr>
         <p:spPr>
           <a:xfrm rot="16200000">
-            <a:off x="5497669" y="2378815"/>
+            <a:off x="5176732" y="3063672"/>
             <a:ext cx="1875934" cy="261610"/>
           </a:xfrm>
           <a:prstGeom prst="rect">
@@ -14505,7 +14510,7 @@
         </p:blipFill>
         <p:spPr>
           <a:xfrm>
-            <a:off x="6588564" y="1275900"/>
+            <a:off x="6267627" y="1960757"/>
             <a:ext cx="4112871" cy="3344304"/>
           </a:xfrm>
           <a:prstGeom prst="rect">
@@ -14570,7 +14575,7 @@
     </p:spTree>
     <p:extLst>
       <p:ext uri="{BB962C8B-B14F-4D97-AF65-F5344CB8AC3E}">
-        <p14:creationId xmlns:p14="http://schemas.microsoft.com/office/powerpoint/2010/main" val="3500889078"/>
+        <p14:creationId xmlns:p14="http://schemas.microsoft.com/office/powerpoint/2010/main" val="2500942957"/>
       </p:ext>
     </p:extLst>
   </p:cSld>
@@ -14618,7 +14623,7 @@
                 <a14:useLocalDpi xmlns:a14="http://schemas.microsoft.com/office/drawing/2010/main" val="0"/>
               </a:ext>
               <a:ext uri="{96DAC541-7B7A-43D3-8B79-37D633B846F1}">
-                <asvg:svgBlip xmlns:asvg="http://schemas.microsoft.com/office/drawing/2016/SVG/main" xmlns="" r:embed="rId4"/>
+                <asvg:svgBlip xmlns:asvg="http://schemas.microsoft.com/office/drawing/2016/SVG/main" r:embed="rId4"/>
               </a:ext>
             </a:extLst>
           </a:blip>
@@ -14685,7 +14690,7 @@
         </p:nvSpPr>
         <p:spPr>
           <a:xfrm>
-            <a:off x="1277599" y="998542"/>
+            <a:off x="2261167" y="748252"/>
             <a:ext cx="1903728" cy="338554"/>
           </a:xfrm>
           <a:prstGeom prst="rect">
@@ -14764,7 +14769,7 @@
         </p:nvSpPr>
         <p:spPr>
           <a:xfrm>
-            <a:off x="1201857" y="3771417"/>
+            <a:off x="2185425" y="3521127"/>
             <a:ext cx="1903728" cy="338554"/>
           </a:xfrm>
           <a:prstGeom prst="rect">
@@ -14807,7 +14812,7 @@
         </p:blipFill>
         <p:spPr>
           <a:xfrm>
-            <a:off x="1277599" y="1359775"/>
+            <a:off x="2261167" y="1109485"/>
             <a:ext cx="3508382" cy="2114715"/>
           </a:xfrm>
           <a:prstGeom prst="rect">
@@ -15018,10 +15023,10 @@
       </p:pic>
       <p:pic>
         <p:nvPicPr>
-          <p:cNvPr id="10" name="Picture 9">
+          <p:cNvPr id="16" name="Picture 15">
             <a:extLst>
               <a:ext uri="{FF2B5EF4-FFF2-40B4-BE49-F238E27FC236}">
-                <a16:creationId xmlns:a16="http://schemas.microsoft.com/office/drawing/2014/main" id="{5A826954-DAB7-4C5F-A3DB-41C0B8F605A5}"/>
+                <a16:creationId xmlns:a16="http://schemas.microsoft.com/office/drawing/2014/main" id="{6EC2C3AB-4C29-42F7-A5E6-D422385D6A7A}"/>
               </a:ext>
             </a:extLst>
           </p:cNvPr>
@@ -15038,7 +15043,7 @@
         </p:blipFill>
         <p:spPr>
           <a:xfrm>
-            <a:off x="1256301" y="4102608"/>
+            <a:off x="2239869" y="3852318"/>
             <a:ext cx="3770155" cy="2441683"/>
           </a:xfrm>
           <a:prstGeom prst="rect">
@@ -15061,7 +15066,7 @@
     </p:spTree>
     <p:extLst>
       <p:ext uri="{BB962C8B-B14F-4D97-AF65-F5344CB8AC3E}">
-        <p14:creationId xmlns:p14="http://schemas.microsoft.com/office/powerpoint/2010/main" val="1292774051"/>
+        <p14:creationId xmlns:p14="http://schemas.microsoft.com/office/powerpoint/2010/main" val="637454812"/>
       </p:ext>
     </p:extLst>
   </p:cSld>
@@ -15093,7 +15098,7 @@
           <p:cNvPr id="7" name="Graphic 6" descr="Rocket">
             <a:extLst>
               <a:ext uri="{FF2B5EF4-FFF2-40B4-BE49-F238E27FC236}">
-                <a16:creationId xmlns:a16="http://schemas.microsoft.com/office/drawing/2014/main" id="{C0D9A7E5-B159-488A-AC2E-0A70E80354FB}"/>
+                <a16:creationId xmlns:a16="http://schemas.microsoft.com/office/drawing/2014/main" id="{2345638A-5A70-4DDF-A4A4-21E89C25DB8E}"/>
               </a:ext>
             </a:extLst>
           </p:cNvPr>
@@ -15109,7 +15114,7 @@
                 <a14:useLocalDpi xmlns:a14="http://schemas.microsoft.com/office/drawing/2010/main" val="0"/>
               </a:ext>
               <a:ext uri="{96DAC541-7B7A-43D3-8B79-37D633B846F1}">
-                <asvg:svgBlip xmlns:asvg="http://schemas.microsoft.com/office/drawing/2016/SVG/main" xmlns="" r:embed="rId3"/>
+                <asvg:svgBlip xmlns:asvg="http://schemas.microsoft.com/office/drawing/2016/SVG/main" r:embed="rId3"/>
               </a:ext>
             </a:extLst>
           </a:blip>
@@ -15148,7 +15153,7 @@
         </p:blipFill>
         <p:spPr>
           <a:xfrm>
-            <a:off x="7083648" y="2097920"/>
+            <a:off x="6298098" y="1960757"/>
             <a:ext cx="4724649" cy="3028419"/>
           </a:xfrm>
           <a:prstGeom prst="rect">
@@ -15182,7 +15187,7 @@
         </p:nvSpPr>
         <p:spPr>
           <a:xfrm>
-            <a:off x="7075115" y="1740821"/>
+            <a:off x="6289565" y="1603658"/>
             <a:ext cx="3362479" cy="338554"/>
           </a:xfrm>
           <a:prstGeom prst="rect">
@@ -15285,7 +15290,7 @@
           <p:cNvPr id="6" name="TextBox 5">
             <a:extLst>
               <a:ext uri="{FF2B5EF4-FFF2-40B4-BE49-F238E27FC236}">
-                <a16:creationId xmlns:a16="http://schemas.microsoft.com/office/drawing/2014/main" id="{B0C31D5D-A2BA-4296-897E-4F796E609FAD}"/>
+                <a16:creationId xmlns:a16="http://schemas.microsoft.com/office/drawing/2014/main" id="{099D9FFB-88CD-445A-BF08-589858D83480}"/>
               </a:ext>
             </a:extLst>
           </p:cNvPr>
@@ -15327,7 +15332,7 @@
     </p:spTree>
     <p:extLst>
       <p:ext uri="{BB962C8B-B14F-4D97-AF65-F5344CB8AC3E}">
-        <p14:creationId xmlns:p14="http://schemas.microsoft.com/office/powerpoint/2010/main" val="3370827933"/>
+        <p14:creationId xmlns:p14="http://schemas.microsoft.com/office/powerpoint/2010/main" val="931946553"/>
       </p:ext>
     </p:extLst>
   </p:cSld>

</xml_diff>

<commit_message>
update: with preetikas charts
</commit_message>
<xml_diff>
--- a/ufo_presentation_v3.pptx
+++ b/ufo_presentation_v3.pptx
@@ -5,7 +5,7 @@
     <p:sldMasterId id="2147483660" r:id="rId1"/>
   </p:sldMasterIdLst>
   <p:notesMasterIdLst>
-    <p:notesMasterId r:id="rId26"/>
+    <p:notesMasterId r:id="rId27"/>
   </p:notesMasterIdLst>
   <p:sldIdLst>
     <p:sldId id="256" r:id="rId2"/>
@@ -15,23 +15,24 @@
     <p:sldId id="257" r:id="rId6"/>
     <p:sldId id="263" r:id="rId7"/>
     <p:sldId id="282" r:id="rId8"/>
-    <p:sldId id="283" r:id="rId9"/>
-    <p:sldId id="284" r:id="rId10"/>
-    <p:sldId id="262" r:id="rId11"/>
-    <p:sldId id="265" r:id="rId12"/>
-    <p:sldId id="266" r:id="rId13"/>
-    <p:sldId id="271" r:id="rId14"/>
-    <p:sldId id="272" r:id="rId15"/>
-    <p:sldId id="273" r:id="rId16"/>
-    <p:sldId id="274" r:id="rId17"/>
-    <p:sldId id="275" r:id="rId18"/>
-    <p:sldId id="269" r:id="rId19"/>
-    <p:sldId id="276" r:id="rId20"/>
-    <p:sldId id="278" r:id="rId21"/>
-    <p:sldId id="279" r:id="rId22"/>
-    <p:sldId id="280" r:id="rId23"/>
-    <p:sldId id="281" r:id="rId24"/>
-    <p:sldId id="270" r:id="rId25"/>
+    <p:sldId id="287" r:id="rId9"/>
+    <p:sldId id="288" r:id="rId10"/>
+    <p:sldId id="283" r:id="rId11"/>
+    <p:sldId id="284" r:id="rId12"/>
+    <p:sldId id="262" r:id="rId13"/>
+    <p:sldId id="265" r:id="rId14"/>
+    <p:sldId id="266" r:id="rId15"/>
+    <p:sldId id="271" r:id="rId16"/>
+    <p:sldId id="272" r:id="rId17"/>
+    <p:sldId id="273" r:id="rId18"/>
+    <p:sldId id="274" r:id="rId19"/>
+    <p:sldId id="275" r:id="rId20"/>
+    <p:sldId id="269" r:id="rId21"/>
+    <p:sldId id="276" r:id="rId22"/>
+    <p:sldId id="278" r:id="rId23"/>
+    <p:sldId id="279" r:id="rId24"/>
+    <p:sldId id="281" r:id="rId25"/>
+    <p:sldId id="270" r:id="rId26"/>
   </p:sldIdLst>
   <p:sldSz cx="12192000" cy="6858000"/>
   <p:notesSz cx="6858000" cy="9144000"/>
@@ -651,7 +652,7 @@
           <a:p>
             <a:fld id="{4D2ED366-9BC9-4336-AD97-E8FA9A06B63B}" type="slidenum">
               <a:rPr lang="en-US" smtClean="0"/>
-              <a:t>24</a:t>
+              <a:t>25</a:t>
             </a:fld>
             <a:endParaRPr lang="en-US"/>
           </a:p>
@@ -738,7 +739,7 @@
           <a:p>
             <a:fld id="{4D2ED366-9BC9-4336-AD97-E8FA9A06B63B}" type="slidenum">
               <a:rPr lang="en-US" smtClean="0"/>
-              <a:t>8</a:t>
+              <a:t>10</a:t>
             </a:fld>
             <a:endParaRPr lang="en-US"/>
           </a:p>
@@ -825,7 +826,7 @@
           <a:p>
             <a:fld id="{4D2ED366-9BC9-4336-AD97-E8FA9A06B63B}" type="slidenum">
               <a:rPr lang="en-US" smtClean="0"/>
-              <a:t>12</a:t>
+              <a:t>14</a:t>
             </a:fld>
             <a:endParaRPr lang="en-US"/>
           </a:p>
@@ -918,7 +919,7 @@
           <a:p>
             <a:fld id="{4D2ED366-9BC9-4336-AD97-E8FA9A06B63B}" type="slidenum">
               <a:rPr lang="en-US" smtClean="0"/>
-              <a:t>16</a:t>
+              <a:t>18</a:t>
             </a:fld>
             <a:endParaRPr lang="en-US"/>
           </a:p>
@@ -1005,7 +1006,7 @@
           <a:p>
             <a:fld id="{4D2ED366-9BC9-4336-AD97-E8FA9A06B63B}" type="slidenum">
               <a:rPr lang="en-US" smtClean="0"/>
-              <a:t>17</a:t>
+              <a:t>19</a:t>
             </a:fld>
             <a:endParaRPr lang="en-US"/>
           </a:p>
@@ -1104,7 +1105,7 @@
           <a:p>
             <a:fld id="{4D2ED366-9BC9-4336-AD97-E8FA9A06B63B}" type="slidenum">
               <a:rPr lang="en-US" smtClean="0"/>
-              <a:t>19</a:t>
+              <a:t>21</a:t>
             </a:fld>
             <a:endParaRPr lang="en-US"/>
           </a:p>
@@ -1191,7 +1192,7 @@
           <a:p>
             <a:fld id="{4D2ED366-9BC9-4336-AD97-E8FA9A06B63B}" type="slidenum">
               <a:rPr lang="en-US" smtClean="0"/>
-              <a:t>20</a:t>
+              <a:t>22</a:t>
             </a:fld>
             <a:endParaRPr lang="en-US"/>
           </a:p>
@@ -1278,7 +1279,7 @@
           <a:p>
             <a:fld id="{4D2ED366-9BC9-4336-AD97-E8FA9A06B63B}" type="slidenum">
               <a:rPr lang="en-US" smtClean="0"/>
-              <a:t>21</a:t>
+              <a:t>23</a:t>
             </a:fld>
             <a:endParaRPr lang="en-US"/>
           </a:p>
@@ -1369,7 +1370,7 @@
           <a:p>
             <a:fld id="{4D2ED366-9BC9-4336-AD97-E8FA9A06B63B}" type="slidenum">
               <a:rPr lang="en-US" smtClean="0"/>
-              <a:t>23</a:t>
+              <a:t>24</a:t>
             </a:fld>
             <a:endParaRPr lang="en-US"/>
           </a:p>
@@ -5429,10 +5430,10 @@
       </p:grpSpPr>
       <p:pic>
         <p:nvPicPr>
-          <p:cNvPr id="6" name="Graphic 5" descr="Rocket">
+          <p:cNvPr id="18" name="Graphic 17" descr="Rocket">
             <a:extLst>
               <a:ext uri="{FF2B5EF4-FFF2-40B4-BE49-F238E27FC236}">
-                <a16:creationId xmlns:a16="http://schemas.microsoft.com/office/drawing/2014/main" id="{A5B04463-13BD-4A78-BE3D-A05A69074A05}"/>
+                <a16:creationId xmlns:a16="http://schemas.microsoft.com/office/drawing/2014/main" id="{F7B322E4-7E9C-42C5-B7FC-C024C57AEF8F}"/>
               </a:ext>
             </a:extLst>
           </p:cNvPr>
@@ -5442,13 +5443,13 @@
           <p:nvPr/>
         </p:nvPicPr>
         <p:blipFill>
-          <a:blip r:embed="rId2">
+          <a:blip r:embed="rId3">
             <a:extLst>
               <a:ext uri="{28A0092B-C50C-407E-A947-70E740481C1C}">
                 <a14:useLocalDpi xmlns:a14="http://schemas.microsoft.com/office/drawing/2010/main" val="0"/>
               </a:ext>
               <a:ext uri="{96DAC541-7B7A-43D3-8B79-37D633B846F1}">
-                <asvg:svgBlip xmlns:asvg="http://schemas.microsoft.com/office/drawing/2016/SVG/main" r:embed="rId3"/>
+                <asvg:svgBlip xmlns:asvg="http://schemas.microsoft.com/office/drawing/2016/SVG/main" r:embed="rId4"/>
               </a:ext>
             </a:extLst>
           </a:blip>
@@ -5458,7 +5459,7 @@
         </p:blipFill>
         <p:spPr>
           <a:xfrm>
-            <a:off x="9987775" y="4925523"/>
+            <a:off x="9987775" y="4897243"/>
             <a:ext cx="1832518" cy="1832518"/>
           </a:xfrm>
           <a:prstGeom prst="rect">
@@ -5466,12 +5467,161 @@
           </a:prstGeom>
         </p:spPr>
       </p:pic>
+      <p:sp>
+        <p:nvSpPr>
+          <p:cNvPr id="9" name="TextBox 8">
+            <a:extLst>
+              <a:ext uri="{FF2B5EF4-FFF2-40B4-BE49-F238E27FC236}">
+                <a16:creationId xmlns:a16="http://schemas.microsoft.com/office/drawing/2014/main" id="{C43A5036-77F4-4E80-A14C-F806A75EA570}"/>
+              </a:ext>
+            </a:extLst>
+          </p:cNvPr>
+          <p:cNvSpPr txBox="1"/>
+          <p:nvPr/>
+        </p:nvSpPr>
+        <p:spPr>
+          <a:xfrm>
+            <a:off x="6712776" y="3386033"/>
+            <a:ext cx="3362479" cy="338554"/>
+          </a:xfrm>
+          <a:prstGeom prst="rect">
+            <a:avLst/>
+          </a:prstGeom>
+          <a:noFill/>
+        </p:spPr>
+        <p:txBody>
+          <a:bodyPr wrap="square" rtlCol="0">
+            <a:spAutoFit/>
+          </a:bodyPr>
+          <a:lstStyle/>
+          <a:p>
+            <a:r>
+              <a:rPr lang="en-US" sz="1600" dirty="0"/>
+              <a:t>Severe Weather Day of Sighting</a:t>
+            </a:r>
+          </a:p>
+        </p:txBody>
+      </p:sp>
+      <p:sp>
+        <p:nvSpPr>
+          <p:cNvPr id="11" name="TextBox 10">
+            <a:extLst>
+              <a:ext uri="{FF2B5EF4-FFF2-40B4-BE49-F238E27FC236}">
+                <a16:creationId xmlns:a16="http://schemas.microsoft.com/office/drawing/2014/main" id="{F359E3CE-C6A0-4E5D-B804-A6B499D0584C}"/>
+              </a:ext>
+            </a:extLst>
+          </p:cNvPr>
+          <p:cNvSpPr txBox="1"/>
+          <p:nvPr/>
+        </p:nvSpPr>
+        <p:spPr>
+          <a:xfrm>
+            <a:off x="2261167" y="748252"/>
+            <a:ext cx="1903728" cy="338554"/>
+          </a:xfrm>
+          <a:prstGeom prst="rect">
+            <a:avLst/>
+          </a:prstGeom>
+          <a:noFill/>
+        </p:spPr>
+        <p:txBody>
+          <a:bodyPr wrap="square" rtlCol="0">
+            <a:spAutoFit/>
+          </a:bodyPr>
+          <a:lstStyle/>
+          <a:p>
+            <a:r>
+              <a:rPr lang="en-US" sz="1600" dirty="0"/>
+              <a:t>Day of the Week</a:t>
+            </a:r>
+          </a:p>
+        </p:txBody>
+      </p:sp>
+      <p:sp>
+        <p:nvSpPr>
+          <p:cNvPr id="12" name="TextBox 11">
+            <a:extLst>
+              <a:ext uri="{FF2B5EF4-FFF2-40B4-BE49-F238E27FC236}">
+                <a16:creationId xmlns:a16="http://schemas.microsoft.com/office/drawing/2014/main" id="{0E98773B-9D20-43CD-9B0A-433BC28521C9}"/>
+              </a:ext>
+            </a:extLst>
+          </p:cNvPr>
+          <p:cNvSpPr txBox="1"/>
+          <p:nvPr/>
+        </p:nvSpPr>
+        <p:spPr>
+          <a:xfrm>
+            <a:off x="1359084" y="163477"/>
+            <a:ext cx="4178115" cy="584775"/>
+          </a:xfrm>
+          <a:prstGeom prst="rect">
+            <a:avLst/>
+          </a:prstGeom>
+          <a:noFill/>
+        </p:spPr>
+        <p:txBody>
+          <a:bodyPr wrap="square" rtlCol="0">
+            <a:spAutoFit/>
+          </a:bodyPr>
+          <a:lstStyle/>
+          <a:p>
+            <a:r>
+              <a:rPr lang="en-US" sz="3200" dirty="0"/>
+              <a:t>When Will I See</a:t>
+            </a:r>
+            <a:r>
+              <a:rPr lang="en-US" sz="2800" dirty="0"/>
+              <a:t> </a:t>
+            </a:r>
+            <a:r>
+              <a:rPr lang="en-US" sz="3200" dirty="0"/>
+              <a:t>a UFO?</a:t>
+            </a:r>
+            <a:endParaRPr lang="en-US" sz="2800" dirty="0"/>
+          </a:p>
+        </p:txBody>
+      </p:sp>
+      <p:sp>
+        <p:nvSpPr>
+          <p:cNvPr id="14" name="TextBox 13">
+            <a:extLst>
+              <a:ext uri="{FF2B5EF4-FFF2-40B4-BE49-F238E27FC236}">
+                <a16:creationId xmlns:a16="http://schemas.microsoft.com/office/drawing/2014/main" id="{9D61D4F5-DB81-46EE-92B3-A324A4C5D024}"/>
+              </a:ext>
+            </a:extLst>
+          </p:cNvPr>
+          <p:cNvSpPr txBox="1"/>
+          <p:nvPr/>
+        </p:nvSpPr>
+        <p:spPr>
+          <a:xfrm>
+            <a:off x="2185425" y="3521127"/>
+            <a:ext cx="1903728" cy="338554"/>
+          </a:xfrm>
+          <a:prstGeom prst="rect">
+            <a:avLst/>
+          </a:prstGeom>
+          <a:noFill/>
+        </p:spPr>
+        <p:txBody>
+          <a:bodyPr wrap="square" rtlCol="0">
+            <a:spAutoFit/>
+          </a:bodyPr>
+          <a:lstStyle/>
+          <a:p>
+            <a:r>
+              <a:rPr lang="en-US" sz="1600" dirty="0"/>
+              <a:t>Month</a:t>
+            </a:r>
+          </a:p>
+        </p:txBody>
+      </p:sp>
       <p:pic>
         <p:nvPicPr>
-          <p:cNvPr id="2" name="Picture 1">
+          <p:cNvPr id="15" name="Picture 14">
             <a:extLst>
               <a:ext uri="{FF2B5EF4-FFF2-40B4-BE49-F238E27FC236}">
-                <a16:creationId xmlns:a16="http://schemas.microsoft.com/office/drawing/2014/main" id="{D9A08261-73AC-44DE-8AF8-0C737164A33A}"/>
+                <a16:creationId xmlns:a16="http://schemas.microsoft.com/office/drawing/2014/main" id="{E12D8DC1-C99F-44B2-82B0-36EC1D35DBD9}"/>
               </a:ext>
             </a:extLst>
           </p:cNvPr>
@@ -5481,15 +5631,15 @@
           <p:nvPr/>
         </p:nvPicPr>
         <p:blipFill>
-          <a:blip r:embed="rId4"/>
+          <a:blip r:embed="rId5"/>
           <a:stretch>
             <a:fillRect/>
           </a:stretch>
         </p:blipFill>
         <p:spPr>
           <a:xfrm>
-            <a:off x="6972666" y="748252"/>
-            <a:ext cx="3134380" cy="2001294"/>
+            <a:off x="2261167" y="1109485"/>
+            <a:ext cx="3508382" cy="2114715"/>
           </a:xfrm>
           <a:prstGeom prst="rect">
             <a:avLst/>
@@ -5510,10 +5660,10 @@
       </p:pic>
       <p:sp>
         <p:nvSpPr>
-          <p:cNvPr id="3" name="TextBox 2">
+          <p:cNvPr id="17" name="TextBox 16">
             <a:extLst>
               <a:ext uri="{FF2B5EF4-FFF2-40B4-BE49-F238E27FC236}">
-                <a16:creationId xmlns:a16="http://schemas.microsoft.com/office/drawing/2014/main" id="{0AF3E9BB-D449-412D-BA81-5E4680D0227E}"/>
+                <a16:creationId xmlns:a16="http://schemas.microsoft.com/office/drawing/2014/main" id="{59E42BF4-348C-44AB-BF0A-3016E7087B89}"/>
               </a:ext>
             </a:extLst>
           </p:cNvPr>
@@ -5522,8 +5672,8 @@
         </p:nvSpPr>
         <p:spPr>
           <a:xfrm>
-            <a:off x="7766857" y="287403"/>
-            <a:ext cx="1811414" cy="369332"/>
+            <a:off x="6798842" y="688462"/>
+            <a:ext cx="1903728" cy="338554"/>
           </a:xfrm>
           <a:prstGeom prst="rect">
             <a:avLst/>
@@ -5537,18 +5687,88 @@
           <a:lstStyle/>
           <a:p>
             <a:r>
-              <a:rPr lang="en-US" dirty="0"/>
-              <a:t>Shape vs. Hour </a:t>
+              <a:rPr lang="en-US" sz="1600" dirty="0"/>
+              <a:t>Day of the Year</a:t>
+            </a:r>
+          </a:p>
+        </p:txBody>
+      </p:sp>
+      <p:sp>
+        <p:nvSpPr>
+          <p:cNvPr id="19" name="TextBox 18">
+            <a:extLst>
+              <a:ext uri="{FF2B5EF4-FFF2-40B4-BE49-F238E27FC236}">
+                <a16:creationId xmlns:a16="http://schemas.microsoft.com/office/drawing/2014/main" id="{02A654C0-13DC-4E96-9C7E-B2B75065C928}"/>
+              </a:ext>
+            </a:extLst>
+          </p:cNvPr>
+          <p:cNvSpPr txBox="1"/>
+          <p:nvPr/>
+        </p:nvSpPr>
+        <p:spPr>
+          <a:xfrm rot="16200000">
+            <a:off x="5730070" y="1605330"/>
+            <a:ext cx="1875934" cy="261610"/>
+          </a:xfrm>
+          <a:prstGeom prst="rect">
+            <a:avLst/>
+          </a:prstGeom>
+          <a:noFill/>
+        </p:spPr>
+        <p:txBody>
+          <a:bodyPr wrap="square" rtlCol="0">
+            <a:spAutoFit/>
+          </a:bodyPr>
+          <a:lstStyle/>
+          <a:p>
+            <a:r>
+              <a:rPr lang="en-US" sz="1100" dirty="0"/>
+              <a:t># of Sightings</a:t>
+            </a:r>
+          </a:p>
+        </p:txBody>
+      </p:sp>
+      <p:sp>
+        <p:nvSpPr>
+          <p:cNvPr id="20" name="TextBox 19">
+            <a:extLst>
+              <a:ext uri="{FF2B5EF4-FFF2-40B4-BE49-F238E27FC236}">
+                <a16:creationId xmlns:a16="http://schemas.microsoft.com/office/drawing/2014/main" id="{34EBD0DF-BC05-41C1-A32D-93BB2D58A31F}"/>
+              </a:ext>
+            </a:extLst>
+          </p:cNvPr>
+          <p:cNvSpPr txBox="1"/>
+          <p:nvPr/>
+        </p:nvSpPr>
+        <p:spPr>
+          <a:xfrm rot="16200000">
+            <a:off x="5661212" y="4378801"/>
+            <a:ext cx="1875934" cy="261610"/>
+          </a:xfrm>
+          <a:prstGeom prst="rect">
+            <a:avLst/>
+          </a:prstGeom>
+          <a:noFill/>
+        </p:spPr>
+        <p:txBody>
+          <a:bodyPr wrap="square" rtlCol="0">
+            <a:spAutoFit/>
+          </a:bodyPr>
+          <a:lstStyle/>
+          <a:p>
+            <a:r>
+              <a:rPr lang="en-US" sz="1100" dirty="0"/>
+              <a:t># of Sightings</a:t>
             </a:r>
           </a:p>
         </p:txBody>
       </p:sp>
       <p:pic>
         <p:nvPicPr>
-          <p:cNvPr id="4" name="Picture 3">
+          <p:cNvPr id="6" name="Picture 5">
             <a:extLst>
               <a:ext uri="{FF2B5EF4-FFF2-40B4-BE49-F238E27FC236}">
-                <a16:creationId xmlns:a16="http://schemas.microsoft.com/office/drawing/2014/main" id="{6A197149-6BF5-40E8-BEB0-585DBFD01640}"/>
+                <a16:creationId xmlns:a16="http://schemas.microsoft.com/office/drawing/2014/main" id="{C658D38E-A6F9-4BD7-B2B6-ECE3457955AF}"/>
               </a:ext>
             </a:extLst>
           </p:cNvPr>
@@ -5558,15 +5778,15 @@
           <p:nvPr/>
         </p:nvPicPr>
         <p:blipFill>
-          <a:blip r:embed="rId5"/>
+          <a:blip r:embed="rId6"/>
           <a:stretch>
             <a:fillRect/>
           </a:stretch>
         </p:blipFill>
         <p:spPr>
           <a:xfrm>
-            <a:off x="1177124" y="1236759"/>
-            <a:ext cx="5270810" cy="4698179"/>
+            <a:off x="6755517" y="3750093"/>
+            <a:ext cx="3232258" cy="2631903"/>
           </a:xfrm>
           <a:prstGeom prst="rect">
             <a:avLst/>
@@ -5585,81 +5805,94 @@
           </a:effectLst>
         </p:spPr>
       </p:pic>
-      <p:sp>
-        <p:nvSpPr>
-          <p:cNvPr id="7" name="TextBox 6">
+      <p:pic>
+        <p:nvPicPr>
+          <p:cNvPr id="8" name="Picture 7">
             <a:extLst>
               <a:ext uri="{FF2B5EF4-FFF2-40B4-BE49-F238E27FC236}">
-                <a16:creationId xmlns:a16="http://schemas.microsoft.com/office/drawing/2014/main" id="{4E30BC1A-8EB7-4605-95F1-866952A6E84C}"/>
+                <a16:creationId xmlns:a16="http://schemas.microsoft.com/office/drawing/2014/main" id="{E15C4531-C382-4146-9AF8-10B1E74D75F3}"/>
               </a:ext>
             </a:extLst>
           </p:cNvPr>
-          <p:cNvSpPr txBox="1"/>
+          <p:cNvPicPr>
+            <a:picLocks noChangeAspect="1"/>
+          </p:cNvPicPr>
           <p:nvPr/>
-        </p:nvSpPr>
-        <p:spPr>
-          <a:xfrm>
-            <a:off x="1359084" y="163477"/>
-            <a:ext cx="4178115" cy="584775"/>
+        </p:nvPicPr>
+        <p:blipFill>
+          <a:blip r:embed="rId7"/>
+          <a:stretch>
+            <a:fillRect/>
+          </a:stretch>
+        </p:blipFill>
+        <p:spPr>
+          <a:xfrm>
+            <a:off x="6841144" y="1022521"/>
+            <a:ext cx="3146631" cy="2263841"/>
           </a:xfrm>
           <a:prstGeom prst="rect">
             <a:avLst/>
           </a:prstGeom>
-          <a:noFill/>
-        </p:spPr>
-        <p:txBody>
-          <a:bodyPr wrap="square" rtlCol="0">
-            <a:spAutoFit/>
-          </a:bodyPr>
-          <a:lstStyle/>
-          <a:p>
-            <a:r>
-              <a:rPr lang="en-US" sz="3200" dirty="0"/>
-              <a:t>What Will I See?</a:t>
-            </a:r>
-            <a:endParaRPr lang="en-US" sz="2800" dirty="0"/>
-          </a:p>
-        </p:txBody>
-      </p:sp>
-      <p:sp>
-        <p:nvSpPr>
-          <p:cNvPr id="8" name="TextBox 7">
+          <a:ln>
+            <a:solidFill>
+              <a:schemeClr val="tx1"/>
+            </a:solidFill>
+          </a:ln>
+          <a:effectLst>
+            <a:outerShdw blurRad="50800" dist="38100" dir="2700000" algn="tl" rotWithShape="0">
+              <a:prstClr val="black">
+                <a:alpha val="40000"/>
+              </a:prstClr>
+            </a:outerShdw>
+          </a:effectLst>
+        </p:spPr>
+      </p:pic>
+      <p:pic>
+        <p:nvPicPr>
+          <p:cNvPr id="16" name="Picture 15">
             <a:extLst>
               <a:ext uri="{FF2B5EF4-FFF2-40B4-BE49-F238E27FC236}">
-                <a16:creationId xmlns:a16="http://schemas.microsoft.com/office/drawing/2014/main" id="{62E91285-6727-49C8-AA29-97921253FC8B}"/>
+                <a16:creationId xmlns:a16="http://schemas.microsoft.com/office/drawing/2014/main" id="{6EC2C3AB-4C29-42F7-A5E6-D422385D6A7A}"/>
               </a:ext>
             </a:extLst>
           </p:cNvPr>
-          <p:cNvSpPr txBox="1"/>
+          <p:cNvPicPr>
+            <a:picLocks noChangeAspect="1"/>
+          </p:cNvPicPr>
           <p:nvPr/>
-        </p:nvSpPr>
-        <p:spPr>
-          <a:xfrm>
-            <a:off x="3078272" y="867427"/>
-            <a:ext cx="1811414" cy="369332"/>
+        </p:nvPicPr>
+        <p:blipFill>
+          <a:blip r:embed="rId8"/>
+          <a:stretch>
+            <a:fillRect/>
+          </a:stretch>
+        </p:blipFill>
+        <p:spPr>
+          <a:xfrm>
+            <a:off x="2239869" y="3852318"/>
+            <a:ext cx="3770155" cy="2441683"/>
           </a:xfrm>
           <a:prstGeom prst="rect">
             <a:avLst/>
           </a:prstGeom>
-          <a:noFill/>
-        </p:spPr>
-        <p:txBody>
-          <a:bodyPr wrap="square" rtlCol="0">
-            <a:spAutoFit/>
-          </a:bodyPr>
-          <a:lstStyle/>
-          <a:p>
-            <a:r>
-              <a:rPr lang="en-US" dirty="0"/>
-              <a:t>Type of Shape</a:t>
-            </a:r>
-          </a:p>
-        </p:txBody>
-      </p:sp>
+          <a:ln>
+            <a:solidFill>
+              <a:schemeClr val="tx1"/>
+            </a:solidFill>
+          </a:ln>
+          <a:effectLst>
+            <a:outerShdw blurRad="50800" dist="38100" dir="2700000" algn="tl" rotWithShape="0">
+              <a:prstClr val="black">
+                <a:alpha val="40000"/>
+              </a:prstClr>
+            </a:outerShdw>
+          </a:effectLst>
+        </p:spPr>
+      </p:pic>
     </p:spTree>
     <p:extLst>
       <p:ext uri="{BB962C8B-B14F-4D97-AF65-F5344CB8AC3E}">
-        <p14:creationId xmlns:p14="http://schemas.microsoft.com/office/powerpoint/2010/main" val="432204030"/>
+        <p14:creationId xmlns:p14="http://schemas.microsoft.com/office/powerpoint/2010/main" val="637454812"/>
       </p:ext>
     </p:extLst>
   </p:cSld>
@@ -5686,6 +5919,580 @@
           <a:chExt cx="0" cy="0"/>
         </a:xfrm>
       </p:grpSpPr>
+      <p:pic>
+        <p:nvPicPr>
+          <p:cNvPr id="7" name="Graphic 6" descr="Rocket">
+            <a:extLst>
+              <a:ext uri="{FF2B5EF4-FFF2-40B4-BE49-F238E27FC236}">
+                <a16:creationId xmlns:a16="http://schemas.microsoft.com/office/drawing/2014/main" id="{2345638A-5A70-4DDF-A4A4-21E89C25DB8E}"/>
+              </a:ext>
+            </a:extLst>
+          </p:cNvPr>
+          <p:cNvPicPr>
+            <a:picLocks noChangeAspect="1"/>
+          </p:cNvPicPr>
+          <p:nvPr/>
+        </p:nvPicPr>
+        <p:blipFill>
+          <a:blip r:embed="rId2">
+            <a:extLst>
+              <a:ext uri="{28A0092B-C50C-407E-A947-70E740481C1C}">
+                <a14:useLocalDpi xmlns:a14="http://schemas.microsoft.com/office/drawing/2010/main" val="0"/>
+              </a:ext>
+              <a:ext uri="{96DAC541-7B7A-43D3-8B79-37D633B846F1}">
+                <asvg:svgBlip xmlns:asvg="http://schemas.microsoft.com/office/drawing/2016/SVG/main" r:embed="rId3"/>
+              </a:ext>
+            </a:extLst>
+          </a:blip>
+          <a:stretch>
+            <a:fillRect/>
+          </a:stretch>
+        </p:blipFill>
+        <p:spPr>
+          <a:xfrm>
+            <a:off x="9987775" y="4897243"/>
+            <a:ext cx="1832518" cy="1832518"/>
+          </a:xfrm>
+          <a:prstGeom prst="rect">
+            <a:avLst/>
+          </a:prstGeom>
+        </p:spPr>
+      </p:pic>
+      <p:pic>
+        <p:nvPicPr>
+          <p:cNvPr id="2" name="Picture 1">
+            <a:extLst>
+              <a:ext uri="{FF2B5EF4-FFF2-40B4-BE49-F238E27FC236}">
+                <a16:creationId xmlns:a16="http://schemas.microsoft.com/office/drawing/2014/main" id="{B707F0C1-775E-4208-A6C9-2083B3D421B5}"/>
+              </a:ext>
+            </a:extLst>
+          </p:cNvPr>
+          <p:cNvPicPr>
+            <a:picLocks noChangeAspect="1"/>
+          </p:cNvPicPr>
+          <p:nvPr/>
+        </p:nvPicPr>
+        <p:blipFill rotWithShape="1">
+          <a:blip r:embed="rId4"/>
+          <a:srcRect l="3356" r="4979"/>
+          <a:stretch/>
+        </p:blipFill>
+        <p:spPr>
+          <a:xfrm>
+            <a:off x="6298098" y="1960757"/>
+            <a:ext cx="4724649" cy="3028419"/>
+          </a:xfrm>
+          <a:prstGeom prst="rect">
+            <a:avLst/>
+          </a:prstGeom>
+          <a:ln>
+            <a:solidFill>
+              <a:schemeClr val="tx2"/>
+            </a:solidFill>
+          </a:ln>
+          <a:effectLst>
+            <a:outerShdw blurRad="50800" dist="38100" dir="2700000" algn="tl" rotWithShape="0">
+              <a:prstClr val="black">
+                <a:alpha val="40000"/>
+              </a:prstClr>
+            </a:outerShdw>
+          </a:effectLst>
+        </p:spPr>
+      </p:pic>
+      <p:sp>
+        <p:nvSpPr>
+          <p:cNvPr id="3" name="TextBox 2">
+            <a:extLst>
+              <a:ext uri="{FF2B5EF4-FFF2-40B4-BE49-F238E27FC236}">
+                <a16:creationId xmlns:a16="http://schemas.microsoft.com/office/drawing/2014/main" id="{5D3BF25A-6EFB-4B14-92F1-5D897A4AC159}"/>
+              </a:ext>
+            </a:extLst>
+          </p:cNvPr>
+          <p:cNvSpPr txBox="1"/>
+          <p:nvPr/>
+        </p:nvSpPr>
+        <p:spPr>
+          <a:xfrm>
+            <a:off x="6289565" y="1603658"/>
+            <a:ext cx="3362479" cy="338554"/>
+          </a:xfrm>
+          <a:prstGeom prst="rect">
+            <a:avLst/>
+          </a:prstGeom>
+          <a:noFill/>
+        </p:spPr>
+        <p:txBody>
+          <a:bodyPr wrap="square" rtlCol="0">
+            <a:spAutoFit/>
+          </a:bodyPr>
+          <a:lstStyle/>
+          <a:p>
+            <a:r>
+              <a:rPr lang="en-US" sz="1600" dirty="0"/>
+              <a:t>Day of the Week vs. Month</a:t>
+            </a:r>
+          </a:p>
+        </p:txBody>
+      </p:sp>
+      <p:pic>
+        <p:nvPicPr>
+          <p:cNvPr id="4" name="Picture 3">
+            <a:extLst>
+              <a:ext uri="{FF2B5EF4-FFF2-40B4-BE49-F238E27FC236}">
+                <a16:creationId xmlns:a16="http://schemas.microsoft.com/office/drawing/2014/main" id="{0B095A7C-DAFC-4F18-857D-6172CD7D5A11}"/>
+              </a:ext>
+            </a:extLst>
+          </p:cNvPr>
+          <p:cNvPicPr>
+            <a:picLocks noChangeAspect="1"/>
+          </p:cNvPicPr>
+          <p:nvPr/>
+        </p:nvPicPr>
+        <p:blipFill>
+          <a:blip r:embed="rId5"/>
+          <a:stretch>
+            <a:fillRect/>
+          </a:stretch>
+        </p:blipFill>
+        <p:spPr>
+          <a:xfrm>
+            <a:off x="1626831" y="1900158"/>
+            <a:ext cx="4267073" cy="3429679"/>
+          </a:xfrm>
+          <a:prstGeom prst="rect">
+            <a:avLst/>
+          </a:prstGeom>
+          <a:ln>
+            <a:solidFill>
+              <a:schemeClr val="tx2"/>
+            </a:solidFill>
+          </a:ln>
+          <a:effectLst>
+            <a:outerShdw blurRad="50800" dist="38100" dir="2700000" algn="tl" rotWithShape="0">
+              <a:prstClr val="black">
+                <a:alpha val="40000"/>
+              </a:prstClr>
+            </a:outerShdw>
+          </a:effectLst>
+        </p:spPr>
+      </p:pic>
+      <p:sp>
+        <p:nvSpPr>
+          <p:cNvPr id="5" name="TextBox 4">
+            <a:extLst>
+              <a:ext uri="{FF2B5EF4-FFF2-40B4-BE49-F238E27FC236}">
+                <a16:creationId xmlns:a16="http://schemas.microsoft.com/office/drawing/2014/main" id="{CD251D4B-2747-44C5-820F-CFDD74DCF907}"/>
+              </a:ext>
+            </a:extLst>
+          </p:cNvPr>
+          <p:cNvSpPr txBox="1"/>
+          <p:nvPr/>
+        </p:nvSpPr>
+        <p:spPr>
+          <a:xfrm>
+            <a:off x="1617405" y="1574672"/>
+            <a:ext cx="3362479" cy="338554"/>
+          </a:xfrm>
+          <a:prstGeom prst="rect">
+            <a:avLst/>
+          </a:prstGeom>
+          <a:noFill/>
+        </p:spPr>
+        <p:txBody>
+          <a:bodyPr wrap="square" rtlCol="0">
+            <a:spAutoFit/>
+          </a:bodyPr>
+          <a:lstStyle/>
+          <a:p>
+            <a:r>
+              <a:rPr lang="en-US" sz="1600" dirty="0"/>
+              <a:t>Hour vs. Day of the Week</a:t>
+            </a:r>
+          </a:p>
+        </p:txBody>
+      </p:sp>
+      <p:sp>
+        <p:nvSpPr>
+          <p:cNvPr id="6" name="TextBox 5">
+            <a:extLst>
+              <a:ext uri="{FF2B5EF4-FFF2-40B4-BE49-F238E27FC236}">
+                <a16:creationId xmlns:a16="http://schemas.microsoft.com/office/drawing/2014/main" id="{099D9FFB-88CD-445A-BF08-589858D83480}"/>
+              </a:ext>
+            </a:extLst>
+          </p:cNvPr>
+          <p:cNvSpPr txBox="1"/>
+          <p:nvPr/>
+        </p:nvSpPr>
+        <p:spPr>
+          <a:xfrm>
+            <a:off x="1359084" y="163477"/>
+            <a:ext cx="5846786" cy="584775"/>
+          </a:xfrm>
+          <a:prstGeom prst="rect">
+            <a:avLst/>
+          </a:prstGeom>
+          <a:noFill/>
+        </p:spPr>
+        <p:txBody>
+          <a:bodyPr wrap="square" rtlCol="0">
+            <a:spAutoFit/>
+          </a:bodyPr>
+          <a:lstStyle/>
+          <a:p>
+            <a:r>
+              <a:rPr lang="en-US" sz="3200" dirty="0"/>
+              <a:t>When Will I See</a:t>
+            </a:r>
+            <a:r>
+              <a:rPr lang="en-US" sz="2800" dirty="0"/>
+              <a:t> </a:t>
+            </a:r>
+            <a:r>
+              <a:rPr lang="en-US" sz="3200" dirty="0"/>
+              <a:t>a UFO (cont.) ?</a:t>
+            </a:r>
+            <a:endParaRPr lang="en-US" sz="2800" dirty="0"/>
+          </a:p>
+        </p:txBody>
+      </p:sp>
+    </p:spTree>
+    <p:extLst>
+      <p:ext uri="{BB962C8B-B14F-4D97-AF65-F5344CB8AC3E}">
+        <p14:creationId xmlns:p14="http://schemas.microsoft.com/office/powerpoint/2010/main" val="931946553"/>
+      </p:ext>
+    </p:extLst>
+  </p:cSld>
+  <p:clrMapOvr>
+    <a:masterClrMapping/>
+  </p:clrMapOvr>
+</p:sld>
+</file>
+
+<file path=ppt/slides/slide12.xml><?xml version="1.0" encoding="utf-8"?>
+<p:sld xmlns:a="http://schemas.openxmlformats.org/drawingml/2006/main" xmlns:r="http://schemas.openxmlformats.org/officeDocument/2006/relationships" xmlns:p="http://schemas.openxmlformats.org/presentationml/2006/main">
+  <p:cSld>
+    <p:spTree>
+      <p:nvGrpSpPr>
+        <p:cNvPr id="1" name=""/>
+        <p:cNvGrpSpPr/>
+        <p:nvPr/>
+      </p:nvGrpSpPr>
+      <p:grpSpPr>
+        <a:xfrm>
+          <a:off x="0" y="0"/>
+          <a:ext cx="0" cy="0"/>
+          <a:chOff x="0" y="0"/>
+          <a:chExt cx="0" cy="0"/>
+        </a:xfrm>
+      </p:grpSpPr>
+      <p:pic>
+        <p:nvPicPr>
+          <p:cNvPr id="6" name="Graphic 5" descr="Rocket">
+            <a:extLst>
+              <a:ext uri="{FF2B5EF4-FFF2-40B4-BE49-F238E27FC236}">
+                <a16:creationId xmlns:a16="http://schemas.microsoft.com/office/drawing/2014/main" id="{A5B04463-13BD-4A78-BE3D-A05A69074A05}"/>
+              </a:ext>
+            </a:extLst>
+          </p:cNvPr>
+          <p:cNvPicPr>
+            <a:picLocks noChangeAspect="1"/>
+          </p:cNvPicPr>
+          <p:nvPr/>
+        </p:nvPicPr>
+        <p:blipFill>
+          <a:blip r:embed="rId2">
+            <a:extLst>
+              <a:ext uri="{28A0092B-C50C-407E-A947-70E740481C1C}">
+                <a14:useLocalDpi xmlns:a14="http://schemas.microsoft.com/office/drawing/2010/main" val="0"/>
+              </a:ext>
+              <a:ext uri="{96DAC541-7B7A-43D3-8B79-37D633B846F1}">
+                <asvg:svgBlip xmlns:asvg="http://schemas.microsoft.com/office/drawing/2016/SVG/main" r:embed="rId3"/>
+              </a:ext>
+            </a:extLst>
+          </a:blip>
+          <a:stretch>
+            <a:fillRect/>
+          </a:stretch>
+        </p:blipFill>
+        <p:spPr>
+          <a:xfrm>
+            <a:off x="9987775" y="4925523"/>
+            <a:ext cx="1832518" cy="1832518"/>
+          </a:xfrm>
+          <a:prstGeom prst="rect">
+            <a:avLst/>
+          </a:prstGeom>
+        </p:spPr>
+      </p:pic>
+      <p:pic>
+        <p:nvPicPr>
+          <p:cNvPr id="2" name="Picture 1">
+            <a:extLst>
+              <a:ext uri="{FF2B5EF4-FFF2-40B4-BE49-F238E27FC236}">
+                <a16:creationId xmlns:a16="http://schemas.microsoft.com/office/drawing/2014/main" id="{D9A08261-73AC-44DE-8AF8-0C737164A33A}"/>
+              </a:ext>
+            </a:extLst>
+          </p:cNvPr>
+          <p:cNvPicPr>
+            <a:picLocks noChangeAspect="1"/>
+          </p:cNvPicPr>
+          <p:nvPr/>
+        </p:nvPicPr>
+        <p:blipFill>
+          <a:blip r:embed="rId4"/>
+          <a:stretch>
+            <a:fillRect/>
+          </a:stretch>
+        </p:blipFill>
+        <p:spPr>
+          <a:xfrm>
+            <a:off x="6972666" y="748252"/>
+            <a:ext cx="3134380" cy="2001294"/>
+          </a:xfrm>
+          <a:prstGeom prst="rect">
+            <a:avLst/>
+          </a:prstGeom>
+          <a:ln>
+            <a:solidFill>
+              <a:schemeClr val="tx2"/>
+            </a:solidFill>
+          </a:ln>
+          <a:effectLst>
+            <a:outerShdw blurRad="50800" dist="38100" dir="2700000" algn="tl" rotWithShape="0">
+              <a:prstClr val="black">
+                <a:alpha val="40000"/>
+              </a:prstClr>
+            </a:outerShdw>
+          </a:effectLst>
+        </p:spPr>
+      </p:pic>
+      <p:sp>
+        <p:nvSpPr>
+          <p:cNvPr id="3" name="TextBox 2">
+            <a:extLst>
+              <a:ext uri="{FF2B5EF4-FFF2-40B4-BE49-F238E27FC236}">
+                <a16:creationId xmlns:a16="http://schemas.microsoft.com/office/drawing/2014/main" id="{0AF3E9BB-D449-412D-BA81-5E4680D0227E}"/>
+              </a:ext>
+            </a:extLst>
+          </p:cNvPr>
+          <p:cNvSpPr txBox="1"/>
+          <p:nvPr/>
+        </p:nvSpPr>
+        <p:spPr>
+          <a:xfrm>
+            <a:off x="7766857" y="287403"/>
+            <a:ext cx="1811414" cy="369332"/>
+          </a:xfrm>
+          <a:prstGeom prst="rect">
+            <a:avLst/>
+          </a:prstGeom>
+          <a:noFill/>
+        </p:spPr>
+        <p:txBody>
+          <a:bodyPr wrap="square" rtlCol="0">
+            <a:spAutoFit/>
+          </a:bodyPr>
+          <a:lstStyle/>
+          <a:p>
+            <a:r>
+              <a:rPr lang="en-US" dirty="0"/>
+              <a:t>Shape vs. Hour </a:t>
+            </a:r>
+          </a:p>
+        </p:txBody>
+      </p:sp>
+      <p:pic>
+        <p:nvPicPr>
+          <p:cNvPr id="4" name="Picture 3">
+            <a:extLst>
+              <a:ext uri="{FF2B5EF4-FFF2-40B4-BE49-F238E27FC236}">
+                <a16:creationId xmlns:a16="http://schemas.microsoft.com/office/drawing/2014/main" id="{6A197149-6BF5-40E8-BEB0-585DBFD01640}"/>
+              </a:ext>
+            </a:extLst>
+          </p:cNvPr>
+          <p:cNvPicPr>
+            <a:picLocks noChangeAspect="1"/>
+          </p:cNvPicPr>
+          <p:nvPr/>
+        </p:nvPicPr>
+        <p:blipFill>
+          <a:blip r:embed="rId5"/>
+          <a:stretch>
+            <a:fillRect/>
+          </a:stretch>
+        </p:blipFill>
+        <p:spPr>
+          <a:xfrm>
+            <a:off x="1177124" y="1236759"/>
+            <a:ext cx="5270810" cy="4698179"/>
+          </a:xfrm>
+          <a:prstGeom prst="rect">
+            <a:avLst/>
+          </a:prstGeom>
+          <a:ln>
+            <a:solidFill>
+              <a:schemeClr val="tx1"/>
+            </a:solidFill>
+          </a:ln>
+          <a:effectLst>
+            <a:outerShdw blurRad="50800" dist="38100" dir="2700000" algn="tl" rotWithShape="0">
+              <a:prstClr val="black">
+                <a:alpha val="40000"/>
+              </a:prstClr>
+            </a:outerShdw>
+          </a:effectLst>
+        </p:spPr>
+      </p:pic>
+      <p:sp>
+        <p:nvSpPr>
+          <p:cNvPr id="7" name="TextBox 6">
+            <a:extLst>
+              <a:ext uri="{FF2B5EF4-FFF2-40B4-BE49-F238E27FC236}">
+                <a16:creationId xmlns:a16="http://schemas.microsoft.com/office/drawing/2014/main" id="{4E30BC1A-8EB7-4605-95F1-866952A6E84C}"/>
+              </a:ext>
+            </a:extLst>
+          </p:cNvPr>
+          <p:cNvSpPr txBox="1"/>
+          <p:nvPr/>
+        </p:nvSpPr>
+        <p:spPr>
+          <a:xfrm>
+            <a:off x="1359084" y="163477"/>
+            <a:ext cx="4178115" cy="584775"/>
+          </a:xfrm>
+          <a:prstGeom prst="rect">
+            <a:avLst/>
+          </a:prstGeom>
+          <a:noFill/>
+        </p:spPr>
+        <p:txBody>
+          <a:bodyPr wrap="square" rtlCol="0">
+            <a:spAutoFit/>
+          </a:bodyPr>
+          <a:lstStyle/>
+          <a:p>
+            <a:r>
+              <a:rPr lang="en-US" sz="3200" dirty="0"/>
+              <a:t>What Will I See?</a:t>
+            </a:r>
+            <a:endParaRPr lang="en-US" sz="2800" dirty="0"/>
+          </a:p>
+        </p:txBody>
+      </p:sp>
+      <p:sp>
+        <p:nvSpPr>
+          <p:cNvPr id="8" name="TextBox 7">
+            <a:extLst>
+              <a:ext uri="{FF2B5EF4-FFF2-40B4-BE49-F238E27FC236}">
+                <a16:creationId xmlns:a16="http://schemas.microsoft.com/office/drawing/2014/main" id="{62E91285-6727-49C8-AA29-97921253FC8B}"/>
+              </a:ext>
+            </a:extLst>
+          </p:cNvPr>
+          <p:cNvSpPr txBox="1"/>
+          <p:nvPr/>
+        </p:nvSpPr>
+        <p:spPr>
+          <a:xfrm>
+            <a:off x="3078272" y="867427"/>
+            <a:ext cx="1811414" cy="369332"/>
+          </a:xfrm>
+          <a:prstGeom prst="rect">
+            <a:avLst/>
+          </a:prstGeom>
+          <a:noFill/>
+        </p:spPr>
+        <p:txBody>
+          <a:bodyPr wrap="square" rtlCol="0">
+            <a:spAutoFit/>
+          </a:bodyPr>
+          <a:lstStyle/>
+          <a:p>
+            <a:r>
+              <a:rPr lang="en-US" dirty="0"/>
+              <a:t>Type of Shape</a:t>
+            </a:r>
+          </a:p>
+        </p:txBody>
+      </p:sp>
+      <p:pic>
+        <p:nvPicPr>
+          <p:cNvPr id="9" name="Picture 8">
+            <a:extLst>
+              <a:ext uri="{FF2B5EF4-FFF2-40B4-BE49-F238E27FC236}">
+                <a16:creationId xmlns:a16="http://schemas.microsoft.com/office/drawing/2014/main" id="{0BD4BB55-5308-487D-AAF1-52D61CAB2CD9}"/>
+              </a:ext>
+            </a:extLst>
+          </p:cNvPr>
+          <p:cNvPicPr>
+            <a:picLocks noChangeAspect="1"/>
+          </p:cNvPicPr>
+          <p:nvPr/>
+        </p:nvPicPr>
+        <p:blipFill rotWithShape="1">
+          <a:blip r:embed="rId6">
+            <a:extLst>
+              <a:ext uri="{28A0092B-C50C-407E-A947-70E740481C1C}">
+                <a14:useLocalDpi xmlns:a14="http://schemas.microsoft.com/office/drawing/2010/main" val="0"/>
+              </a:ext>
+            </a:extLst>
+          </a:blip>
+          <a:srcRect l="4530" t="8001" r="13730" b="7282"/>
+          <a:stretch/>
+        </p:blipFill>
+        <p:spPr>
+          <a:xfrm>
+            <a:off x="6682354" y="2902314"/>
+            <a:ext cx="4332522" cy="3207434"/>
+          </a:xfrm>
+          <a:prstGeom prst="rect">
+            <a:avLst/>
+          </a:prstGeom>
+          <a:ln w="38100" cap="sq">
+            <a:solidFill>
+              <a:srgbClr val="000000"/>
+            </a:solidFill>
+            <a:prstDash val="solid"/>
+            <a:miter lim="800000"/>
+          </a:ln>
+          <a:effectLst>
+            <a:outerShdw blurRad="50800" dist="38100" dir="2700000" algn="tl" rotWithShape="0">
+              <a:srgbClr val="000000">
+                <a:alpha val="43000"/>
+              </a:srgbClr>
+            </a:outerShdw>
+          </a:effectLst>
+        </p:spPr>
+      </p:pic>
+    </p:spTree>
+    <p:extLst>
+      <p:ext uri="{BB962C8B-B14F-4D97-AF65-F5344CB8AC3E}">
+        <p14:creationId xmlns:p14="http://schemas.microsoft.com/office/powerpoint/2010/main" val="432204030"/>
+      </p:ext>
+    </p:extLst>
+  </p:cSld>
+  <p:clrMapOvr>
+    <a:masterClrMapping/>
+  </p:clrMapOvr>
+</p:sld>
+</file>
+
+<file path=ppt/slides/slide13.xml><?xml version="1.0" encoding="utf-8"?>
+<p:sld xmlns:a="http://schemas.openxmlformats.org/drawingml/2006/main" xmlns:r="http://schemas.openxmlformats.org/officeDocument/2006/relationships" xmlns:p="http://schemas.openxmlformats.org/presentationml/2006/main">
+  <p:cSld>
+    <p:spTree>
+      <p:nvGrpSpPr>
+        <p:cNvPr id="1" name=""/>
+        <p:cNvGrpSpPr/>
+        <p:nvPr/>
+      </p:nvGrpSpPr>
+      <p:grpSpPr>
+        <a:xfrm>
+          <a:off x="0" y="0"/>
+          <a:ext cx="0" cy="0"/>
+          <a:chOff x="0" y="0"/>
+          <a:chExt cx="0" cy="0"/>
+        </a:xfrm>
+      </p:grpSpPr>
       <p:sp>
         <p:nvSpPr>
           <p:cNvPr id="4" name="Title 3">
@@ -5727,7 +6534,7 @@
 </p:sld>
 </file>
 
-<file path=ppt/slides/slide12.xml><?xml version="1.0" encoding="utf-8"?>
+<file path=ppt/slides/slide14.xml><?xml version="1.0" encoding="utf-8"?>
 <p:sld xmlns:a="http://schemas.openxmlformats.org/drawingml/2006/main" xmlns:r="http://schemas.openxmlformats.org/officeDocument/2006/relationships" xmlns:p="http://schemas.openxmlformats.org/presentationml/2006/main">
   <p:cSld>
     <p:spTree>
@@ -8586,7 +9393,7 @@
 </p:sld>
 </file>
 
-<file path=ppt/slides/slide13.xml><?xml version="1.0" encoding="utf-8"?>
+<file path=ppt/slides/slide15.xml><?xml version="1.0" encoding="utf-8"?>
 <p:sld xmlns:a="http://schemas.openxmlformats.org/drawingml/2006/main" xmlns:r="http://schemas.openxmlformats.org/officeDocument/2006/relationships" xmlns:p="http://schemas.openxmlformats.org/presentationml/2006/main">
   <p:cSld>
     <p:spTree>
@@ -9284,7 +10091,7 @@
 </p:sld>
 </file>
 
-<file path=ppt/slides/slide14.xml><?xml version="1.0" encoding="utf-8"?>
+<file path=ppt/slides/slide16.xml><?xml version="1.0" encoding="utf-8"?>
 <p:sld xmlns:a="http://schemas.openxmlformats.org/drawingml/2006/main" xmlns:r="http://schemas.openxmlformats.org/officeDocument/2006/relationships" xmlns:p="http://schemas.openxmlformats.org/presentationml/2006/main">
   <p:cSld>
     <p:spTree>
@@ -9982,7 +10789,7 @@
 </p:sld>
 </file>
 
-<file path=ppt/slides/slide15.xml><?xml version="1.0" encoding="utf-8"?>
+<file path=ppt/slides/slide17.xml><?xml version="1.0" encoding="utf-8"?>
 <p:sld xmlns:a="http://schemas.openxmlformats.org/drawingml/2006/main" xmlns:r="http://schemas.openxmlformats.org/officeDocument/2006/relationships" xmlns:p="http://schemas.openxmlformats.org/presentationml/2006/main">
   <p:cSld>
     <p:spTree>
@@ -10523,7 +11330,7 @@
 </p:sld>
 </file>
 
-<file path=ppt/slides/slide16.xml><?xml version="1.0" encoding="utf-8"?>
+<file path=ppt/slides/slide18.xml><?xml version="1.0" encoding="utf-8"?>
 <p:sld xmlns:a="http://schemas.openxmlformats.org/drawingml/2006/main" xmlns:r="http://schemas.openxmlformats.org/officeDocument/2006/relationships" xmlns:p="http://schemas.openxmlformats.org/presentationml/2006/main">
   <p:cSld>
     <p:spTree>
@@ -10976,7 +11783,7 @@
 </p:sld>
 </file>
 
-<file path=ppt/slides/slide17.xml><?xml version="1.0" encoding="utf-8"?>
+<file path=ppt/slides/slide19.xml><?xml version="1.0" encoding="utf-8"?>
 <p:sld xmlns:a="http://schemas.openxmlformats.org/drawingml/2006/main" xmlns:r="http://schemas.openxmlformats.org/officeDocument/2006/relationships" xmlns:p="http://schemas.openxmlformats.org/presentationml/2006/main">
   <p:cSld>
     <p:spTree>
@@ -11310,397 +12117,6 @@
     <p:extLst>
       <p:ext uri="{BB962C8B-B14F-4D97-AF65-F5344CB8AC3E}">
         <p14:creationId xmlns:p14="http://schemas.microsoft.com/office/powerpoint/2010/main" val="2394856872"/>
-      </p:ext>
-    </p:extLst>
-  </p:cSld>
-  <p:clrMapOvr>
-    <a:masterClrMapping/>
-  </p:clrMapOvr>
-</p:sld>
-</file>
-
-<file path=ppt/slides/slide18.xml><?xml version="1.0" encoding="utf-8"?>
-<p:sld xmlns:a="http://schemas.openxmlformats.org/drawingml/2006/main" xmlns:r="http://schemas.openxmlformats.org/officeDocument/2006/relationships" xmlns:p="http://schemas.openxmlformats.org/presentationml/2006/main">
-  <p:cSld>
-    <p:spTree>
-      <p:nvGrpSpPr>
-        <p:cNvPr id="1" name=""/>
-        <p:cNvGrpSpPr/>
-        <p:nvPr/>
-      </p:nvGrpSpPr>
-      <p:grpSpPr>
-        <a:xfrm>
-          <a:off x="0" y="0"/>
-          <a:ext cx="0" cy="0"/>
-          <a:chOff x="0" y="0"/>
-          <a:chExt cx="0" cy="0"/>
-        </a:xfrm>
-      </p:grpSpPr>
-      <p:sp>
-        <p:nvSpPr>
-          <p:cNvPr id="3" name="Title 2">
-            <a:extLst>
-              <a:ext uri="{FF2B5EF4-FFF2-40B4-BE49-F238E27FC236}">
-                <a16:creationId xmlns:a16="http://schemas.microsoft.com/office/drawing/2014/main" id="{81957D48-6A39-4510-9652-BC2EDBD270BC}"/>
-              </a:ext>
-            </a:extLst>
-          </p:cNvPr>
-          <p:cNvSpPr>
-            <a:spLocks noGrp="1"/>
-          </p:cNvSpPr>
-          <p:nvPr>
-            <p:ph type="title"/>
-          </p:nvPr>
-        </p:nvSpPr>
-        <p:spPr/>
-        <p:txBody>
-          <a:bodyPr/>
-          <a:lstStyle/>
-          <a:p>
-            <a:r>
-              <a:rPr lang="en-US" dirty="0"/>
-              <a:t>Conclusion</a:t>
-            </a:r>
-          </a:p>
-        </p:txBody>
-      </p:sp>
-    </p:spTree>
-    <p:extLst>
-      <p:ext uri="{BB962C8B-B14F-4D97-AF65-F5344CB8AC3E}">
-        <p14:creationId xmlns:p14="http://schemas.microsoft.com/office/powerpoint/2010/main" val="2479365765"/>
-      </p:ext>
-    </p:extLst>
-  </p:cSld>
-  <p:clrMapOvr>
-    <a:masterClrMapping/>
-  </p:clrMapOvr>
-</p:sld>
-</file>
-
-<file path=ppt/slides/slide19.xml><?xml version="1.0" encoding="utf-8"?>
-<p:sld xmlns:a="http://schemas.openxmlformats.org/drawingml/2006/main" xmlns:r="http://schemas.openxmlformats.org/officeDocument/2006/relationships" xmlns:p="http://schemas.openxmlformats.org/presentationml/2006/main">
-  <p:cSld>
-    <p:spTree>
-      <p:nvGrpSpPr>
-        <p:cNvPr id="1" name=""/>
-        <p:cNvGrpSpPr/>
-        <p:nvPr/>
-      </p:nvGrpSpPr>
-      <p:grpSpPr>
-        <a:xfrm>
-          <a:off x="0" y="0"/>
-          <a:ext cx="0" cy="0"/>
-          <a:chOff x="0" y="0"/>
-          <a:chExt cx="0" cy="0"/>
-        </a:xfrm>
-      </p:grpSpPr>
-      <p:pic>
-        <p:nvPicPr>
-          <p:cNvPr id="12" name="Graphic 11" descr="Rocket">
-            <a:extLst>
-              <a:ext uri="{FF2B5EF4-FFF2-40B4-BE49-F238E27FC236}">
-                <a16:creationId xmlns:a16="http://schemas.microsoft.com/office/drawing/2014/main" id="{C5000270-700F-4AE5-B3B6-D4625517C6DF}"/>
-              </a:ext>
-            </a:extLst>
-          </p:cNvPr>
-          <p:cNvPicPr>
-            <a:picLocks noChangeAspect="1"/>
-          </p:cNvPicPr>
-          <p:nvPr/>
-        </p:nvPicPr>
-        <p:blipFill>
-          <a:blip r:embed="rId3">
-            <a:extLst>
-              <a:ext uri="{28A0092B-C50C-407E-A947-70E740481C1C}">
-                <a14:useLocalDpi xmlns:a14="http://schemas.microsoft.com/office/drawing/2010/main" val="0"/>
-              </a:ext>
-              <a:ext uri="{96DAC541-7B7A-43D3-8B79-37D633B846F1}">
-                <asvg:svgBlip xmlns:asvg="http://schemas.microsoft.com/office/drawing/2016/SVG/main" r:embed="rId4"/>
-              </a:ext>
-            </a:extLst>
-          </a:blip>
-          <a:stretch>
-            <a:fillRect/>
-          </a:stretch>
-        </p:blipFill>
-        <p:spPr>
-          <a:xfrm>
-            <a:off x="9987775" y="4897243"/>
-            <a:ext cx="1832518" cy="1832518"/>
-          </a:xfrm>
-          <a:prstGeom prst="rect">
-            <a:avLst/>
-          </a:prstGeom>
-        </p:spPr>
-      </p:pic>
-      <p:sp>
-        <p:nvSpPr>
-          <p:cNvPr id="4" name="Title 3">
-            <a:extLst>
-              <a:ext uri="{FF2B5EF4-FFF2-40B4-BE49-F238E27FC236}">
-                <a16:creationId xmlns:a16="http://schemas.microsoft.com/office/drawing/2014/main" id="{BFEA2C5B-7E39-4AC4-A95E-D982D53A507D}"/>
-              </a:ext>
-            </a:extLst>
-          </p:cNvPr>
-          <p:cNvSpPr>
-            <a:spLocks noGrp="1"/>
-          </p:cNvSpPr>
-          <p:nvPr>
-            <p:ph type="title"/>
-          </p:nvPr>
-        </p:nvSpPr>
-        <p:spPr>
-          <a:xfrm>
-            <a:off x="952084" y="234778"/>
-            <a:ext cx="9601200" cy="940981"/>
-          </a:xfrm>
-        </p:spPr>
-        <p:txBody>
-          <a:bodyPr/>
-          <a:lstStyle/>
-          <a:p>
-            <a:r>
-              <a:rPr lang="en-US" dirty="0"/>
-              <a:t>“Explainable” v “Unexplainable”</a:t>
-            </a:r>
-          </a:p>
-        </p:txBody>
-      </p:sp>
-      <p:pic>
-        <p:nvPicPr>
-          <p:cNvPr id="7" name="Picture 6">
-            <a:extLst>
-              <a:ext uri="{FF2B5EF4-FFF2-40B4-BE49-F238E27FC236}">
-                <a16:creationId xmlns:a16="http://schemas.microsoft.com/office/drawing/2014/main" id="{1144DEC7-62B0-474F-BD09-F93C4076C171}"/>
-              </a:ext>
-            </a:extLst>
-          </p:cNvPr>
-          <p:cNvPicPr>
-            <a:picLocks noChangeAspect="1"/>
-          </p:cNvPicPr>
-          <p:nvPr/>
-        </p:nvPicPr>
-        <p:blipFill>
-          <a:blip r:embed="rId5"/>
-          <a:stretch>
-            <a:fillRect/>
-          </a:stretch>
-        </p:blipFill>
-        <p:spPr>
-          <a:xfrm>
-            <a:off x="952084" y="2179020"/>
-            <a:ext cx="4109487" cy="2980481"/>
-          </a:xfrm>
-          <a:prstGeom prst="rect">
-            <a:avLst/>
-          </a:prstGeom>
-          <a:ln>
-            <a:solidFill>
-              <a:schemeClr val="tx1"/>
-            </a:solidFill>
-          </a:ln>
-          <a:effectLst>
-            <a:outerShdw blurRad="50800" dist="38100" dir="2700000" algn="tl" rotWithShape="0">
-              <a:prstClr val="black">
-                <a:alpha val="40000"/>
-              </a:prstClr>
-            </a:outerShdw>
-          </a:effectLst>
-        </p:spPr>
-      </p:pic>
-      <p:sp>
-        <p:nvSpPr>
-          <p:cNvPr id="9" name="TextBox 8">
-            <a:extLst>
-              <a:ext uri="{FF2B5EF4-FFF2-40B4-BE49-F238E27FC236}">
-                <a16:creationId xmlns:a16="http://schemas.microsoft.com/office/drawing/2014/main" id="{4D8D5A39-AB43-4794-820B-2B688A36EE5D}"/>
-              </a:ext>
-            </a:extLst>
-          </p:cNvPr>
-          <p:cNvSpPr txBox="1"/>
-          <p:nvPr/>
-        </p:nvSpPr>
-        <p:spPr>
-          <a:xfrm>
-            <a:off x="1776401" y="1793711"/>
-            <a:ext cx="2762053" cy="369332"/>
-          </a:xfrm>
-          <a:prstGeom prst="rect">
-            <a:avLst/>
-          </a:prstGeom>
-          <a:noFill/>
-        </p:spPr>
-        <p:txBody>
-          <a:bodyPr wrap="square" rtlCol="0">
-            <a:spAutoFit/>
-          </a:bodyPr>
-          <a:lstStyle/>
-          <a:p>
-            <a:r>
-              <a:rPr lang="en-US" dirty="0"/>
-              <a:t>UFO Shapes</a:t>
-            </a:r>
-          </a:p>
-        </p:txBody>
-      </p:sp>
-      <p:pic>
-        <p:nvPicPr>
-          <p:cNvPr id="10" name="Picture 9">
-            <a:extLst>
-              <a:ext uri="{FF2B5EF4-FFF2-40B4-BE49-F238E27FC236}">
-                <a16:creationId xmlns:a16="http://schemas.microsoft.com/office/drawing/2014/main" id="{4C9CB919-3308-4C40-B933-BF9E481F03EA}"/>
-              </a:ext>
-            </a:extLst>
-          </p:cNvPr>
-          <p:cNvPicPr>
-            <a:picLocks noChangeAspect="1"/>
-          </p:cNvPicPr>
-          <p:nvPr/>
-        </p:nvPicPr>
-        <p:blipFill>
-          <a:blip r:embed="rId6"/>
-          <a:stretch>
-            <a:fillRect/>
-          </a:stretch>
-        </p:blipFill>
-        <p:spPr>
-          <a:xfrm>
-            <a:off x="5355983" y="991170"/>
-            <a:ext cx="5548051" cy="2950444"/>
-          </a:xfrm>
-          <a:prstGeom prst="rect">
-            <a:avLst/>
-          </a:prstGeom>
-          <a:ln>
-            <a:solidFill>
-              <a:schemeClr val="tx1"/>
-            </a:solidFill>
-          </a:ln>
-          <a:effectLst>
-            <a:outerShdw blurRad="50800" dist="38100" dir="2700000" algn="tl" rotWithShape="0">
-              <a:prstClr val="black">
-                <a:alpha val="40000"/>
-              </a:prstClr>
-            </a:outerShdw>
-          </a:effectLst>
-        </p:spPr>
-      </p:pic>
-      <p:sp>
-        <p:nvSpPr>
-          <p:cNvPr id="11" name="TextBox 10">
-            <a:extLst>
-              <a:ext uri="{FF2B5EF4-FFF2-40B4-BE49-F238E27FC236}">
-                <a16:creationId xmlns:a16="http://schemas.microsoft.com/office/drawing/2014/main" id="{54C53FDA-C352-4C74-8612-DE7399891DBB}"/>
-              </a:ext>
-            </a:extLst>
-          </p:cNvPr>
-          <p:cNvSpPr txBox="1"/>
-          <p:nvPr/>
-        </p:nvSpPr>
-        <p:spPr>
-          <a:xfrm>
-            <a:off x="9330402" y="606553"/>
-            <a:ext cx="2762053" cy="369332"/>
-          </a:xfrm>
-          <a:prstGeom prst="rect">
-            <a:avLst/>
-          </a:prstGeom>
-          <a:noFill/>
-        </p:spPr>
-        <p:txBody>
-          <a:bodyPr wrap="square" rtlCol="0">
-            <a:spAutoFit/>
-          </a:bodyPr>
-          <a:lstStyle/>
-          <a:p>
-            <a:r>
-              <a:rPr lang="en-US" dirty="0"/>
-              <a:t>UFO States</a:t>
-            </a:r>
-          </a:p>
-        </p:txBody>
-      </p:sp>
-      <p:pic>
-        <p:nvPicPr>
-          <p:cNvPr id="2" name="Picture 1">
-            <a:extLst>
-              <a:ext uri="{FF2B5EF4-FFF2-40B4-BE49-F238E27FC236}">
-                <a16:creationId xmlns:a16="http://schemas.microsoft.com/office/drawing/2014/main" id="{06E55988-3727-4196-80F5-DCDA9C99B929}"/>
-              </a:ext>
-            </a:extLst>
-          </p:cNvPr>
-          <p:cNvPicPr>
-            <a:picLocks noChangeAspect="1"/>
-          </p:cNvPicPr>
-          <p:nvPr/>
-        </p:nvPicPr>
-        <p:blipFill>
-          <a:blip r:embed="rId7"/>
-          <a:stretch>
-            <a:fillRect/>
-          </a:stretch>
-        </p:blipFill>
-        <p:spPr>
-          <a:xfrm>
-            <a:off x="5548683" y="4377517"/>
-            <a:ext cx="3163495" cy="2245705"/>
-          </a:xfrm>
-          <a:prstGeom prst="rect">
-            <a:avLst/>
-          </a:prstGeom>
-          <a:ln>
-            <a:solidFill>
-              <a:schemeClr val="tx1"/>
-            </a:solidFill>
-          </a:ln>
-          <a:effectLst>
-            <a:outerShdw blurRad="50800" dist="38100" dir="2700000" algn="tl" rotWithShape="0">
-              <a:prstClr val="black">
-                <a:alpha val="40000"/>
-              </a:prstClr>
-            </a:outerShdw>
-          </a:effectLst>
-        </p:spPr>
-      </p:pic>
-      <p:sp>
-        <p:nvSpPr>
-          <p:cNvPr id="8" name="TextBox 7">
-            <a:extLst>
-              <a:ext uri="{FF2B5EF4-FFF2-40B4-BE49-F238E27FC236}">
-                <a16:creationId xmlns:a16="http://schemas.microsoft.com/office/drawing/2014/main" id="{40B44176-2B4A-43AB-826F-0C0012768FEC}"/>
-              </a:ext>
-            </a:extLst>
-          </p:cNvPr>
-          <p:cNvSpPr txBox="1"/>
-          <p:nvPr/>
-        </p:nvSpPr>
-        <p:spPr>
-          <a:xfrm>
-            <a:off x="6126034" y="3977614"/>
-            <a:ext cx="2762053" cy="369332"/>
-          </a:xfrm>
-          <a:prstGeom prst="rect">
-            <a:avLst/>
-          </a:prstGeom>
-          <a:noFill/>
-        </p:spPr>
-        <p:txBody>
-          <a:bodyPr wrap="square" rtlCol="0">
-            <a:spAutoFit/>
-          </a:bodyPr>
-          <a:lstStyle/>
-          <a:p>
-            <a:r>
-              <a:rPr lang="en-US" dirty="0"/>
-              <a:t>UFO Duration</a:t>
-            </a:r>
-          </a:p>
-        </p:txBody>
-      </p:sp>
-    </p:spTree>
-    <p:extLst>
-      <p:ext uri="{BB962C8B-B14F-4D97-AF65-F5344CB8AC3E}">
-        <p14:creationId xmlns:p14="http://schemas.microsoft.com/office/powerpoint/2010/main" val="155760722"/>
       </p:ext>
     </p:extLst>
   </p:cSld>
@@ -11918,429 +12334,38 @@
           <a:chExt cx="0" cy="0"/>
         </a:xfrm>
       </p:grpSpPr>
-      <p:pic>
-        <p:nvPicPr>
-          <p:cNvPr id="2" name="Graphic 1" descr="Rocket">
+      <p:sp>
+        <p:nvSpPr>
+          <p:cNvPr id="3" name="Title 2">
             <a:extLst>
               <a:ext uri="{FF2B5EF4-FFF2-40B4-BE49-F238E27FC236}">
-                <a16:creationId xmlns:a16="http://schemas.microsoft.com/office/drawing/2014/main" id="{CB6596E0-228F-467E-9BD2-C380D2B27A14}"/>
+                <a16:creationId xmlns:a16="http://schemas.microsoft.com/office/drawing/2014/main" id="{81957D48-6A39-4510-9652-BC2EDBD270BC}"/>
               </a:ext>
             </a:extLst>
           </p:cNvPr>
-          <p:cNvPicPr>
-            <a:picLocks noChangeAspect="1"/>
-          </p:cNvPicPr>
-          <p:nvPr/>
-        </p:nvPicPr>
-        <p:blipFill>
-          <a:blip r:embed="rId3">
-            <a:extLst>
-              <a:ext uri="{28A0092B-C50C-407E-A947-70E740481C1C}">
-                <a14:useLocalDpi xmlns:a14="http://schemas.microsoft.com/office/drawing/2010/main" val="0"/>
-              </a:ext>
-              <a:ext uri="{96DAC541-7B7A-43D3-8B79-37D633B846F1}">
-                <asvg:svgBlip xmlns:asvg="http://schemas.microsoft.com/office/drawing/2016/SVG/main" r:embed="rId4"/>
-              </a:ext>
-            </a:extLst>
-          </a:blip>
-          <a:stretch>
-            <a:fillRect/>
-          </a:stretch>
-        </p:blipFill>
-        <p:spPr>
-          <a:xfrm>
-            <a:off x="9987775" y="4897243"/>
-            <a:ext cx="1832518" cy="1832518"/>
-          </a:xfrm>
-          <a:prstGeom prst="rect">
-            <a:avLst/>
-          </a:prstGeom>
-        </p:spPr>
-      </p:pic>
-      <p:sp>
-        <p:nvSpPr>
-          <p:cNvPr id="17" name="TextBox 16">
-            <a:extLst>
-              <a:ext uri="{FF2B5EF4-FFF2-40B4-BE49-F238E27FC236}">
-                <a16:creationId xmlns:a16="http://schemas.microsoft.com/office/drawing/2014/main" id="{45EA2C39-9C54-488D-AC53-383FF2E7FF8F}"/>
-              </a:ext>
-            </a:extLst>
-          </p:cNvPr>
-          <p:cNvSpPr txBox="1"/>
-          <p:nvPr/>
-        </p:nvSpPr>
-        <p:spPr>
-          <a:xfrm>
-            <a:off x="6822600" y="1493142"/>
-            <a:ext cx="2752627" cy="369332"/>
-          </a:xfrm>
-          <a:prstGeom prst="rect">
-            <a:avLst/>
-          </a:prstGeom>
-          <a:noFill/>
-        </p:spPr>
-        <p:txBody>
-          <a:bodyPr wrap="square" rtlCol="0">
-            <a:spAutoFit/>
-          </a:bodyPr>
+          <p:cNvSpPr>
+            <a:spLocks noGrp="1"/>
+          </p:cNvSpPr>
+          <p:nvPr>
+            <p:ph type="title"/>
+          </p:nvPr>
+        </p:nvSpPr>
+        <p:spPr/>
+        <p:txBody>
+          <a:bodyPr/>
           <a:lstStyle/>
           <a:p>
             <a:r>
               <a:rPr lang="en-US" dirty="0"/>
-              <a:t>Proximity to Airforce Base</a:t>
-            </a:r>
-          </a:p>
-        </p:txBody>
-      </p:sp>
-      <p:sp>
-        <p:nvSpPr>
-          <p:cNvPr id="19" name="TextBox 18">
-            <a:extLst>
-              <a:ext uri="{FF2B5EF4-FFF2-40B4-BE49-F238E27FC236}">
-                <a16:creationId xmlns:a16="http://schemas.microsoft.com/office/drawing/2014/main" id="{80717F05-CEFC-45AA-9D07-CF2914649A66}"/>
-              </a:ext>
-            </a:extLst>
-          </p:cNvPr>
-          <p:cNvSpPr txBox="1"/>
-          <p:nvPr/>
-        </p:nvSpPr>
-        <p:spPr>
-          <a:xfrm>
-            <a:off x="3402058" y="852092"/>
-            <a:ext cx="821976" cy="373201"/>
-          </a:xfrm>
-          <a:prstGeom prst="rect">
-            <a:avLst/>
-          </a:prstGeom>
-          <a:noFill/>
-        </p:spPr>
-        <p:txBody>
-          <a:bodyPr wrap="square" rtlCol="0">
-            <a:spAutoFit/>
-          </a:bodyPr>
-          <a:lstStyle/>
-          <a:p>
-            <a:r>
-              <a:rPr lang="en-US" dirty="0"/>
-              <a:t>State</a:t>
-            </a:r>
-          </a:p>
-        </p:txBody>
-      </p:sp>
-      <p:sp>
-        <p:nvSpPr>
-          <p:cNvPr id="21" name="TextBox 20">
-            <a:extLst>
-              <a:ext uri="{FF2B5EF4-FFF2-40B4-BE49-F238E27FC236}">
-                <a16:creationId xmlns:a16="http://schemas.microsoft.com/office/drawing/2014/main" id="{57EBC6E6-FAFA-4DD1-9A98-2B0076B5D042}"/>
-              </a:ext>
-            </a:extLst>
-          </p:cNvPr>
-          <p:cNvSpPr txBox="1"/>
-          <p:nvPr/>
-        </p:nvSpPr>
-        <p:spPr>
-          <a:xfrm>
-            <a:off x="3607519" y="3941577"/>
-            <a:ext cx="821976" cy="373201"/>
-          </a:xfrm>
-          <a:prstGeom prst="rect">
-            <a:avLst/>
-          </a:prstGeom>
-          <a:noFill/>
-        </p:spPr>
-        <p:txBody>
-          <a:bodyPr wrap="square" rtlCol="0">
-            <a:spAutoFit/>
-          </a:bodyPr>
-          <a:lstStyle/>
-          <a:p>
-            <a:r>
-              <a:rPr lang="en-US" dirty="0"/>
-              <a:t>City</a:t>
-            </a:r>
-          </a:p>
-        </p:txBody>
-      </p:sp>
-      <p:sp>
-        <p:nvSpPr>
-          <p:cNvPr id="12" name="TextBox 11">
-            <a:extLst>
-              <a:ext uri="{FF2B5EF4-FFF2-40B4-BE49-F238E27FC236}">
-                <a16:creationId xmlns:a16="http://schemas.microsoft.com/office/drawing/2014/main" id="{2C0DABE5-BD19-4D77-A5D2-CD41A0AC63D2}"/>
-              </a:ext>
-            </a:extLst>
-          </p:cNvPr>
-          <p:cNvSpPr txBox="1"/>
-          <p:nvPr/>
-        </p:nvSpPr>
-        <p:spPr>
-          <a:xfrm rot="16200000">
-            <a:off x="1004340" y="1845854"/>
-            <a:ext cx="1875934" cy="261610"/>
-          </a:xfrm>
-          <a:prstGeom prst="rect">
-            <a:avLst/>
-          </a:prstGeom>
-          <a:noFill/>
-        </p:spPr>
-        <p:txBody>
-          <a:bodyPr wrap="square" rtlCol="0">
-            <a:spAutoFit/>
-          </a:bodyPr>
-          <a:lstStyle/>
-          <a:p>
-            <a:r>
-              <a:rPr lang="en-US" sz="1100" dirty="0"/>
-              <a:t># of Sightings</a:t>
-            </a:r>
-          </a:p>
-        </p:txBody>
-      </p:sp>
-      <p:sp>
-        <p:nvSpPr>
-          <p:cNvPr id="15" name="TextBox 14">
-            <a:extLst>
-              <a:ext uri="{FF2B5EF4-FFF2-40B4-BE49-F238E27FC236}">
-                <a16:creationId xmlns:a16="http://schemas.microsoft.com/office/drawing/2014/main" id="{334020B4-39D4-4E13-80E3-450F5D1EBBF7}"/>
-              </a:ext>
-            </a:extLst>
-          </p:cNvPr>
-          <p:cNvSpPr txBox="1"/>
-          <p:nvPr/>
-        </p:nvSpPr>
-        <p:spPr>
-          <a:xfrm rot="16200000">
-            <a:off x="1026464" y="4726188"/>
-            <a:ext cx="1875934" cy="261610"/>
-          </a:xfrm>
-          <a:prstGeom prst="rect">
-            <a:avLst/>
-          </a:prstGeom>
-          <a:noFill/>
-        </p:spPr>
-        <p:txBody>
-          <a:bodyPr wrap="square" rtlCol="0">
-            <a:spAutoFit/>
-          </a:bodyPr>
-          <a:lstStyle/>
-          <a:p>
-            <a:r>
-              <a:rPr lang="en-US" sz="1100" dirty="0"/>
-              <a:t># of Sightings</a:t>
-            </a:r>
-          </a:p>
-        </p:txBody>
-      </p:sp>
-      <p:sp>
-        <p:nvSpPr>
-          <p:cNvPr id="23" name="TextBox 22">
-            <a:extLst>
-              <a:ext uri="{FF2B5EF4-FFF2-40B4-BE49-F238E27FC236}">
-                <a16:creationId xmlns:a16="http://schemas.microsoft.com/office/drawing/2014/main" id="{66ABDF79-5F07-4844-BEC4-9D198916BE19}"/>
-              </a:ext>
-            </a:extLst>
-          </p:cNvPr>
-          <p:cNvSpPr txBox="1"/>
-          <p:nvPr/>
-        </p:nvSpPr>
-        <p:spPr>
-          <a:xfrm rot="16200000">
-            <a:off x="5176732" y="3063672"/>
-            <a:ext cx="1875934" cy="261610"/>
-          </a:xfrm>
-          <a:prstGeom prst="rect">
-            <a:avLst/>
-          </a:prstGeom>
-          <a:noFill/>
-        </p:spPr>
-        <p:txBody>
-          <a:bodyPr wrap="square" rtlCol="0">
-            <a:spAutoFit/>
-          </a:bodyPr>
-          <a:lstStyle/>
-          <a:p>
-            <a:r>
-              <a:rPr lang="en-US" sz="1100" dirty="0"/>
-              <a:t># of Sightings</a:t>
-            </a:r>
-          </a:p>
-        </p:txBody>
-      </p:sp>
-      <p:sp>
-        <p:nvSpPr>
-          <p:cNvPr id="24" name="TextBox 23">
-            <a:extLst>
-              <a:ext uri="{FF2B5EF4-FFF2-40B4-BE49-F238E27FC236}">
-                <a16:creationId xmlns:a16="http://schemas.microsoft.com/office/drawing/2014/main" id="{967B0CA2-A682-454A-962C-05F92637232B}"/>
-              </a:ext>
-            </a:extLst>
-          </p:cNvPr>
-          <p:cNvSpPr txBox="1"/>
-          <p:nvPr/>
-        </p:nvSpPr>
-        <p:spPr>
-          <a:xfrm>
-            <a:off x="1359084" y="163477"/>
-            <a:ext cx="4496871" cy="584775"/>
-          </a:xfrm>
-          <a:prstGeom prst="rect">
-            <a:avLst/>
-          </a:prstGeom>
-          <a:noFill/>
-        </p:spPr>
-        <p:txBody>
-          <a:bodyPr wrap="square" rtlCol="0">
-            <a:spAutoFit/>
-          </a:bodyPr>
-          <a:lstStyle/>
-          <a:p>
-            <a:r>
-              <a:rPr lang="en-US" sz="3200" dirty="0"/>
-              <a:t>Where Will I See</a:t>
-            </a:r>
-            <a:r>
-              <a:rPr lang="en-US" sz="2800" dirty="0"/>
-              <a:t> </a:t>
-            </a:r>
-            <a:r>
-              <a:rPr lang="en-US" sz="3200" dirty="0"/>
-              <a:t>a UFO?</a:t>
-            </a:r>
-            <a:endParaRPr lang="en-US" sz="2800" dirty="0"/>
-          </a:p>
-        </p:txBody>
-      </p:sp>
-      <p:pic>
-        <p:nvPicPr>
-          <p:cNvPr id="4" name="Picture 3">
-            <a:extLst>
-              <a:ext uri="{FF2B5EF4-FFF2-40B4-BE49-F238E27FC236}">
-                <a16:creationId xmlns:a16="http://schemas.microsoft.com/office/drawing/2014/main" id="{F5AE892B-066E-491B-9D67-FFAE435A4CDD}"/>
-              </a:ext>
-            </a:extLst>
-          </p:cNvPr>
-          <p:cNvPicPr>
-            <a:picLocks noChangeAspect="1"/>
-          </p:cNvPicPr>
-          <p:nvPr/>
-        </p:nvPicPr>
-        <p:blipFill>
-          <a:blip r:embed="rId5"/>
-          <a:stretch>
-            <a:fillRect/>
-          </a:stretch>
-        </p:blipFill>
-        <p:spPr>
-          <a:xfrm>
-            <a:off x="2176410" y="4303851"/>
-            <a:ext cx="3479792" cy="2390671"/>
-          </a:xfrm>
-          <a:prstGeom prst="rect">
-            <a:avLst/>
-          </a:prstGeom>
-          <a:ln>
-            <a:solidFill>
-              <a:schemeClr val="tx1"/>
-            </a:solidFill>
-          </a:ln>
-          <a:effectLst>
-            <a:outerShdw blurRad="50800" dist="38100" dir="2700000" algn="tl" rotWithShape="0">
-              <a:prstClr val="black">
-                <a:alpha val="40000"/>
-              </a:prstClr>
-            </a:outerShdw>
-          </a:effectLst>
-        </p:spPr>
-      </p:pic>
-      <p:pic>
-        <p:nvPicPr>
-          <p:cNvPr id="20" name="Picture 19">
-            <a:extLst>
-              <a:ext uri="{FF2B5EF4-FFF2-40B4-BE49-F238E27FC236}">
-                <a16:creationId xmlns:a16="http://schemas.microsoft.com/office/drawing/2014/main" id="{A6920322-97D8-433E-9895-6CE842B375CB}"/>
-              </a:ext>
-            </a:extLst>
-          </p:cNvPr>
-          <p:cNvPicPr>
-            <a:picLocks noChangeAspect="1"/>
-          </p:cNvPicPr>
-          <p:nvPr/>
-        </p:nvPicPr>
-        <p:blipFill>
-          <a:blip r:embed="rId6"/>
-          <a:stretch>
-            <a:fillRect/>
-          </a:stretch>
-        </p:blipFill>
-        <p:spPr>
-          <a:xfrm>
-            <a:off x="6267627" y="1960757"/>
-            <a:ext cx="4112871" cy="3344304"/>
-          </a:xfrm>
-          <a:prstGeom prst="rect">
-            <a:avLst/>
-          </a:prstGeom>
-          <a:ln>
-            <a:solidFill>
-              <a:schemeClr val="tx1"/>
-            </a:solidFill>
-          </a:ln>
-          <a:effectLst>
-            <a:outerShdw blurRad="50800" dist="38100" dir="2700000" algn="tl" rotWithShape="0">
-              <a:prstClr val="black">
-                <a:alpha val="40000"/>
-              </a:prstClr>
-            </a:outerShdw>
-          </a:effectLst>
-        </p:spPr>
-      </p:pic>
-      <p:pic>
-        <p:nvPicPr>
-          <p:cNvPr id="5" name="Picture 4">
-            <a:extLst>
-              <a:ext uri="{FF2B5EF4-FFF2-40B4-BE49-F238E27FC236}">
-                <a16:creationId xmlns:a16="http://schemas.microsoft.com/office/drawing/2014/main" id="{4F4A2661-6CA0-48D7-BFE0-C2109E35DFA7}"/>
-              </a:ext>
-            </a:extLst>
-          </p:cNvPr>
-          <p:cNvPicPr>
-            <a:picLocks noChangeAspect="1"/>
-          </p:cNvPicPr>
-          <p:nvPr/>
-        </p:nvPicPr>
-        <p:blipFill>
-          <a:blip r:embed="rId7"/>
-          <a:stretch>
-            <a:fillRect/>
-          </a:stretch>
-        </p:blipFill>
-        <p:spPr>
-          <a:xfrm>
-            <a:off x="2176409" y="1249135"/>
-            <a:ext cx="3547513" cy="2468099"/>
-          </a:xfrm>
-          <a:prstGeom prst="rect">
-            <a:avLst/>
-          </a:prstGeom>
-          <a:ln>
-            <a:solidFill>
-              <a:schemeClr val="tx1"/>
-            </a:solidFill>
-          </a:ln>
-          <a:effectLst>
-            <a:outerShdw blurRad="50800" dist="38100" dir="2700000" algn="tl" rotWithShape="0">
-              <a:prstClr val="black">
-                <a:alpha val="40000"/>
-              </a:prstClr>
-            </a:outerShdw>
-          </a:effectLst>
-        </p:spPr>
-      </p:pic>
+              <a:t>Conclusion</a:t>
+            </a:r>
+          </a:p>
+        </p:txBody>
+      </p:sp>
     </p:spTree>
     <p:extLst>
       <p:ext uri="{BB962C8B-B14F-4D97-AF65-F5344CB8AC3E}">
-        <p14:creationId xmlns:p14="http://schemas.microsoft.com/office/powerpoint/2010/main" val="2876869488"/>
+        <p14:creationId xmlns:p14="http://schemas.microsoft.com/office/powerpoint/2010/main" val="2479365765"/>
       </p:ext>
     </p:extLst>
   </p:cSld>
@@ -12369,10 +12394,10 @@
       </p:grpSpPr>
       <p:pic>
         <p:nvPicPr>
-          <p:cNvPr id="18" name="Graphic 17" descr="Rocket">
+          <p:cNvPr id="12" name="Graphic 11" descr="Rocket">
             <a:extLst>
               <a:ext uri="{FF2B5EF4-FFF2-40B4-BE49-F238E27FC236}">
-                <a16:creationId xmlns:a16="http://schemas.microsoft.com/office/drawing/2014/main" id="{F7B322E4-7E9C-42C5-B7FC-C024C57AEF8F}"/>
+                <a16:creationId xmlns:a16="http://schemas.microsoft.com/office/drawing/2014/main" id="{C5000270-700F-4AE5-B3B6-D4625517C6DF}"/>
               </a:ext>
             </a:extLst>
           </p:cNvPr>
@@ -12408,159 +12433,43 @@
       </p:pic>
       <p:sp>
         <p:nvSpPr>
-          <p:cNvPr id="9" name="TextBox 8">
+          <p:cNvPr id="4" name="Title 3">
             <a:extLst>
               <a:ext uri="{FF2B5EF4-FFF2-40B4-BE49-F238E27FC236}">
-                <a16:creationId xmlns:a16="http://schemas.microsoft.com/office/drawing/2014/main" id="{C43A5036-77F4-4E80-A14C-F806A75EA570}"/>
+                <a16:creationId xmlns:a16="http://schemas.microsoft.com/office/drawing/2014/main" id="{BFEA2C5B-7E39-4AC4-A95E-D982D53A507D}"/>
               </a:ext>
             </a:extLst>
           </p:cNvPr>
-          <p:cNvSpPr txBox="1"/>
-          <p:nvPr/>
-        </p:nvSpPr>
-        <p:spPr>
-          <a:xfrm>
-            <a:off x="6712776" y="3386033"/>
-            <a:ext cx="3362479" cy="338554"/>
-          </a:xfrm>
-          <a:prstGeom prst="rect">
-            <a:avLst/>
-          </a:prstGeom>
-          <a:noFill/>
-        </p:spPr>
-        <p:txBody>
-          <a:bodyPr wrap="square" rtlCol="0">
-            <a:spAutoFit/>
-          </a:bodyPr>
+          <p:cNvSpPr>
+            <a:spLocks noGrp="1"/>
+          </p:cNvSpPr>
+          <p:nvPr>
+            <p:ph type="title"/>
+          </p:nvPr>
+        </p:nvSpPr>
+        <p:spPr>
+          <a:xfrm>
+            <a:off x="952084" y="234778"/>
+            <a:ext cx="9601200" cy="940981"/>
+          </a:xfrm>
+        </p:spPr>
+        <p:txBody>
+          <a:bodyPr/>
           <a:lstStyle/>
           <a:p>
             <a:r>
-              <a:rPr lang="en-US" sz="1600" dirty="0"/>
-              <a:t>Severe Weather Day of Sighting</a:t>
-            </a:r>
-          </a:p>
-        </p:txBody>
-      </p:sp>
-      <p:sp>
-        <p:nvSpPr>
-          <p:cNvPr id="11" name="TextBox 10">
+              <a:rPr lang="en-US" dirty="0"/>
+              <a:t>“Explainable” v “Unexplainable”</a:t>
+            </a:r>
+          </a:p>
+        </p:txBody>
+      </p:sp>
+      <p:pic>
+        <p:nvPicPr>
+          <p:cNvPr id="7" name="Picture 6">
             <a:extLst>
               <a:ext uri="{FF2B5EF4-FFF2-40B4-BE49-F238E27FC236}">
-                <a16:creationId xmlns:a16="http://schemas.microsoft.com/office/drawing/2014/main" id="{F359E3CE-C6A0-4E5D-B804-A6B499D0584C}"/>
-              </a:ext>
-            </a:extLst>
-          </p:cNvPr>
-          <p:cNvSpPr txBox="1"/>
-          <p:nvPr/>
-        </p:nvSpPr>
-        <p:spPr>
-          <a:xfrm>
-            <a:off x="2261167" y="748252"/>
-            <a:ext cx="1903728" cy="338554"/>
-          </a:xfrm>
-          <a:prstGeom prst="rect">
-            <a:avLst/>
-          </a:prstGeom>
-          <a:noFill/>
-        </p:spPr>
-        <p:txBody>
-          <a:bodyPr wrap="square" rtlCol="0">
-            <a:spAutoFit/>
-          </a:bodyPr>
-          <a:lstStyle/>
-          <a:p>
-            <a:r>
-              <a:rPr lang="en-US" sz="1600" dirty="0"/>
-              <a:t>Day of the Week</a:t>
-            </a:r>
-          </a:p>
-        </p:txBody>
-      </p:sp>
-      <p:sp>
-        <p:nvSpPr>
-          <p:cNvPr id="12" name="TextBox 11">
-            <a:extLst>
-              <a:ext uri="{FF2B5EF4-FFF2-40B4-BE49-F238E27FC236}">
-                <a16:creationId xmlns:a16="http://schemas.microsoft.com/office/drawing/2014/main" id="{0E98773B-9D20-43CD-9B0A-433BC28521C9}"/>
-              </a:ext>
-            </a:extLst>
-          </p:cNvPr>
-          <p:cNvSpPr txBox="1"/>
-          <p:nvPr/>
-        </p:nvSpPr>
-        <p:spPr>
-          <a:xfrm>
-            <a:off x="1359084" y="163477"/>
-            <a:ext cx="4178115" cy="584775"/>
-          </a:xfrm>
-          <a:prstGeom prst="rect">
-            <a:avLst/>
-          </a:prstGeom>
-          <a:noFill/>
-        </p:spPr>
-        <p:txBody>
-          <a:bodyPr wrap="square" rtlCol="0">
-            <a:spAutoFit/>
-          </a:bodyPr>
-          <a:lstStyle/>
-          <a:p>
-            <a:r>
-              <a:rPr lang="en-US" sz="3200" dirty="0"/>
-              <a:t>When Will I See</a:t>
-            </a:r>
-            <a:r>
-              <a:rPr lang="en-US" sz="2800" dirty="0"/>
-              <a:t> </a:t>
-            </a:r>
-            <a:r>
-              <a:rPr lang="en-US" sz="3200" dirty="0"/>
-              <a:t>a UFO?</a:t>
-            </a:r>
-            <a:endParaRPr lang="en-US" sz="2800" dirty="0"/>
-          </a:p>
-        </p:txBody>
-      </p:sp>
-      <p:sp>
-        <p:nvSpPr>
-          <p:cNvPr id="14" name="TextBox 13">
-            <a:extLst>
-              <a:ext uri="{FF2B5EF4-FFF2-40B4-BE49-F238E27FC236}">
-                <a16:creationId xmlns:a16="http://schemas.microsoft.com/office/drawing/2014/main" id="{9D61D4F5-DB81-46EE-92B3-A324A4C5D024}"/>
-              </a:ext>
-            </a:extLst>
-          </p:cNvPr>
-          <p:cNvSpPr txBox="1"/>
-          <p:nvPr/>
-        </p:nvSpPr>
-        <p:spPr>
-          <a:xfrm>
-            <a:off x="2185425" y="3521127"/>
-            <a:ext cx="1903728" cy="338554"/>
-          </a:xfrm>
-          <a:prstGeom prst="rect">
-            <a:avLst/>
-          </a:prstGeom>
-          <a:noFill/>
-        </p:spPr>
-        <p:txBody>
-          <a:bodyPr wrap="square" rtlCol="0">
-            <a:spAutoFit/>
-          </a:bodyPr>
-          <a:lstStyle/>
-          <a:p>
-            <a:r>
-              <a:rPr lang="en-US" sz="1600" dirty="0"/>
-              <a:t>Month</a:t>
-            </a:r>
-          </a:p>
-        </p:txBody>
-      </p:sp>
-      <p:pic>
-        <p:nvPicPr>
-          <p:cNvPr id="15" name="Picture 14">
-            <a:extLst>
-              <a:ext uri="{FF2B5EF4-FFF2-40B4-BE49-F238E27FC236}">
-                <a16:creationId xmlns:a16="http://schemas.microsoft.com/office/drawing/2014/main" id="{E12D8DC1-C99F-44B2-82B0-36EC1D35DBD9}"/>
+                <a16:creationId xmlns:a16="http://schemas.microsoft.com/office/drawing/2014/main" id="{1144DEC7-62B0-474F-BD09-F93C4076C171}"/>
               </a:ext>
             </a:extLst>
           </p:cNvPr>
@@ -12577,155 +12486,8 @@
         </p:blipFill>
         <p:spPr>
           <a:xfrm>
-            <a:off x="2261167" y="1109485"/>
-            <a:ext cx="3508382" cy="2114715"/>
-          </a:xfrm>
-          <a:prstGeom prst="rect">
-            <a:avLst/>
-          </a:prstGeom>
-          <a:ln>
-            <a:solidFill>
-              <a:schemeClr val="tx2"/>
-            </a:solidFill>
-          </a:ln>
-          <a:effectLst>
-            <a:outerShdw blurRad="50800" dist="38100" dir="2700000" algn="tl" rotWithShape="0">
-              <a:prstClr val="black">
-                <a:alpha val="40000"/>
-              </a:prstClr>
-            </a:outerShdw>
-          </a:effectLst>
-        </p:spPr>
-      </p:pic>
-      <p:sp>
-        <p:nvSpPr>
-          <p:cNvPr id="17" name="TextBox 16">
-            <a:extLst>
-              <a:ext uri="{FF2B5EF4-FFF2-40B4-BE49-F238E27FC236}">
-                <a16:creationId xmlns:a16="http://schemas.microsoft.com/office/drawing/2014/main" id="{59E42BF4-348C-44AB-BF0A-3016E7087B89}"/>
-              </a:ext>
-            </a:extLst>
-          </p:cNvPr>
-          <p:cNvSpPr txBox="1"/>
-          <p:nvPr/>
-        </p:nvSpPr>
-        <p:spPr>
-          <a:xfrm>
-            <a:off x="6798842" y="688462"/>
-            <a:ext cx="1903728" cy="338554"/>
-          </a:xfrm>
-          <a:prstGeom prst="rect">
-            <a:avLst/>
-          </a:prstGeom>
-          <a:noFill/>
-        </p:spPr>
-        <p:txBody>
-          <a:bodyPr wrap="square" rtlCol="0">
-            <a:spAutoFit/>
-          </a:bodyPr>
-          <a:lstStyle/>
-          <a:p>
-            <a:r>
-              <a:rPr lang="en-US" sz="1600" dirty="0"/>
-              <a:t>Day of the Year</a:t>
-            </a:r>
-          </a:p>
-        </p:txBody>
-      </p:sp>
-      <p:sp>
-        <p:nvSpPr>
-          <p:cNvPr id="19" name="TextBox 18">
-            <a:extLst>
-              <a:ext uri="{FF2B5EF4-FFF2-40B4-BE49-F238E27FC236}">
-                <a16:creationId xmlns:a16="http://schemas.microsoft.com/office/drawing/2014/main" id="{02A654C0-13DC-4E96-9C7E-B2B75065C928}"/>
-              </a:ext>
-            </a:extLst>
-          </p:cNvPr>
-          <p:cNvSpPr txBox="1"/>
-          <p:nvPr/>
-        </p:nvSpPr>
-        <p:spPr>
-          <a:xfrm rot="16200000">
-            <a:off x="5730070" y="1605330"/>
-            <a:ext cx="1875934" cy="261610"/>
-          </a:xfrm>
-          <a:prstGeom prst="rect">
-            <a:avLst/>
-          </a:prstGeom>
-          <a:noFill/>
-        </p:spPr>
-        <p:txBody>
-          <a:bodyPr wrap="square" rtlCol="0">
-            <a:spAutoFit/>
-          </a:bodyPr>
-          <a:lstStyle/>
-          <a:p>
-            <a:r>
-              <a:rPr lang="en-US" sz="1100" dirty="0"/>
-              <a:t># of Sightings</a:t>
-            </a:r>
-          </a:p>
-        </p:txBody>
-      </p:sp>
-      <p:sp>
-        <p:nvSpPr>
-          <p:cNvPr id="20" name="TextBox 19">
-            <a:extLst>
-              <a:ext uri="{FF2B5EF4-FFF2-40B4-BE49-F238E27FC236}">
-                <a16:creationId xmlns:a16="http://schemas.microsoft.com/office/drawing/2014/main" id="{34EBD0DF-BC05-41C1-A32D-93BB2D58A31F}"/>
-              </a:ext>
-            </a:extLst>
-          </p:cNvPr>
-          <p:cNvSpPr txBox="1"/>
-          <p:nvPr/>
-        </p:nvSpPr>
-        <p:spPr>
-          <a:xfrm rot="16200000">
-            <a:off x="5661212" y="4378801"/>
-            <a:ext cx="1875934" cy="261610"/>
-          </a:xfrm>
-          <a:prstGeom prst="rect">
-            <a:avLst/>
-          </a:prstGeom>
-          <a:noFill/>
-        </p:spPr>
-        <p:txBody>
-          <a:bodyPr wrap="square" rtlCol="0">
-            <a:spAutoFit/>
-          </a:bodyPr>
-          <a:lstStyle/>
-          <a:p>
-            <a:r>
-              <a:rPr lang="en-US" sz="1100" dirty="0"/>
-              <a:t># of Sightings</a:t>
-            </a:r>
-          </a:p>
-        </p:txBody>
-      </p:sp>
-      <p:pic>
-        <p:nvPicPr>
-          <p:cNvPr id="6" name="Picture 5">
-            <a:extLst>
-              <a:ext uri="{FF2B5EF4-FFF2-40B4-BE49-F238E27FC236}">
-                <a16:creationId xmlns:a16="http://schemas.microsoft.com/office/drawing/2014/main" id="{C658D38E-A6F9-4BD7-B2B6-ECE3457955AF}"/>
-              </a:ext>
-            </a:extLst>
-          </p:cNvPr>
-          <p:cNvPicPr>
-            <a:picLocks noChangeAspect="1"/>
-          </p:cNvPicPr>
-          <p:nvPr/>
-        </p:nvPicPr>
-        <p:blipFill>
-          <a:blip r:embed="rId6"/>
-          <a:stretch>
-            <a:fillRect/>
-          </a:stretch>
-        </p:blipFill>
-        <p:spPr>
-          <a:xfrm>
-            <a:off x="6755517" y="3750093"/>
-            <a:ext cx="3232258" cy="2631903"/>
+            <a:off x="952084" y="2179020"/>
+            <a:ext cx="4109487" cy="2980481"/>
           </a:xfrm>
           <a:prstGeom prst="rect">
             <a:avLst/>
@@ -12744,12 +12506,47 @@
           </a:effectLst>
         </p:spPr>
       </p:pic>
+      <p:sp>
+        <p:nvSpPr>
+          <p:cNvPr id="9" name="TextBox 8">
+            <a:extLst>
+              <a:ext uri="{FF2B5EF4-FFF2-40B4-BE49-F238E27FC236}">
+                <a16:creationId xmlns:a16="http://schemas.microsoft.com/office/drawing/2014/main" id="{4D8D5A39-AB43-4794-820B-2B688A36EE5D}"/>
+              </a:ext>
+            </a:extLst>
+          </p:cNvPr>
+          <p:cNvSpPr txBox="1"/>
+          <p:nvPr/>
+        </p:nvSpPr>
+        <p:spPr>
+          <a:xfrm>
+            <a:off x="1776401" y="1793711"/>
+            <a:ext cx="2762053" cy="369332"/>
+          </a:xfrm>
+          <a:prstGeom prst="rect">
+            <a:avLst/>
+          </a:prstGeom>
+          <a:noFill/>
+        </p:spPr>
+        <p:txBody>
+          <a:bodyPr wrap="square" rtlCol="0">
+            <a:spAutoFit/>
+          </a:bodyPr>
+          <a:lstStyle/>
+          <a:p>
+            <a:r>
+              <a:rPr lang="en-US" dirty="0"/>
+              <a:t>UFO Shapes</a:t>
+            </a:r>
+          </a:p>
+        </p:txBody>
+      </p:sp>
       <p:pic>
         <p:nvPicPr>
-          <p:cNvPr id="8" name="Picture 7">
+          <p:cNvPr id="10" name="Picture 9">
             <a:extLst>
               <a:ext uri="{FF2B5EF4-FFF2-40B4-BE49-F238E27FC236}">
-                <a16:creationId xmlns:a16="http://schemas.microsoft.com/office/drawing/2014/main" id="{E15C4531-C382-4146-9AF8-10B1E74D75F3}"/>
+                <a16:creationId xmlns:a16="http://schemas.microsoft.com/office/drawing/2014/main" id="{4C9CB919-3308-4C40-B933-BF9E481F03EA}"/>
               </a:ext>
             </a:extLst>
           </p:cNvPr>
@@ -12759,15 +12556,15 @@
           <p:nvPr/>
         </p:nvPicPr>
         <p:blipFill>
-          <a:blip r:embed="rId7"/>
+          <a:blip r:embed="rId6"/>
           <a:stretch>
             <a:fillRect/>
           </a:stretch>
         </p:blipFill>
         <p:spPr>
           <a:xfrm>
-            <a:off x="6841144" y="1022521"/>
-            <a:ext cx="3146631" cy="2263841"/>
+            <a:off x="5355983" y="991170"/>
+            <a:ext cx="5548051" cy="2950444"/>
           </a:xfrm>
           <a:prstGeom prst="rect">
             <a:avLst/>
@@ -12786,12 +12583,47 @@
           </a:effectLst>
         </p:spPr>
       </p:pic>
+      <p:sp>
+        <p:nvSpPr>
+          <p:cNvPr id="11" name="TextBox 10">
+            <a:extLst>
+              <a:ext uri="{FF2B5EF4-FFF2-40B4-BE49-F238E27FC236}">
+                <a16:creationId xmlns:a16="http://schemas.microsoft.com/office/drawing/2014/main" id="{54C53FDA-C352-4C74-8612-DE7399891DBB}"/>
+              </a:ext>
+            </a:extLst>
+          </p:cNvPr>
+          <p:cNvSpPr txBox="1"/>
+          <p:nvPr/>
+        </p:nvSpPr>
+        <p:spPr>
+          <a:xfrm>
+            <a:off x="9330402" y="606553"/>
+            <a:ext cx="2762053" cy="369332"/>
+          </a:xfrm>
+          <a:prstGeom prst="rect">
+            <a:avLst/>
+          </a:prstGeom>
+          <a:noFill/>
+        </p:spPr>
+        <p:txBody>
+          <a:bodyPr wrap="square" rtlCol="0">
+            <a:spAutoFit/>
+          </a:bodyPr>
+          <a:lstStyle/>
+          <a:p>
+            <a:r>
+              <a:rPr lang="en-US" dirty="0"/>
+              <a:t>UFO States</a:t>
+            </a:r>
+          </a:p>
+        </p:txBody>
+      </p:sp>
       <p:pic>
         <p:nvPicPr>
-          <p:cNvPr id="16" name="Picture 15">
+          <p:cNvPr id="2" name="Picture 1">
             <a:extLst>
               <a:ext uri="{FF2B5EF4-FFF2-40B4-BE49-F238E27FC236}">
-                <a16:creationId xmlns:a16="http://schemas.microsoft.com/office/drawing/2014/main" id="{6EC2C3AB-4C29-42F7-A5E6-D422385D6A7A}"/>
+                <a16:creationId xmlns:a16="http://schemas.microsoft.com/office/drawing/2014/main" id="{06E55988-3727-4196-80F5-DCDA9C99B929}"/>
               </a:ext>
             </a:extLst>
           </p:cNvPr>
@@ -12801,15 +12633,15 @@
           <p:nvPr/>
         </p:nvPicPr>
         <p:blipFill>
-          <a:blip r:embed="rId8"/>
+          <a:blip r:embed="rId7"/>
           <a:stretch>
             <a:fillRect/>
           </a:stretch>
         </p:blipFill>
         <p:spPr>
           <a:xfrm>
-            <a:off x="2239869" y="3852318"/>
-            <a:ext cx="3770155" cy="2441683"/>
+            <a:off x="5548683" y="4377517"/>
+            <a:ext cx="3163495" cy="2245705"/>
           </a:xfrm>
           <a:prstGeom prst="rect">
             <a:avLst/>
@@ -12828,10 +12660,45 @@
           </a:effectLst>
         </p:spPr>
       </p:pic>
+      <p:sp>
+        <p:nvSpPr>
+          <p:cNvPr id="8" name="TextBox 7">
+            <a:extLst>
+              <a:ext uri="{FF2B5EF4-FFF2-40B4-BE49-F238E27FC236}">
+                <a16:creationId xmlns:a16="http://schemas.microsoft.com/office/drawing/2014/main" id="{40B44176-2B4A-43AB-826F-0C0012768FEC}"/>
+              </a:ext>
+            </a:extLst>
+          </p:cNvPr>
+          <p:cNvSpPr txBox="1"/>
+          <p:nvPr/>
+        </p:nvSpPr>
+        <p:spPr>
+          <a:xfrm>
+            <a:off x="6126034" y="3977614"/>
+            <a:ext cx="2762053" cy="369332"/>
+          </a:xfrm>
+          <a:prstGeom prst="rect">
+            <a:avLst/>
+          </a:prstGeom>
+          <a:noFill/>
+        </p:spPr>
+        <p:txBody>
+          <a:bodyPr wrap="square" rtlCol="0">
+            <a:spAutoFit/>
+          </a:bodyPr>
+          <a:lstStyle/>
+          <a:p>
+            <a:r>
+              <a:rPr lang="en-US" dirty="0"/>
+              <a:t>UFO Duration</a:t>
+            </a:r>
+          </a:p>
+        </p:txBody>
+      </p:sp>
     </p:spTree>
     <p:extLst>
       <p:ext uri="{BB962C8B-B14F-4D97-AF65-F5344CB8AC3E}">
-        <p14:creationId xmlns:p14="http://schemas.microsoft.com/office/powerpoint/2010/main" val="1731050523"/>
+        <p14:creationId xmlns:p14="http://schemas.microsoft.com/office/powerpoint/2010/main" val="155760722"/>
       </p:ext>
     </p:extLst>
   </p:cSld>
@@ -12860,10 +12727,10 @@
       </p:grpSpPr>
       <p:pic>
         <p:nvPicPr>
-          <p:cNvPr id="7" name="Graphic 6" descr="Rocket">
+          <p:cNvPr id="2" name="Graphic 1" descr="Rocket">
             <a:extLst>
               <a:ext uri="{FF2B5EF4-FFF2-40B4-BE49-F238E27FC236}">
-                <a16:creationId xmlns:a16="http://schemas.microsoft.com/office/drawing/2014/main" id="{2345638A-5A70-4DDF-A4A4-21E89C25DB8E}"/>
+                <a16:creationId xmlns:a16="http://schemas.microsoft.com/office/drawing/2014/main" id="{CB6596E0-228F-467E-9BD2-C380D2B27A14}"/>
               </a:ext>
             </a:extLst>
           </p:cNvPr>
@@ -12873,13 +12740,13 @@
           <p:nvPr/>
         </p:nvPicPr>
         <p:blipFill>
-          <a:blip r:embed="rId2">
+          <a:blip r:embed="rId3">
             <a:extLst>
               <a:ext uri="{28A0092B-C50C-407E-A947-70E740481C1C}">
                 <a14:useLocalDpi xmlns:a14="http://schemas.microsoft.com/office/drawing/2010/main" val="0"/>
               </a:ext>
               <a:ext uri="{96DAC541-7B7A-43D3-8B79-37D633B846F1}">
-                <asvg:svgBlip xmlns:asvg="http://schemas.microsoft.com/office/drawing/2016/SVG/main" r:embed="rId3"/>
+                <asvg:svgBlip xmlns:asvg="http://schemas.microsoft.com/office/drawing/2016/SVG/main" r:embed="rId4"/>
               </a:ext>
             </a:extLst>
           </a:blip>
@@ -12897,53 +12764,12 @@
           </a:prstGeom>
         </p:spPr>
       </p:pic>
-      <p:pic>
-        <p:nvPicPr>
-          <p:cNvPr id="2" name="Picture 1">
+      <p:sp>
+        <p:nvSpPr>
+          <p:cNvPr id="17" name="TextBox 16">
             <a:extLst>
               <a:ext uri="{FF2B5EF4-FFF2-40B4-BE49-F238E27FC236}">
-                <a16:creationId xmlns:a16="http://schemas.microsoft.com/office/drawing/2014/main" id="{B707F0C1-775E-4208-A6C9-2083B3D421B5}"/>
-              </a:ext>
-            </a:extLst>
-          </p:cNvPr>
-          <p:cNvPicPr>
-            <a:picLocks noChangeAspect="1"/>
-          </p:cNvPicPr>
-          <p:nvPr/>
-        </p:nvPicPr>
-        <p:blipFill rotWithShape="1">
-          <a:blip r:embed="rId4"/>
-          <a:srcRect l="3356" r="4979"/>
-          <a:stretch/>
-        </p:blipFill>
-        <p:spPr>
-          <a:xfrm>
-            <a:off x="6298098" y="1960757"/>
-            <a:ext cx="4724649" cy="3028419"/>
-          </a:xfrm>
-          <a:prstGeom prst="rect">
-            <a:avLst/>
-          </a:prstGeom>
-          <a:ln>
-            <a:solidFill>
-              <a:schemeClr val="tx2"/>
-            </a:solidFill>
-          </a:ln>
-          <a:effectLst>
-            <a:outerShdw blurRad="50800" dist="38100" dir="2700000" algn="tl" rotWithShape="0">
-              <a:prstClr val="black">
-                <a:alpha val="40000"/>
-              </a:prstClr>
-            </a:outerShdw>
-          </a:effectLst>
-        </p:spPr>
-      </p:pic>
-      <p:sp>
-        <p:nvSpPr>
-          <p:cNvPr id="3" name="TextBox 2">
-            <a:extLst>
-              <a:ext uri="{FF2B5EF4-FFF2-40B4-BE49-F238E27FC236}">
-                <a16:creationId xmlns:a16="http://schemas.microsoft.com/office/drawing/2014/main" id="{5D3BF25A-6EFB-4B14-92F1-5D897A4AC159}"/>
+                <a16:creationId xmlns:a16="http://schemas.microsoft.com/office/drawing/2014/main" id="{45EA2C39-9C54-488D-AC53-383FF2E7FF8F}"/>
               </a:ext>
             </a:extLst>
           </p:cNvPr>
@@ -12952,8 +12778,8 @@
         </p:nvSpPr>
         <p:spPr>
           <a:xfrm>
-            <a:off x="6289565" y="1603658"/>
-            <a:ext cx="3362479" cy="338554"/>
+            <a:off x="6822600" y="1493142"/>
+            <a:ext cx="2752627" cy="369332"/>
           </a:xfrm>
           <a:prstGeom prst="rect">
             <a:avLst/>
@@ -12967,9 +12793,228 @@
           <a:lstStyle/>
           <a:p>
             <a:r>
-              <a:rPr lang="en-US" sz="1600" dirty="0"/>
-              <a:t>Day of the Week vs. Month</a:t>
-            </a:r>
+              <a:rPr lang="en-US" dirty="0"/>
+              <a:t>Proximity to Airforce Base</a:t>
+            </a:r>
+          </a:p>
+        </p:txBody>
+      </p:sp>
+      <p:sp>
+        <p:nvSpPr>
+          <p:cNvPr id="19" name="TextBox 18">
+            <a:extLst>
+              <a:ext uri="{FF2B5EF4-FFF2-40B4-BE49-F238E27FC236}">
+                <a16:creationId xmlns:a16="http://schemas.microsoft.com/office/drawing/2014/main" id="{80717F05-CEFC-45AA-9D07-CF2914649A66}"/>
+              </a:ext>
+            </a:extLst>
+          </p:cNvPr>
+          <p:cNvSpPr txBox="1"/>
+          <p:nvPr/>
+        </p:nvSpPr>
+        <p:spPr>
+          <a:xfrm>
+            <a:off x="3402058" y="852092"/>
+            <a:ext cx="821976" cy="373201"/>
+          </a:xfrm>
+          <a:prstGeom prst="rect">
+            <a:avLst/>
+          </a:prstGeom>
+          <a:noFill/>
+        </p:spPr>
+        <p:txBody>
+          <a:bodyPr wrap="square" rtlCol="0">
+            <a:spAutoFit/>
+          </a:bodyPr>
+          <a:lstStyle/>
+          <a:p>
+            <a:r>
+              <a:rPr lang="en-US" dirty="0"/>
+              <a:t>State</a:t>
+            </a:r>
+          </a:p>
+        </p:txBody>
+      </p:sp>
+      <p:sp>
+        <p:nvSpPr>
+          <p:cNvPr id="21" name="TextBox 20">
+            <a:extLst>
+              <a:ext uri="{FF2B5EF4-FFF2-40B4-BE49-F238E27FC236}">
+                <a16:creationId xmlns:a16="http://schemas.microsoft.com/office/drawing/2014/main" id="{57EBC6E6-FAFA-4DD1-9A98-2B0076B5D042}"/>
+              </a:ext>
+            </a:extLst>
+          </p:cNvPr>
+          <p:cNvSpPr txBox="1"/>
+          <p:nvPr/>
+        </p:nvSpPr>
+        <p:spPr>
+          <a:xfrm>
+            <a:off x="3607519" y="3941577"/>
+            <a:ext cx="821976" cy="373201"/>
+          </a:xfrm>
+          <a:prstGeom prst="rect">
+            <a:avLst/>
+          </a:prstGeom>
+          <a:noFill/>
+        </p:spPr>
+        <p:txBody>
+          <a:bodyPr wrap="square" rtlCol="0">
+            <a:spAutoFit/>
+          </a:bodyPr>
+          <a:lstStyle/>
+          <a:p>
+            <a:r>
+              <a:rPr lang="en-US" dirty="0"/>
+              <a:t>City</a:t>
+            </a:r>
+          </a:p>
+        </p:txBody>
+      </p:sp>
+      <p:sp>
+        <p:nvSpPr>
+          <p:cNvPr id="12" name="TextBox 11">
+            <a:extLst>
+              <a:ext uri="{FF2B5EF4-FFF2-40B4-BE49-F238E27FC236}">
+                <a16:creationId xmlns:a16="http://schemas.microsoft.com/office/drawing/2014/main" id="{2C0DABE5-BD19-4D77-A5D2-CD41A0AC63D2}"/>
+              </a:ext>
+            </a:extLst>
+          </p:cNvPr>
+          <p:cNvSpPr txBox="1"/>
+          <p:nvPr/>
+        </p:nvSpPr>
+        <p:spPr>
+          <a:xfrm rot="16200000">
+            <a:off x="1004340" y="1845854"/>
+            <a:ext cx="1875934" cy="261610"/>
+          </a:xfrm>
+          <a:prstGeom prst="rect">
+            <a:avLst/>
+          </a:prstGeom>
+          <a:noFill/>
+        </p:spPr>
+        <p:txBody>
+          <a:bodyPr wrap="square" rtlCol="0">
+            <a:spAutoFit/>
+          </a:bodyPr>
+          <a:lstStyle/>
+          <a:p>
+            <a:r>
+              <a:rPr lang="en-US" sz="1100" dirty="0"/>
+              <a:t># of Sightings</a:t>
+            </a:r>
+          </a:p>
+        </p:txBody>
+      </p:sp>
+      <p:sp>
+        <p:nvSpPr>
+          <p:cNvPr id="15" name="TextBox 14">
+            <a:extLst>
+              <a:ext uri="{FF2B5EF4-FFF2-40B4-BE49-F238E27FC236}">
+                <a16:creationId xmlns:a16="http://schemas.microsoft.com/office/drawing/2014/main" id="{334020B4-39D4-4E13-80E3-450F5D1EBBF7}"/>
+              </a:ext>
+            </a:extLst>
+          </p:cNvPr>
+          <p:cNvSpPr txBox="1"/>
+          <p:nvPr/>
+        </p:nvSpPr>
+        <p:spPr>
+          <a:xfrm rot="16200000">
+            <a:off x="1026464" y="4726188"/>
+            <a:ext cx="1875934" cy="261610"/>
+          </a:xfrm>
+          <a:prstGeom prst="rect">
+            <a:avLst/>
+          </a:prstGeom>
+          <a:noFill/>
+        </p:spPr>
+        <p:txBody>
+          <a:bodyPr wrap="square" rtlCol="0">
+            <a:spAutoFit/>
+          </a:bodyPr>
+          <a:lstStyle/>
+          <a:p>
+            <a:r>
+              <a:rPr lang="en-US" sz="1100" dirty="0"/>
+              <a:t># of Sightings</a:t>
+            </a:r>
+          </a:p>
+        </p:txBody>
+      </p:sp>
+      <p:sp>
+        <p:nvSpPr>
+          <p:cNvPr id="23" name="TextBox 22">
+            <a:extLst>
+              <a:ext uri="{FF2B5EF4-FFF2-40B4-BE49-F238E27FC236}">
+                <a16:creationId xmlns:a16="http://schemas.microsoft.com/office/drawing/2014/main" id="{66ABDF79-5F07-4844-BEC4-9D198916BE19}"/>
+              </a:ext>
+            </a:extLst>
+          </p:cNvPr>
+          <p:cNvSpPr txBox="1"/>
+          <p:nvPr/>
+        </p:nvSpPr>
+        <p:spPr>
+          <a:xfrm rot="16200000">
+            <a:off x="5176732" y="3063672"/>
+            <a:ext cx="1875934" cy="261610"/>
+          </a:xfrm>
+          <a:prstGeom prst="rect">
+            <a:avLst/>
+          </a:prstGeom>
+          <a:noFill/>
+        </p:spPr>
+        <p:txBody>
+          <a:bodyPr wrap="square" rtlCol="0">
+            <a:spAutoFit/>
+          </a:bodyPr>
+          <a:lstStyle/>
+          <a:p>
+            <a:r>
+              <a:rPr lang="en-US" sz="1100" dirty="0"/>
+              <a:t># of Sightings</a:t>
+            </a:r>
+          </a:p>
+        </p:txBody>
+      </p:sp>
+      <p:sp>
+        <p:nvSpPr>
+          <p:cNvPr id="24" name="TextBox 23">
+            <a:extLst>
+              <a:ext uri="{FF2B5EF4-FFF2-40B4-BE49-F238E27FC236}">
+                <a16:creationId xmlns:a16="http://schemas.microsoft.com/office/drawing/2014/main" id="{967B0CA2-A682-454A-962C-05F92637232B}"/>
+              </a:ext>
+            </a:extLst>
+          </p:cNvPr>
+          <p:cNvSpPr txBox="1"/>
+          <p:nvPr/>
+        </p:nvSpPr>
+        <p:spPr>
+          <a:xfrm>
+            <a:off x="1359084" y="163477"/>
+            <a:ext cx="4496871" cy="584775"/>
+          </a:xfrm>
+          <a:prstGeom prst="rect">
+            <a:avLst/>
+          </a:prstGeom>
+          <a:noFill/>
+        </p:spPr>
+        <p:txBody>
+          <a:bodyPr wrap="square" rtlCol="0">
+            <a:spAutoFit/>
+          </a:bodyPr>
+          <a:lstStyle/>
+          <a:p>
+            <a:r>
+              <a:rPr lang="en-US" sz="3200" dirty="0"/>
+              <a:t>Where Will I See</a:t>
+            </a:r>
+            <a:r>
+              <a:rPr lang="en-US" sz="2800" dirty="0"/>
+              <a:t> </a:t>
+            </a:r>
+            <a:r>
+              <a:rPr lang="en-US" sz="3200" dirty="0"/>
+              <a:t>a UFO?</a:t>
+            </a:r>
+            <a:endParaRPr lang="en-US" sz="2800" dirty="0"/>
           </a:p>
         </p:txBody>
       </p:sp>
@@ -12978,7 +13023,7 @@
           <p:cNvPr id="4" name="Picture 3">
             <a:extLst>
               <a:ext uri="{FF2B5EF4-FFF2-40B4-BE49-F238E27FC236}">
-                <a16:creationId xmlns:a16="http://schemas.microsoft.com/office/drawing/2014/main" id="{0B095A7C-DAFC-4F18-857D-6172CD7D5A11}"/>
+                <a16:creationId xmlns:a16="http://schemas.microsoft.com/office/drawing/2014/main" id="{F5AE892B-066E-491B-9D67-FFAE435A4CDD}"/>
               </a:ext>
             </a:extLst>
           </p:cNvPr>
@@ -12995,15 +13040,15 @@
         </p:blipFill>
         <p:spPr>
           <a:xfrm>
-            <a:off x="1626831" y="1900158"/>
-            <a:ext cx="4267073" cy="3429679"/>
+            <a:off x="2176410" y="4303851"/>
+            <a:ext cx="3479792" cy="2390671"/>
           </a:xfrm>
           <a:prstGeom prst="rect">
             <a:avLst/>
           </a:prstGeom>
           <a:ln>
             <a:solidFill>
-              <a:schemeClr val="tx2"/>
+              <a:schemeClr val="tx1"/>
             </a:solidFill>
           </a:ln>
           <a:effectLst>
@@ -13015,89 +13060,94 @@
           </a:effectLst>
         </p:spPr>
       </p:pic>
-      <p:sp>
-        <p:nvSpPr>
-          <p:cNvPr id="5" name="TextBox 4">
+      <p:pic>
+        <p:nvPicPr>
+          <p:cNvPr id="20" name="Picture 19">
             <a:extLst>
               <a:ext uri="{FF2B5EF4-FFF2-40B4-BE49-F238E27FC236}">
-                <a16:creationId xmlns:a16="http://schemas.microsoft.com/office/drawing/2014/main" id="{CD251D4B-2747-44C5-820F-CFDD74DCF907}"/>
+                <a16:creationId xmlns:a16="http://schemas.microsoft.com/office/drawing/2014/main" id="{A6920322-97D8-433E-9895-6CE842B375CB}"/>
               </a:ext>
             </a:extLst>
           </p:cNvPr>
-          <p:cNvSpPr txBox="1"/>
+          <p:cNvPicPr>
+            <a:picLocks noChangeAspect="1"/>
+          </p:cNvPicPr>
           <p:nvPr/>
-        </p:nvSpPr>
-        <p:spPr>
-          <a:xfrm>
-            <a:off x="1617405" y="1574672"/>
-            <a:ext cx="3362479" cy="338554"/>
+        </p:nvPicPr>
+        <p:blipFill>
+          <a:blip r:embed="rId6"/>
+          <a:stretch>
+            <a:fillRect/>
+          </a:stretch>
+        </p:blipFill>
+        <p:spPr>
+          <a:xfrm>
+            <a:off x="6267627" y="1960757"/>
+            <a:ext cx="4112871" cy="3344304"/>
           </a:xfrm>
           <a:prstGeom prst="rect">
             <a:avLst/>
           </a:prstGeom>
-          <a:noFill/>
-        </p:spPr>
-        <p:txBody>
-          <a:bodyPr wrap="square" rtlCol="0">
-            <a:spAutoFit/>
-          </a:bodyPr>
-          <a:lstStyle/>
-          <a:p>
-            <a:r>
-              <a:rPr lang="en-US" sz="1600" dirty="0"/>
-              <a:t>Hour vs. Day of the Week</a:t>
-            </a:r>
-          </a:p>
-        </p:txBody>
-      </p:sp>
-      <p:sp>
-        <p:nvSpPr>
-          <p:cNvPr id="6" name="TextBox 5">
+          <a:ln>
+            <a:solidFill>
+              <a:schemeClr val="tx1"/>
+            </a:solidFill>
+          </a:ln>
+          <a:effectLst>
+            <a:outerShdw blurRad="50800" dist="38100" dir="2700000" algn="tl" rotWithShape="0">
+              <a:prstClr val="black">
+                <a:alpha val="40000"/>
+              </a:prstClr>
+            </a:outerShdw>
+          </a:effectLst>
+        </p:spPr>
+      </p:pic>
+      <p:pic>
+        <p:nvPicPr>
+          <p:cNvPr id="5" name="Picture 4">
             <a:extLst>
               <a:ext uri="{FF2B5EF4-FFF2-40B4-BE49-F238E27FC236}">
-                <a16:creationId xmlns:a16="http://schemas.microsoft.com/office/drawing/2014/main" id="{099D9FFB-88CD-445A-BF08-589858D83480}"/>
+                <a16:creationId xmlns:a16="http://schemas.microsoft.com/office/drawing/2014/main" id="{4F4A2661-6CA0-48D7-BFE0-C2109E35DFA7}"/>
               </a:ext>
             </a:extLst>
           </p:cNvPr>
-          <p:cNvSpPr txBox="1"/>
+          <p:cNvPicPr>
+            <a:picLocks noChangeAspect="1"/>
+          </p:cNvPicPr>
           <p:nvPr/>
-        </p:nvSpPr>
-        <p:spPr>
-          <a:xfrm>
-            <a:off x="1359084" y="163477"/>
-            <a:ext cx="5846786" cy="584775"/>
+        </p:nvPicPr>
+        <p:blipFill>
+          <a:blip r:embed="rId7"/>
+          <a:stretch>
+            <a:fillRect/>
+          </a:stretch>
+        </p:blipFill>
+        <p:spPr>
+          <a:xfrm>
+            <a:off x="2176409" y="1249135"/>
+            <a:ext cx="3547513" cy="2468099"/>
           </a:xfrm>
           <a:prstGeom prst="rect">
             <a:avLst/>
           </a:prstGeom>
-          <a:noFill/>
-        </p:spPr>
-        <p:txBody>
-          <a:bodyPr wrap="square" rtlCol="0">
-            <a:spAutoFit/>
-          </a:bodyPr>
-          <a:lstStyle/>
-          <a:p>
-            <a:r>
-              <a:rPr lang="en-US" sz="3200" dirty="0"/>
-              <a:t>When Will I See</a:t>
-            </a:r>
-            <a:r>
-              <a:rPr lang="en-US" sz="2800" dirty="0"/>
-              <a:t> </a:t>
-            </a:r>
-            <a:r>
-              <a:rPr lang="en-US" sz="3200" dirty="0"/>
-              <a:t>a UFO (cont.) ?</a:t>
-            </a:r>
-            <a:endParaRPr lang="en-US" sz="2800" dirty="0"/>
-          </a:p>
-        </p:txBody>
-      </p:sp>
+          <a:ln>
+            <a:solidFill>
+              <a:schemeClr val="tx1"/>
+            </a:solidFill>
+          </a:ln>
+          <a:effectLst>
+            <a:outerShdw blurRad="50800" dist="38100" dir="2700000" algn="tl" rotWithShape="0">
+              <a:prstClr val="black">
+                <a:alpha val="40000"/>
+              </a:prstClr>
+            </a:outerShdw>
+          </a:effectLst>
+        </p:spPr>
+      </p:pic>
     </p:spTree>
     <p:extLst>
       <p:ext uri="{BB962C8B-B14F-4D97-AF65-F5344CB8AC3E}">
-        <p14:creationId xmlns:p14="http://schemas.microsoft.com/office/powerpoint/2010/main" val="715460893"/>
+        <p14:creationId xmlns:p14="http://schemas.microsoft.com/office/powerpoint/2010/main" val="2876869488"/>
       </p:ext>
     </p:extLst>
   </p:cSld>
@@ -13126,10 +13176,10 @@
       </p:grpSpPr>
       <p:pic>
         <p:nvPicPr>
-          <p:cNvPr id="6" name="Graphic 5" descr="Rocket">
+          <p:cNvPr id="18" name="Graphic 17" descr="Rocket">
             <a:extLst>
               <a:ext uri="{FF2B5EF4-FFF2-40B4-BE49-F238E27FC236}">
-                <a16:creationId xmlns:a16="http://schemas.microsoft.com/office/drawing/2014/main" id="{A5B04463-13BD-4A78-BE3D-A05A69074A05}"/>
+                <a16:creationId xmlns:a16="http://schemas.microsoft.com/office/drawing/2014/main" id="{F7B322E4-7E9C-42C5-B7FC-C024C57AEF8F}"/>
               </a:ext>
             </a:extLst>
           </p:cNvPr>
@@ -13155,7 +13205,7 @@
         </p:blipFill>
         <p:spPr>
           <a:xfrm>
-            <a:off x="9987775" y="4925523"/>
+            <a:off x="9987775" y="4897243"/>
             <a:ext cx="1832518" cy="1832518"/>
           </a:xfrm>
           <a:prstGeom prst="rect">
@@ -13163,12 +13213,161 @@
           </a:prstGeom>
         </p:spPr>
       </p:pic>
+      <p:sp>
+        <p:nvSpPr>
+          <p:cNvPr id="9" name="TextBox 8">
+            <a:extLst>
+              <a:ext uri="{FF2B5EF4-FFF2-40B4-BE49-F238E27FC236}">
+                <a16:creationId xmlns:a16="http://schemas.microsoft.com/office/drawing/2014/main" id="{C43A5036-77F4-4E80-A14C-F806A75EA570}"/>
+              </a:ext>
+            </a:extLst>
+          </p:cNvPr>
+          <p:cNvSpPr txBox="1"/>
+          <p:nvPr/>
+        </p:nvSpPr>
+        <p:spPr>
+          <a:xfrm>
+            <a:off x="6712776" y="3386033"/>
+            <a:ext cx="3362479" cy="338554"/>
+          </a:xfrm>
+          <a:prstGeom prst="rect">
+            <a:avLst/>
+          </a:prstGeom>
+          <a:noFill/>
+        </p:spPr>
+        <p:txBody>
+          <a:bodyPr wrap="square" rtlCol="0">
+            <a:spAutoFit/>
+          </a:bodyPr>
+          <a:lstStyle/>
+          <a:p>
+            <a:r>
+              <a:rPr lang="en-US" sz="1600" dirty="0"/>
+              <a:t>Severe Weather Day of Sighting</a:t>
+            </a:r>
+          </a:p>
+        </p:txBody>
+      </p:sp>
+      <p:sp>
+        <p:nvSpPr>
+          <p:cNvPr id="11" name="TextBox 10">
+            <a:extLst>
+              <a:ext uri="{FF2B5EF4-FFF2-40B4-BE49-F238E27FC236}">
+                <a16:creationId xmlns:a16="http://schemas.microsoft.com/office/drawing/2014/main" id="{F359E3CE-C6A0-4E5D-B804-A6B499D0584C}"/>
+              </a:ext>
+            </a:extLst>
+          </p:cNvPr>
+          <p:cNvSpPr txBox="1"/>
+          <p:nvPr/>
+        </p:nvSpPr>
+        <p:spPr>
+          <a:xfrm>
+            <a:off x="2261167" y="748252"/>
+            <a:ext cx="1903728" cy="338554"/>
+          </a:xfrm>
+          <a:prstGeom prst="rect">
+            <a:avLst/>
+          </a:prstGeom>
+          <a:noFill/>
+        </p:spPr>
+        <p:txBody>
+          <a:bodyPr wrap="square" rtlCol="0">
+            <a:spAutoFit/>
+          </a:bodyPr>
+          <a:lstStyle/>
+          <a:p>
+            <a:r>
+              <a:rPr lang="en-US" sz="1600" dirty="0"/>
+              <a:t>Day of the Week</a:t>
+            </a:r>
+          </a:p>
+        </p:txBody>
+      </p:sp>
+      <p:sp>
+        <p:nvSpPr>
+          <p:cNvPr id="12" name="TextBox 11">
+            <a:extLst>
+              <a:ext uri="{FF2B5EF4-FFF2-40B4-BE49-F238E27FC236}">
+                <a16:creationId xmlns:a16="http://schemas.microsoft.com/office/drawing/2014/main" id="{0E98773B-9D20-43CD-9B0A-433BC28521C9}"/>
+              </a:ext>
+            </a:extLst>
+          </p:cNvPr>
+          <p:cNvSpPr txBox="1"/>
+          <p:nvPr/>
+        </p:nvSpPr>
+        <p:spPr>
+          <a:xfrm>
+            <a:off x="1359084" y="163477"/>
+            <a:ext cx="4178115" cy="584775"/>
+          </a:xfrm>
+          <a:prstGeom prst="rect">
+            <a:avLst/>
+          </a:prstGeom>
+          <a:noFill/>
+        </p:spPr>
+        <p:txBody>
+          <a:bodyPr wrap="square" rtlCol="0">
+            <a:spAutoFit/>
+          </a:bodyPr>
+          <a:lstStyle/>
+          <a:p>
+            <a:r>
+              <a:rPr lang="en-US" sz="3200" dirty="0"/>
+              <a:t>When Will I See</a:t>
+            </a:r>
+            <a:r>
+              <a:rPr lang="en-US" sz="2800" dirty="0"/>
+              <a:t> </a:t>
+            </a:r>
+            <a:r>
+              <a:rPr lang="en-US" sz="3200" dirty="0"/>
+              <a:t>a UFO?</a:t>
+            </a:r>
+            <a:endParaRPr lang="en-US" sz="2800" dirty="0"/>
+          </a:p>
+        </p:txBody>
+      </p:sp>
+      <p:sp>
+        <p:nvSpPr>
+          <p:cNvPr id="14" name="TextBox 13">
+            <a:extLst>
+              <a:ext uri="{FF2B5EF4-FFF2-40B4-BE49-F238E27FC236}">
+                <a16:creationId xmlns:a16="http://schemas.microsoft.com/office/drawing/2014/main" id="{9D61D4F5-DB81-46EE-92B3-A324A4C5D024}"/>
+              </a:ext>
+            </a:extLst>
+          </p:cNvPr>
+          <p:cNvSpPr txBox="1"/>
+          <p:nvPr/>
+        </p:nvSpPr>
+        <p:spPr>
+          <a:xfrm>
+            <a:off x="2185425" y="3521127"/>
+            <a:ext cx="1903728" cy="338554"/>
+          </a:xfrm>
+          <a:prstGeom prst="rect">
+            <a:avLst/>
+          </a:prstGeom>
+          <a:noFill/>
+        </p:spPr>
+        <p:txBody>
+          <a:bodyPr wrap="square" rtlCol="0">
+            <a:spAutoFit/>
+          </a:bodyPr>
+          <a:lstStyle/>
+          <a:p>
+            <a:r>
+              <a:rPr lang="en-US" sz="1600" dirty="0"/>
+              <a:t>Month</a:t>
+            </a:r>
+          </a:p>
+        </p:txBody>
+      </p:sp>
       <p:pic>
         <p:nvPicPr>
-          <p:cNvPr id="2" name="Picture 1">
+          <p:cNvPr id="15" name="Picture 14">
             <a:extLst>
               <a:ext uri="{FF2B5EF4-FFF2-40B4-BE49-F238E27FC236}">
-                <a16:creationId xmlns:a16="http://schemas.microsoft.com/office/drawing/2014/main" id="{D9A08261-73AC-44DE-8AF8-0C737164A33A}"/>
+                <a16:creationId xmlns:a16="http://schemas.microsoft.com/office/drawing/2014/main" id="{E12D8DC1-C99F-44B2-82B0-36EC1D35DBD9}"/>
               </a:ext>
             </a:extLst>
           </p:cNvPr>
@@ -13185,8 +13384,8 @@
         </p:blipFill>
         <p:spPr>
           <a:xfrm>
-            <a:off x="6972666" y="748252"/>
-            <a:ext cx="3134380" cy="2001294"/>
+            <a:off x="2261167" y="1109485"/>
+            <a:ext cx="3508382" cy="2114715"/>
           </a:xfrm>
           <a:prstGeom prst="rect">
             <a:avLst/>
@@ -13207,10 +13406,10 @@
       </p:pic>
       <p:sp>
         <p:nvSpPr>
-          <p:cNvPr id="3" name="TextBox 2">
+          <p:cNvPr id="17" name="TextBox 16">
             <a:extLst>
               <a:ext uri="{FF2B5EF4-FFF2-40B4-BE49-F238E27FC236}">
-                <a16:creationId xmlns:a16="http://schemas.microsoft.com/office/drawing/2014/main" id="{0AF3E9BB-D449-412D-BA81-5E4680D0227E}"/>
+                <a16:creationId xmlns:a16="http://schemas.microsoft.com/office/drawing/2014/main" id="{59E42BF4-348C-44AB-BF0A-3016E7087B89}"/>
               </a:ext>
             </a:extLst>
           </p:cNvPr>
@@ -13219,8 +13418,8 @@
         </p:nvSpPr>
         <p:spPr>
           <a:xfrm>
-            <a:off x="7766857" y="287403"/>
-            <a:ext cx="1811414" cy="369332"/>
+            <a:off x="6798842" y="688462"/>
+            <a:ext cx="1903728" cy="338554"/>
           </a:xfrm>
           <a:prstGeom prst="rect">
             <a:avLst/>
@@ -13234,18 +13433,88 @@
           <a:lstStyle/>
           <a:p>
             <a:r>
-              <a:rPr lang="en-US" dirty="0"/>
-              <a:t>Shape vs. Hour </a:t>
+              <a:rPr lang="en-US" sz="1600" dirty="0"/>
+              <a:t>Day of the Year</a:t>
+            </a:r>
+          </a:p>
+        </p:txBody>
+      </p:sp>
+      <p:sp>
+        <p:nvSpPr>
+          <p:cNvPr id="19" name="TextBox 18">
+            <a:extLst>
+              <a:ext uri="{FF2B5EF4-FFF2-40B4-BE49-F238E27FC236}">
+                <a16:creationId xmlns:a16="http://schemas.microsoft.com/office/drawing/2014/main" id="{02A654C0-13DC-4E96-9C7E-B2B75065C928}"/>
+              </a:ext>
+            </a:extLst>
+          </p:cNvPr>
+          <p:cNvSpPr txBox="1"/>
+          <p:nvPr/>
+        </p:nvSpPr>
+        <p:spPr>
+          <a:xfrm rot="16200000">
+            <a:off x="5730070" y="1605330"/>
+            <a:ext cx="1875934" cy="261610"/>
+          </a:xfrm>
+          <a:prstGeom prst="rect">
+            <a:avLst/>
+          </a:prstGeom>
+          <a:noFill/>
+        </p:spPr>
+        <p:txBody>
+          <a:bodyPr wrap="square" rtlCol="0">
+            <a:spAutoFit/>
+          </a:bodyPr>
+          <a:lstStyle/>
+          <a:p>
+            <a:r>
+              <a:rPr lang="en-US" sz="1100" dirty="0"/>
+              <a:t># of Sightings</a:t>
+            </a:r>
+          </a:p>
+        </p:txBody>
+      </p:sp>
+      <p:sp>
+        <p:nvSpPr>
+          <p:cNvPr id="20" name="TextBox 19">
+            <a:extLst>
+              <a:ext uri="{FF2B5EF4-FFF2-40B4-BE49-F238E27FC236}">
+                <a16:creationId xmlns:a16="http://schemas.microsoft.com/office/drawing/2014/main" id="{34EBD0DF-BC05-41C1-A32D-93BB2D58A31F}"/>
+              </a:ext>
+            </a:extLst>
+          </p:cNvPr>
+          <p:cNvSpPr txBox="1"/>
+          <p:nvPr/>
+        </p:nvSpPr>
+        <p:spPr>
+          <a:xfrm rot="16200000">
+            <a:off x="5661212" y="4378801"/>
+            <a:ext cx="1875934" cy="261610"/>
+          </a:xfrm>
+          <a:prstGeom prst="rect">
+            <a:avLst/>
+          </a:prstGeom>
+          <a:noFill/>
+        </p:spPr>
+        <p:txBody>
+          <a:bodyPr wrap="square" rtlCol="0">
+            <a:spAutoFit/>
+          </a:bodyPr>
+          <a:lstStyle/>
+          <a:p>
+            <a:r>
+              <a:rPr lang="en-US" sz="1100" dirty="0"/>
+              <a:t># of Sightings</a:t>
             </a:r>
           </a:p>
         </p:txBody>
       </p:sp>
       <p:pic>
         <p:nvPicPr>
-          <p:cNvPr id="4" name="Picture 3">
+          <p:cNvPr id="6" name="Picture 5">
             <a:extLst>
               <a:ext uri="{FF2B5EF4-FFF2-40B4-BE49-F238E27FC236}">
-                <a16:creationId xmlns:a16="http://schemas.microsoft.com/office/drawing/2014/main" id="{6A197149-6BF5-40E8-BEB0-585DBFD01640}"/>
+                <a16:creationId xmlns:a16="http://schemas.microsoft.com/office/drawing/2014/main" id="{C658D38E-A6F9-4BD7-B2B6-ECE3457955AF}"/>
               </a:ext>
             </a:extLst>
           </p:cNvPr>
@@ -13262,8 +13531,8 @@
         </p:blipFill>
         <p:spPr>
           <a:xfrm>
-            <a:off x="1177124" y="1236759"/>
-            <a:ext cx="5270810" cy="4698179"/>
+            <a:off x="6755517" y="3750093"/>
+            <a:ext cx="3232258" cy="2631903"/>
           </a:xfrm>
           <a:prstGeom prst="rect">
             <a:avLst/>
@@ -13282,6 +13551,278 @@
           </a:effectLst>
         </p:spPr>
       </p:pic>
+      <p:pic>
+        <p:nvPicPr>
+          <p:cNvPr id="8" name="Picture 7">
+            <a:extLst>
+              <a:ext uri="{FF2B5EF4-FFF2-40B4-BE49-F238E27FC236}">
+                <a16:creationId xmlns:a16="http://schemas.microsoft.com/office/drawing/2014/main" id="{E15C4531-C382-4146-9AF8-10B1E74D75F3}"/>
+              </a:ext>
+            </a:extLst>
+          </p:cNvPr>
+          <p:cNvPicPr>
+            <a:picLocks noChangeAspect="1"/>
+          </p:cNvPicPr>
+          <p:nvPr/>
+        </p:nvPicPr>
+        <p:blipFill>
+          <a:blip r:embed="rId7"/>
+          <a:stretch>
+            <a:fillRect/>
+          </a:stretch>
+        </p:blipFill>
+        <p:spPr>
+          <a:xfrm>
+            <a:off x="6841144" y="1022521"/>
+            <a:ext cx="3146631" cy="2263841"/>
+          </a:xfrm>
+          <a:prstGeom prst="rect">
+            <a:avLst/>
+          </a:prstGeom>
+          <a:ln>
+            <a:solidFill>
+              <a:schemeClr val="tx1"/>
+            </a:solidFill>
+          </a:ln>
+          <a:effectLst>
+            <a:outerShdw blurRad="50800" dist="38100" dir="2700000" algn="tl" rotWithShape="0">
+              <a:prstClr val="black">
+                <a:alpha val="40000"/>
+              </a:prstClr>
+            </a:outerShdw>
+          </a:effectLst>
+        </p:spPr>
+      </p:pic>
+      <p:pic>
+        <p:nvPicPr>
+          <p:cNvPr id="16" name="Picture 15">
+            <a:extLst>
+              <a:ext uri="{FF2B5EF4-FFF2-40B4-BE49-F238E27FC236}">
+                <a16:creationId xmlns:a16="http://schemas.microsoft.com/office/drawing/2014/main" id="{6EC2C3AB-4C29-42F7-A5E6-D422385D6A7A}"/>
+              </a:ext>
+            </a:extLst>
+          </p:cNvPr>
+          <p:cNvPicPr>
+            <a:picLocks noChangeAspect="1"/>
+          </p:cNvPicPr>
+          <p:nvPr/>
+        </p:nvPicPr>
+        <p:blipFill>
+          <a:blip r:embed="rId8"/>
+          <a:stretch>
+            <a:fillRect/>
+          </a:stretch>
+        </p:blipFill>
+        <p:spPr>
+          <a:xfrm>
+            <a:off x="2239869" y="3852318"/>
+            <a:ext cx="3770155" cy="2441683"/>
+          </a:xfrm>
+          <a:prstGeom prst="rect">
+            <a:avLst/>
+          </a:prstGeom>
+          <a:ln>
+            <a:solidFill>
+              <a:schemeClr val="tx1"/>
+            </a:solidFill>
+          </a:ln>
+          <a:effectLst>
+            <a:outerShdw blurRad="50800" dist="38100" dir="2700000" algn="tl" rotWithShape="0">
+              <a:prstClr val="black">
+                <a:alpha val="40000"/>
+              </a:prstClr>
+            </a:outerShdw>
+          </a:effectLst>
+        </p:spPr>
+      </p:pic>
+    </p:spTree>
+    <p:extLst>
+      <p:ext uri="{BB962C8B-B14F-4D97-AF65-F5344CB8AC3E}">
+        <p14:creationId xmlns:p14="http://schemas.microsoft.com/office/powerpoint/2010/main" val="1731050523"/>
+      </p:ext>
+    </p:extLst>
+  </p:cSld>
+  <p:clrMapOvr>
+    <a:masterClrMapping/>
+  </p:clrMapOvr>
+</p:sld>
+</file>
+
+<file path=ppt/slides/slide24.xml><?xml version="1.0" encoding="utf-8"?>
+<p:sld xmlns:a="http://schemas.openxmlformats.org/drawingml/2006/main" xmlns:r="http://schemas.openxmlformats.org/officeDocument/2006/relationships" xmlns:p="http://schemas.openxmlformats.org/presentationml/2006/main">
+  <p:cSld>
+    <p:spTree>
+      <p:nvGrpSpPr>
+        <p:cNvPr id="1" name=""/>
+        <p:cNvGrpSpPr/>
+        <p:nvPr/>
+      </p:nvGrpSpPr>
+      <p:grpSpPr>
+        <a:xfrm>
+          <a:off x="0" y="0"/>
+          <a:ext cx="0" cy="0"/>
+          <a:chOff x="0" y="0"/>
+          <a:chExt cx="0" cy="0"/>
+        </a:xfrm>
+      </p:grpSpPr>
+      <p:pic>
+        <p:nvPicPr>
+          <p:cNvPr id="6" name="Graphic 5" descr="Rocket">
+            <a:extLst>
+              <a:ext uri="{FF2B5EF4-FFF2-40B4-BE49-F238E27FC236}">
+                <a16:creationId xmlns:a16="http://schemas.microsoft.com/office/drawing/2014/main" id="{A5B04463-13BD-4A78-BE3D-A05A69074A05}"/>
+              </a:ext>
+            </a:extLst>
+          </p:cNvPr>
+          <p:cNvPicPr>
+            <a:picLocks noChangeAspect="1"/>
+          </p:cNvPicPr>
+          <p:nvPr/>
+        </p:nvPicPr>
+        <p:blipFill>
+          <a:blip r:embed="rId3">
+            <a:extLst>
+              <a:ext uri="{28A0092B-C50C-407E-A947-70E740481C1C}">
+                <a14:useLocalDpi xmlns:a14="http://schemas.microsoft.com/office/drawing/2010/main" val="0"/>
+              </a:ext>
+              <a:ext uri="{96DAC541-7B7A-43D3-8B79-37D633B846F1}">
+                <asvg:svgBlip xmlns:asvg="http://schemas.microsoft.com/office/drawing/2016/SVG/main" r:embed="rId4"/>
+              </a:ext>
+            </a:extLst>
+          </a:blip>
+          <a:stretch>
+            <a:fillRect/>
+          </a:stretch>
+        </p:blipFill>
+        <p:spPr>
+          <a:xfrm>
+            <a:off x="9987775" y="4925523"/>
+            <a:ext cx="1832518" cy="1832518"/>
+          </a:xfrm>
+          <a:prstGeom prst="rect">
+            <a:avLst/>
+          </a:prstGeom>
+        </p:spPr>
+      </p:pic>
+      <p:pic>
+        <p:nvPicPr>
+          <p:cNvPr id="2" name="Picture 1">
+            <a:extLst>
+              <a:ext uri="{FF2B5EF4-FFF2-40B4-BE49-F238E27FC236}">
+                <a16:creationId xmlns:a16="http://schemas.microsoft.com/office/drawing/2014/main" id="{D9A08261-73AC-44DE-8AF8-0C737164A33A}"/>
+              </a:ext>
+            </a:extLst>
+          </p:cNvPr>
+          <p:cNvPicPr>
+            <a:picLocks noChangeAspect="1"/>
+          </p:cNvPicPr>
+          <p:nvPr/>
+        </p:nvPicPr>
+        <p:blipFill>
+          <a:blip r:embed="rId5"/>
+          <a:stretch>
+            <a:fillRect/>
+          </a:stretch>
+        </p:blipFill>
+        <p:spPr>
+          <a:xfrm>
+            <a:off x="6972666" y="748252"/>
+            <a:ext cx="3134380" cy="2001294"/>
+          </a:xfrm>
+          <a:prstGeom prst="rect">
+            <a:avLst/>
+          </a:prstGeom>
+          <a:ln>
+            <a:solidFill>
+              <a:schemeClr val="tx2"/>
+            </a:solidFill>
+          </a:ln>
+          <a:effectLst>
+            <a:outerShdw blurRad="50800" dist="38100" dir="2700000" algn="tl" rotWithShape="0">
+              <a:prstClr val="black">
+                <a:alpha val="40000"/>
+              </a:prstClr>
+            </a:outerShdw>
+          </a:effectLst>
+        </p:spPr>
+      </p:pic>
+      <p:sp>
+        <p:nvSpPr>
+          <p:cNvPr id="3" name="TextBox 2">
+            <a:extLst>
+              <a:ext uri="{FF2B5EF4-FFF2-40B4-BE49-F238E27FC236}">
+                <a16:creationId xmlns:a16="http://schemas.microsoft.com/office/drawing/2014/main" id="{0AF3E9BB-D449-412D-BA81-5E4680D0227E}"/>
+              </a:ext>
+            </a:extLst>
+          </p:cNvPr>
+          <p:cNvSpPr txBox="1"/>
+          <p:nvPr/>
+        </p:nvSpPr>
+        <p:spPr>
+          <a:xfrm>
+            <a:off x="7766857" y="287403"/>
+            <a:ext cx="1811414" cy="369332"/>
+          </a:xfrm>
+          <a:prstGeom prst="rect">
+            <a:avLst/>
+          </a:prstGeom>
+          <a:noFill/>
+        </p:spPr>
+        <p:txBody>
+          <a:bodyPr wrap="square" rtlCol="0">
+            <a:spAutoFit/>
+          </a:bodyPr>
+          <a:lstStyle/>
+          <a:p>
+            <a:r>
+              <a:rPr lang="en-US" dirty="0"/>
+              <a:t>Shape vs. Hour </a:t>
+            </a:r>
+          </a:p>
+        </p:txBody>
+      </p:sp>
+      <p:pic>
+        <p:nvPicPr>
+          <p:cNvPr id="4" name="Picture 3">
+            <a:extLst>
+              <a:ext uri="{FF2B5EF4-FFF2-40B4-BE49-F238E27FC236}">
+                <a16:creationId xmlns:a16="http://schemas.microsoft.com/office/drawing/2014/main" id="{6A197149-6BF5-40E8-BEB0-585DBFD01640}"/>
+              </a:ext>
+            </a:extLst>
+          </p:cNvPr>
+          <p:cNvPicPr>
+            <a:picLocks noChangeAspect="1"/>
+          </p:cNvPicPr>
+          <p:nvPr/>
+        </p:nvPicPr>
+        <p:blipFill>
+          <a:blip r:embed="rId6"/>
+          <a:stretch>
+            <a:fillRect/>
+          </a:stretch>
+        </p:blipFill>
+        <p:spPr>
+          <a:xfrm>
+            <a:off x="1177124" y="1236759"/>
+            <a:ext cx="5270810" cy="4698179"/>
+          </a:xfrm>
+          <a:prstGeom prst="rect">
+            <a:avLst/>
+          </a:prstGeom>
+          <a:ln>
+            <a:solidFill>
+              <a:schemeClr val="tx1"/>
+            </a:solidFill>
+          </a:ln>
+          <a:effectLst>
+            <a:outerShdw blurRad="50800" dist="38100" dir="2700000" algn="tl" rotWithShape="0">
+              <a:prstClr val="black">
+                <a:alpha val="40000"/>
+              </a:prstClr>
+            </a:outerShdw>
+          </a:effectLst>
+        </p:spPr>
+      </p:pic>
       <p:sp>
         <p:nvSpPr>
           <p:cNvPr id="7" name="TextBox 6">
@@ -13353,6 +13894,55 @@
           </a:p>
         </p:txBody>
       </p:sp>
+      <p:pic>
+        <p:nvPicPr>
+          <p:cNvPr id="9" name="Picture 8">
+            <a:extLst>
+              <a:ext uri="{FF2B5EF4-FFF2-40B4-BE49-F238E27FC236}">
+                <a16:creationId xmlns:a16="http://schemas.microsoft.com/office/drawing/2014/main" id="{8103D070-1C64-4289-84A0-98D3193C2FFA}"/>
+              </a:ext>
+            </a:extLst>
+          </p:cNvPr>
+          <p:cNvPicPr>
+            <a:picLocks noChangeAspect="1"/>
+          </p:cNvPicPr>
+          <p:nvPr/>
+        </p:nvPicPr>
+        <p:blipFill rotWithShape="1">
+          <a:blip r:embed="rId7">
+            <a:extLst>
+              <a:ext uri="{28A0092B-C50C-407E-A947-70E740481C1C}">
+                <a14:useLocalDpi xmlns:a14="http://schemas.microsoft.com/office/drawing/2010/main" val="0"/>
+              </a:ext>
+            </a:extLst>
+          </a:blip>
+          <a:srcRect l="4530" t="8001" r="13730" b="7282"/>
+          <a:stretch/>
+        </p:blipFill>
+        <p:spPr>
+          <a:xfrm>
+            <a:off x="6682354" y="2902314"/>
+            <a:ext cx="4332522" cy="3207434"/>
+          </a:xfrm>
+          <a:prstGeom prst="rect">
+            <a:avLst/>
+          </a:prstGeom>
+          <a:ln w="38100" cap="sq">
+            <a:solidFill>
+              <a:srgbClr val="000000"/>
+            </a:solidFill>
+            <a:prstDash val="solid"/>
+            <a:miter lim="800000"/>
+          </a:ln>
+          <a:effectLst>
+            <a:outerShdw blurRad="50800" dist="38100" dir="2700000" algn="tl" rotWithShape="0">
+              <a:srgbClr val="000000">
+                <a:alpha val="43000"/>
+              </a:srgbClr>
+            </a:outerShdw>
+          </a:effectLst>
+        </p:spPr>
+      </p:pic>
     </p:spTree>
     <p:extLst>
       <p:ext uri="{BB962C8B-B14F-4D97-AF65-F5344CB8AC3E}">
@@ -13366,7 +13956,7 @@
 </p:sld>
 </file>
 
-<file path=ppt/slides/slide24.xml><?xml version="1.0" encoding="utf-8"?>
+<file path=ppt/slides/slide25.xml><?xml version="1.0" encoding="utf-8"?>
 <p:sld xmlns:a="http://schemas.openxmlformats.org/drawingml/2006/main" xmlns:r="http://schemas.openxmlformats.org/officeDocument/2006/relationships" xmlns:p="http://schemas.openxmlformats.org/presentationml/2006/main">
   <p:cSld>
     <p:spTree>
@@ -14602,12 +15192,53 @@
           <a:chExt cx="0" cy="0"/>
         </a:xfrm>
       </p:grpSpPr>
+      <p:sp>
+        <p:nvSpPr>
+          <p:cNvPr id="2" name="Title 1">
+            <a:extLst>
+              <a:ext uri="{FF2B5EF4-FFF2-40B4-BE49-F238E27FC236}">
+                <a16:creationId xmlns:a16="http://schemas.microsoft.com/office/drawing/2014/main" id="{F28F8191-B500-4586-A46C-868DFA7D008F}"/>
+              </a:ext>
+            </a:extLst>
+          </p:cNvPr>
+          <p:cNvSpPr>
+            <a:spLocks noGrp="1"/>
+          </p:cNvSpPr>
+          <p:nvPr>
+            <p:ph type="title"/>
+          </p:nvPr>
+        </p:nvSpPr>
+        <p:spPr/>
+        <p:txBody>
+          <a:bodyPr/>
+          <a:lstStyle/>
+          <a:p>
+            <a:r>
+              <a:rPr lang="en-US" dirty="0"/>
+              <a:t>Created using </a:t>
+            </a:r>
+            <a:r>
+              <a:rPr lang="en-US" dirty="0" err="1"/>
+              <a:t>mpl_toolkits</a:t>
+            </a:r>
+            <a:r>
+              <a:rPr lang="en-US" dirty="0"/>
+              <a:t>:: </a:t>
+            </a:r>
+            <a:r>
+              <a:rPr lang="en-US" dirty="0" err="1"/>
+              <a:t>basemap</a:t>
+            </a:r>
+            <a:endParaRPr lang="en-US" dirty="0"/>
+          </a:p>
+        </p:txBody>
+      </p:sp>
       <p:pic>
         <p:nvPicPr>
-          <p:cNvPr id="18" name="Graphic 17" descr="Rocket">
+          <p:cNvPr id="6" name="Picture 5">
             <a:extLst>
               <a:ext uri="{FF2B5EF4-FFF2-40B4-BE49-F238E27FC236}">
-                <a16:creationId xmlns:a16="http://schemas.microsoft.com/office/drawing/2014/main" id="{F7B322E4-7E9C-42C5-B7FC-C024C57AEF8F}"/>
+                <a16:creationId xmlns:a16="http://schemas.microsoft.com/office/drawing/2014/main" id="{D9ACFB24-062E-402F-B12B-CC7AEAA41744}"/>
               </a:ext>
             </a:extLst>
           </p:cNvPr>
@@ -14617,13 +15248,10 @@
           <p:nvPr/>
         </p:nvPicPr>
         <p:blipFill>
-          <a:blip r:embed="rId3">
+          <a:blip r:embed="rId2">
             <a:extLst>
               <a:ext uri="{28A0092B-C50C-407E-A947-70E740481C1C}">
                 <a14:useLocalDpi xmlns:a14="http://schemas.microsoft.com/office/drawing/2010/main" val="0"/>
-              </a:ext>
-              <a:ext uri="{96DAC541-7B7A-43D3-8B79-37D633B846F1}">
-                <asvg:svgBlip xmlns:asvg="http://schemas.microsoft.com/office/drawing/2016/SVG/main" r:embed="rId4"/>
               </a:ext>
             </a:extLst>
           </a:blip>
@@ -14633,432 +15261,24 @@
         </p:blipFill>
         <p:spPr>
           <a:xfrm>
-            <a:off x="9987775" y="4897243"/>
-            <a:ext cx="1832518" cy="1832518"/>
+            <a:off x="1495235" y="1662974"/>
+            <a:ext cx="9477565" cy="3795290"/>
           </a:xfrm>
           <a:prstGeom prst="rect">
             <a:avLst/>
           </a:prstGeom>
-        </p:spPr>
-      </p:pic>
-      <p:sp>
-        <p:nvSpPr>
-          <p:cNvPr id="9" name="TextBox 8">
-            <a:extLst>
-              <a:ext uri="{FF2B5EF4-FFF2-40B4-BE49-F238E27FC236}">
-                <a16:creationId xmlns:a16="http://schemas.microsoft.com/office/drawing/2014/main" id="{C43A5036-77F4-4E80-A14C-F806A75EA570}"/>
-              </a:ext>
-            </a:extLst>
-          </p:cNvPr>
-          <p:cNvSpPr txBox="1"/>
-          <p:nvPr/>
-        </p:nvSpPr>
-        <p:spPr>
-          <a:xfrm>
-            <a:off x="6712776" y="3386033"/>
-            <a:ext cx="3362479" cy="338554"/>
-          </a:xfrm>
-          <a:prstGeom prst="rect">
-            <a:avLst/>
-          </a:prstGeom>
-          <a:noFill/>
-        </p:spPr>
-        <p:txBody>
-          <a:bodyPr wrap="square" rtlCol="0">
-            <a:spAutoFit/>
-          </a:bodyPr>
-          <a:lstStyle/>
-          <a:p>
-            <a:r>
-              <a:rPr lang="en-US" sz="1600" dirty="0"/>
-              <a:t>Severe Weather Day of Sighting</a:t>
-            </a:r>
-          </a:p>
-        </p:txBody>
-      </p:sp>
-      <p:sp>
-        <p:nvSpPr>
-          <p:cNvPr id="11" name="TextBox 10">
-            <a:extLst>
-              <a:ext uri="{FF2B5EF4-FFF2-40B4-BE49-F238E27FC236}">
-                <a16:creationId xmlns:a16="http://schemas.microsoft.com/office/drawing/2014/main" id="{F359E3CE-C6A0-4E5D-B804-A6B499D0584C}"/>
-              </a:ext>
-            </a:extLst>
-          </p:cNvPr>
-          <p:cNvSpPr txBox="1"/>
-          <p:nvPr/>
-        </p:nvSpPr>
-        <p:spPr>
-          <a:xfrm>
-            <a:off x="2261167" y="748252"/>
-            <a:ext cx="1903728" cy="338554"/>
-          </a:xfrm>
-          <a:prstGeom prst="rect">
-            <a:avLst/>
-          </a:prstGeom>
-          <a:noFill/>
-        </p:spPr>
-        <p:txBody>
-          <a:bodyPr wrap="square" rtlCol="0">
-            <a:spAutoFit/>
-          </a:bodyPr>
-          <a:lstStyle/>
-          <a:p>
-            <a:r>
-              <a:rPr lang="en-US" sz="1600" dirty="0"/>
-              <a:t>Day of the Week</a:t>
-            </a:r>
-          </a:p>
-        </p:txBody>
-      </p:sp>
-      <p:sp>
-        <p:nvSpPr>
-          <p:cNvPr id="12" name="TextBox 11">
-            <a:extLst>
-              <a:ext uri="{FF2B5EF4-FFF2-40B4-BE49-F238E27FC236}">
-                <a16:creationId xmlns:a16="http://schemas.microsoft.com/office/drawing/2014/main" id="{0E98773B-9D20-43CD-9B0A-433BC28521C9}"/>
-              </a:ext>
-            </a:extLst>
-          </p:cNvPr>
-          <p:cNvSpPr txBox="1"/>
-          <p:nvPr/>
-        </p:nvSpPr>
-        <p:spPr>
-          <a:xfrm>
-            <a:off x="1359084" y="163477"/>
-            <a:ext cx="4178115" cy="584775"/>
-          </a:xfrm>
-          <a:prstGeom prst="rect">
-            <a:avLst/>
-          </a:prstGeom>
-          <a:noFill/>
-        </p:spPr>
-        <p:txBody>
-          <a:bodyPr wrap="square" rtlCol="0">
-            <a:spAutoFit/>
-          </a:bodyPr>
-          <a:lstStyle/>
-          <a:p>
-            <a:r>
-              <a:rPr lang="en-US" sz="3200" dirty="0"/>
-              <a:t>When Will I See</a:t>
-            </a:r>
-            <a:r>
-              <a:rPr lang="en-US" sz="2800" dirty="0"/>
-              <a:t> </a:t>
-            </a:r>
-            <a:r>
-              <a:rPr lang="en-US" sz="3200" dirty="0"/>
-              <a:t>a UFO?</a:t>
-            </a:r>
-            <a:endParaRPr lang="en-US" sz="2800" dirty="0"/>
-          </a:p>
-        </p:txBody>
-      </p:sp>
-      <p:sp>
-        <p:nvSpPr>
-          <p:cNvPr id="14" name="TextBox 13">
-            <a:extLst>
-              <a:ext uri="{FF2B5EF4-FFF2-40B4-BE49-F238E27FC236}">
-                <a16:creationId xmlns:a16="http://schemas.microsoft.com/office/drawing/2014/main" id="{9D61D4F5-DB81-46EE-92B3-A324A4C5D024}"/>
-              </a:ext>
-            </a:extLst>
-          </p:cNvPr>
-          <p:cNvSpPr txBox="1"/>
-          <p:nvPr/>
-        </p:nvSpPr>
-        <p:spPr>
-          <a:xfrm>
-            <a:off x="2185425" y="3521127"/>
-            <a:ext cx="1903728" cy="338554"/>
-          </a:xfrm>
-          <a:prstGeom prst="rect">
-            <a:avLst/>
-          </a:prstGeom>
-          <a:noFill/>
-        </p:spPr>
-        <p:txBody>
-          <a:bodyPr wrap="square" rtlCol="0">
-            <a:spAutoFit/>
-          </a:bodyPr>
-          <a:lstStyle/>
-          <a:p>
-            <a:r>
-              <a:rPr lang="en-US" sz="1600" dirty="0"/>
-              <a:t>Month</a:t>
-            </a:r>
-          </a:p>
-        </p:txBody>
-      </p:sp>
-      <p:pic>
-        <p:nvPicPr>
-          <p:cNvPr id="15" name="Picture 14">
-            <a:extLst>
-              <a:ext uri="{FF2B5EF4-FFF2-40B4-BE49-F238E27FC236}">
-                <a16:creationId xmlns:a16="http://schemas.microsoft.com/office/drawing/2014/main" id="{E12D8DC1-C99F-44B2-82B0-36EC1D35DBD9}"/>
-              </a:ext>
-            </a:extLst>
-          </p:cNvPr>
-          <p:cNvPicPr>
-            <a:picLocks noChangeAspect="1"/>
-          </p:cNvPicPr>
-          <p:nvPr/>
-        </p:nvPicPr>
-        <p:blipFill>
-          <a:blip r:embed="rId5"/>
-          <a:stretch>
-            <a:fillRect/>
-          </a:stretch>
-        </p:blipFill>
-        <p:spPr>
-          <a:xfrm>
-            <a:off x="2261167" y="1109485"/>
-            <a:ext cx="3508382" cy="2114715"/>
-          </a:xfrm>
-          <a:prstGeom prst="rect">
-            <a:avLst/>
-          </a:prstGeom>
-          <a:ln>
+          <a:ln w="38100" cap="sq">
             <a:solidFill>
-              <a:schemeClr val="tx2"/>
+              <a:srgbClr val="000000"/>
             </a:solidFill>
+            <a:prstDash val="solid"/>
+            <a:miter lim="800000"/>
           </a:ln>
           <a:effectLst>
             <a:outerShdw blurRad="50800" dist="38100" dir="2700000" algn="tl" rotWithShape="0">
-              <a:prstClr val="black">
-                <a:alpha val="40000"/>
-              </a:prstClr>
-            </a:outerShdw>
-          </a:effectLst>
-        </p:spPr>
-      </p:pic>
-      <p:sp>
-        <p:nvSpPr>
-          <p:cNvPr id="17" name="TextBox 16">
-            <a:extLst>
-              <a:ext uri="{FF2B5EF4-FFF2-40B4-BE49-F238E27FC236}">
-                <a16:creationId xmlns:a16="http://schemas.microsoft.com/office/drawing/2014/main" id="{59E42BF4-348C-44AB-BF0A-3016E7087B89}"/>
-              </a:ext>
-            </a:extLst>
-          </p:cNvPr>
-          <p:cNvSpPr txBox="1"/>
-          <p:nvPr/>
-        </p:nvSpPr>
-        <p:spPr>
-          <a:xfrm>
-            <a:off x="6798842" y="688462"/>
-            <a:ext cx="1903728" cy="338554"/>
-          </a:xfrm>
-          <a:prstGeom prst="rect">
-            <a:avLst/>
-          </a:prstGeom>
-          <a:noFill/>
-        </p:spPr>
-        <p:txBody>
-          <a:bodyPr wrap="square" rtlCol="0">
-            <a:spAutoFit/>
-          </a:bodyPr>
-          <a:lstStyle/>
-          <a:p>
-            <a:r>
-              <a:rPr lang="en-US" sz="1600" dirty="0"/>
-              <a:t>Day of the Year</a:t>
-            </a:r>
-          </a:p>
-        </p:txBody>
-      </p:sp>
-      <p:sp>
-        <p:nvSpPr>
-          <p:cNvPr id="19" name="TextBox 18">
-            <a:extLst>
-              <a:ext uri="{FF2B5EF4-FFF2-40B4-BE49-F238E27FC236}">
-                <a16:creationId xmlns:a16="http://schemas.microsoft.com/office/drawing/2014/main" id="{02A654C0-13DC-4E96-9C7E-B2B75065C928}"/>
-              </a:ext>
-            </a:extLst>
-          </p:cNvPr>
-          <p:cNvSpPr txBox="1"/>
-          <p:nvPr/>
-        </p:nvSpPr>
-        <p:spPr>
-          <a:xfrm rot="16200000">
-            <a:off x="5730070" y="1605330"/>
-            <a:ext cx="1875934" cy="261610"/>
-          </a:xfrm>
-          <a:prstGeom prst="rect">
-            <a:avLst/>
-          </a:prstGeom>
-          <a:noFill/>
-        </p:spPr>
-        <p:txBody>
-          <a:bodyPr wrap="square" rtlCol="0">
-            <a:spAutoFit/>
-          </a:bodyPr>
-          <a:lstStyle/>
-          <a:p>
-            <a:r>
-              <a:rPr lang="en-US" sz="1100" dirty="0"/>
-              <a:t># of Sightings</a:t>
-            </a:r>
-          </a:p>
-        </p:txBody>
-      </p:sp>
-      <p:sp>
-        <p:nvSpPr>
-          <p:cNvPr id="20" name="TextBox 19">
-            <a:extLst>
-              <a:ext uri="{FF2B5EF4-FFF2-40B4-BE49-F238E27FC236}">
-                <a16:creationId xmlns:a16="http://schemas.microsoft.com/office/drawing/2014/main" id="{34EBD0DF-BC05-41C1-A32D-93BB2D58A31F}"/>
-              </a:ext>
-            </a:extLst>
-          </p:cNvPr>
-          <p:cNvSpPr txBox="1"/>
-          <p:nvPr/>
-        </p:nvSpPr>
-        <p:spPr>
-          <a:xfrm rot="16200000">
-            <a:off x="5661212" y="4378801"/>
-            <a:ext cx="1875934" cy="261610"/>
-          </a:xfrm>
-          <a:prstGeom prst="rect">
-            <a:avLst/>
-          </a:prstGeom>
-          <a:noFill/>
-        </p:spPr>
-        <p:txBody>
-          <a:bodyPr wrap="square" rtlCol="0">
-            <a:spAutoFit/>
-          </a:bodyPr>
-          <a:lstStyle/>
-          <a:p>
-            <a:r>
-              <a:rPr lang="en-US" sz="1100" dirty="0"/>
-              <a:t># of Sightings</a:t>
-            </a:r>
-          </a:p>
-        </p:txBody>
-      </p:sp>
-      <p:pic>
-        <p:nvPicPr>
-          <p:cNvPr id="6" name="Picture 5">
-            <a:extLst>
-              <a:ext uri="{FF2B5EF4-FFF2-40B4-BE49-F238E27FC236}">
-                <a16:creationId xmlns:a16="http://schemas.microsoft.com/office/drawing/2014/main" id="{C658D38E-A6F9-4BD7-B2B6-ECE3457955AF}"/>
-              </a:ext>
-            </a:extLst>
-          </p:cNvPr>
-          <p:cNvPicPr>
-            <a:picLocks noChangeAspect="1"/>
-          </p:cNvPicPr>
-          <p:nvPr/>
-        </p:nvPicPr>
-        <p:blipFill>
-          <a:blip r:embed="rId6"/>
-          <a:stretch>
-            <a:fillRect/>
-          </a:stretch>
-        </p:blipFill>
-        <p:spPr>
-          <a:xfrm>
-            <a:off x="6755517" y="3750093"/>
-            <a:ext cx="3232258" cy="2631903"/>
-          </a:xfrm>
-          <a:prstGeom prst="rect">
-            <a:avLst/>
-          </a:prstGeom>
-          <a:ln>
-            <a:solidFill>
-              <a:schemeClr val="tx1"/>
-            </a:solidFill>
-          </a:ln>
-          <a:effectLst>
-            <a:outerShdw blurRad="50800" dist="38100" dir="2700000" algn="tl" rotWithShape="0">
-              <a:prstClr val="black">
-                <a:alpha val="40000"/>
-              </a:prstClr>
-            </a:outerShdw>
-          </a:effectLst>
-        </p:spPr>
-      </p:pic>
-      <p:pic>
-        <p:nvPicPr>
-          <p:cNvPr id="8" name="Picture 7">
-            <a:extLst>
-              <a:ext uri="{FF2B5EF4-FFF2-40B4-BE49-F238E27FC236}">
-                <a16:creationId xmlns:a16="http://schemas.microsoft.com/office/drawing/2014/main" id="{E15C4531-C382-4146-9AF8-10B1E74D75F3}"/>
-              </a:ext>
-            </a:extLst>
-          </p:cNvPr>
-          <p:cNvPicPr>
-            <a:picLocks noChangeAspect="1"/>
-          </p:cNvPicPr>
-          <p:nvPr/>
-        </p:nvPicPr>
-        <p:blipFill>
-          <a:blip r:embed="rId7"/>
-          <a:stretch>
-            <a:fillRect/>
-          </a:stretch>
-        </p:blipFill>
-        <p:spPr>
-          <a:xfrm>
-            <a:off x="6841144" y="1022521"/>
-            <a:ext cx="3146631" cy="2263841"/>
-          </a:xfrm>
-          <a:prstGeom prst="rect">
-            <a:avLst/>
-          </a:prstGeom>
-          <a:ln>
-            <a:solidFill>
-              <a:schemeClr val="tx1"/>
-            </a:solidFill>
-          </a:ln>
-          <a:effectLst>
-            <a:outerShdw blurRad="50800" dist="38100" dir="2700000" algn="tl" rotWithShape="0">
-              <a:prstClr val="black">
-                <a:alpha val="40000"/>
-              </a:prstClr>
-            </a:outerShdw>
-          </a:effectLst>
-        </p:spPr>
-      </p:pic>
-      <p:pic>
-        <p:nvPicPr>
-          <p:cNvPr id="16" name="Picture 15">
-            <a:extLst>
-              <a:ext uri="{FF2B5EF4-FFF2-40B4-BE49-F238E27FC236}">
-                <a16:creationId xmlns:a16="http://schemas.microsoft.com/office/drawing/2014/main" id="{6EC2C3AB-4C29-42F7-A5E6-D422385D6A7A}"/>
-              </a:ext>
-            </a:extLst>
-          </p:cNvPr>
-          <p:cNvPicPr>
-            <a:picLocks noChangeAspect="1"/>
-          </p:cNvPicPr>
-          <p:nvPr/>
-        </p:nvPicPr>
-        <p:blipFill>
-          <a:blip r:embed="rId8"/>
-          <a:stretch>
-            <a:fillRect/>
-          </a:stretch>
-        </p:blipFill>
-        <p:spPr>
-          <a:xfrm>
-            <a:off x="2239869" y="3852318"/>
-            <a:ext cx="3770155" cy="2441683"/>
-          </a:xfrm>
-          <a:prstGeom prst="rect">
-            <a:avLst/>
-          </a:prstGeom>
-          <a:ln>
-            <a:solidFill>
-              <a:schemeClr val="tx1"/>
-            </a:solidFill>
-          </a:ln>
-          <a:effectLst>
-            <a:outerShdw blurRad="50800" dist="38100" dir="2700000" algn="tl" rotWithShape="0">
-              <a:prstClr val="black">
-                <a:alpha val="40000"/>
-              </a:prstClr>
+              <a:srgbClr val="000000">
+                <a:alpha val="43000"/>
+              </a:srgbClr>
             </a:outerShdw>
           </a:effectLst>
         </p:spPr>
@@ -15066,7 +15286,7 @@
     </p:spTree>
     <p:extLst>
       <p:ext uri="{BB962C8B-B14F-4D97-AF65-F5344CB8AC3E}">
-        <p14:creationId xmlns:p14="http://schemas.microsoft.com/office/powerpoint/2010/main" val="637454812"/>
+        <p14:creationId xmlns:p14="http://schemas.microsoft.com/office/powerpoint/2010/main" val="4286339289"/>
       </p:ext>
     </p:extLst>
   </p:cSld>
@@ -15093,12 +15313,40 @@
           <a:chExt cx="0" cy="0"/>
         </a:xfrm>
       </p:grpSpPr>
+      <p:sp>
+        <p:nvSpPr>
+          <p:cNvPr id="2" name="Title 1">
+            <a:extLst>
+              <a:ext uri="{FF2B5EF4-FFF2-40B4-BE49-F238E27FC236}">
+                <a16:creationId xmlns:a16="http://schemas.microsoft.com/office/drawing/2014/main" id="{F28F8191-B500-4586-A46C-868DFA7D008F}"/>
+              </a:ext>
+            </a:extLst>
+          </p:cNvPr>
+          <p:cNvSpPr>
+            <a:spLocks noGrp="1"/>
+          </p:cNvSpPr>
+          <p:nvPr>
+            <p:ph type="title"/>
+          </p:nvPr>
+        </p:nvSpPr>
+        <p:spPr/>
+        <p:txBody>
+          <a:bodyPr/>
+          <a:lstStyle/>
+          <a:p>
+            <a:r>
+              <a:rPr lang="en-US" dirty="0"/>
+              <a:t>Created using timeseries</a:t>
+            </a:r>
+          </a:p>
+        </p:txBody>
+      </p:sp>
       <p:pic>
         <p:nvPicPr>
-          <p:cNvPr id="7" name="Graphic 6" descr="Rocket">
+          <p:cNvPr id="4" name="Picture 3">
             <a:extLst>
               <a:ext uri="{FF2B5EF4-FFF2-40B4-BE49-F238E27FC236}">
-                <a16:creationId xmlns:a16="http://schemas.microsoft.com/office/drawing/2014/main" id="{2345638A-5A70-4DDF-A4A4-21E89C25DB8E}"/>
+                <a16:creationId xmlns:a16="http://schemas.microsoft.com/office/drawing/2014/main" id="{037B8C30-9B75-4ED1-B100-217EAF00584F}"/>
               </a:ext>
             </a:extLst>
           </p:cNvPr>
@@ -15113,9 +15361,6 @@
               <a:ext uri="{28A0092B-C50C-407E-A947-70E740481C1C}">
                 <a14:useLocalDpi xmlns:a14="http://schemas.microsoft.com/office/drawing/2010/main" val="0"/>
               </a:ext>
-              <a:ext uri="{96DAC541-7B7A-43D3-8B79-37D633B846F1}">
-                <asvg:svgBlip xmlns:asvg="http://schemas.microsoft.com/office/drawing/2016/SVG/main" r:embed="rId3"/>
-              </a:ext>
             </a:extLst>
           </a:blip>
           <a:stretch>
@@ -15124,215 +15369,32 @@
         </p:blipFill>
         <p:spPr>
           <a:xfrm>
-            <a:off x="9987775" y="4897243"/>
-            <a:ext cx="1832518" cy="1832518"/>
+            <a:off x="1723659" y="1592879"/>
+            <a:ext cx="7006786" cy="4579321"/>
           </a:xfrm>
           <a:prstGeom prst="rect">
             <a:avLst/>
           </a:prstGeom>
-        </p:spPr>
-      </p:pic>
-      <p:pic>
-        <p:nvPicPr>
-          <p:cNvPr id="2" name="Picture 1">
-            <a:extLst>
-              <a:ext uri="{FF2B5EF4-FFF2-40B4-BE49-F238E27FC236}">
-                <a16:creationId xmlns:a16="http://schemas.microsoft.com/office/drawing/2014/main" id="{B707F0C1-775E-4208-A6C9-2083B3D421B5}"/>
-              </a:ext>
-            </a:extLst>
-          </p:cNvPr>
-          <p:cNvPicPr>
-            <a:picLocks noChangeAspect="1"/>
-          </p:cNvPicPr>
-          <p:nvPr/>
-        </p:nvPicPr>
-        <p:blipFill rotWithShape="1">
-          <a:blip r:embed="rId4"/>
-          <a:srcRect l="3356" r="4979"/>
-          <a:stretch/>
-        </p:blipFill>
-        <p:spPr>
-          <a:xfrm>
-            <a:off x="6298098" y="1960757"/>
-            <a:ext cx="4724649" cy="3028419"/>
-          </a:xfrm>
-          <a:prstGeom prst="rect">
-            <a:avLst/>
-          </a:prstGeom>
-          <a:ln>
+          <a:ln w="38100" cap="sq">
             <a:solidFill>
-              <a:schemeClr val="tx2"/>
+              <a:srgbClr val="000000"/>
             </a:solidFill>
+            <a:prstDash val="solid"/>
+            <a:miter lim="800000"/>
           </a:ln>
           <a:effectLst>
             <a:outerShdw blurRad="50800" dist="38100" dir="2700000" algn="tl" rotWithShape="0">
-              <a:prstClr val="black">
-                <a:alpha val="40000"/>
-              </a:prstClr>
+              <a:srgbClr val="000000">
+                <a:alpha val="43000"/>
+              </a:srgbClr>
             </a:outerShdw>
           </a:effectLst>
         </p:spPr>
       </p:pic>
-      <p:sp>
-        <p:nvSpPr>
-          <p:cNvPr id="3" name="TextBox 2">
-            <a:extLst>
-              <a:ext uri="{FF2B5EF4-FFF2-40B4-BE49-F238E27FC236}">
-                <a16:creationId xmlns:a16="http://schemas.microsoft.com/office/drawing/2014/main" id="{5D3BF25A-6EFB-4B14-92F1-5D897A4AC159}"/>
-              </a:ext>
-            </a:extLst>
-          </p:cNvPr>
-          <p:cNvSpPr txBox="1"/>
-          <p:nvPr/>
-        </p:nvSpPr>
-        <p:spPr>
-          <a:xfrm>
-            <a:off x="6289565" y="1603658"/>
-            <a:ext cx="3362479" cy="338554"/>
-          </a:xfrm>
-          <a:prstGeom prst="rect">
-            <a:avLst/>
-          </a:prstGeom>
-          <a:noFill/>
-        </p:spPr>
-        <p:txBody>
-          <a:bodyPr wrap="square" rtlCol="0">
-            <a:spAutoFit/>
-          </a:bodyPr>
-          <a:lstStyle/>
-          <a:p>
-            <a:r>
-              <a:rPr lang="en-US" sz="1600" dirty="0"/>
-              <a:t>Day of the Week vs. Month</a:t>
-            </a:r>
-          </a:p>
-        </p:txBody>
-      </p:sp>
-      <p:pic>
-        <p:nvPicPr>
-          <p:cNvPr id="4" name="Picture 3">
-            <a:extLst>
-              <a:ext uri="{FF2B5EF4-FFF2-40B4-BE49-F238E27FC236}">
-                <a16:creationId xmlns:a16="http://schemas.microsoft.com/office/drawing/2014/main" id="{0B095A7C-DAFC-4F18-857D-6172CD7D5A11}"/>
-              </a:ext>
-            </a:extLst>
-          </p:cNvPr>
-          <p:cNvPicPr>
-            <a:picLocks noChangeAspect="1"/>
-          </p:cNvPicPr>
-          <p:nvPr/>
-        </p:nvPicPr>
-        <p:blipFill>
-          <a:blip r:embed="rId5"/>
-          <a:stretch>
-            <a:fillRect/>
-          </a:stretch>
-        </p:blipFill>
-        <p:spPr>
-          <a:xfrm>
-            <a:off x="1626831" y="1900158"/>
-            <a:ext cx="4267073" cy="3429679"/>
-          </a:xfrm>
-          <a:prstGeom prst="rect">
-            <a:avLst/>
-          </a:prstGeom>
-          <a:ln>
-            <a:solidFill>
-              <a:schemeClr val="tx2"/>
-            </a:solidFill>
-          </a:ln>
-          <a:effectLst>
-            <a:outerShdw blurRad="50800" dist="38100" dir="2700000" algn="tl" rotWithShape="0">
-              <a:prstClr val="black">
-                <a:alpha val="40000"/>
-              </a:prstClr>
-            </a:outerShdw>
-          </a:effectLst>
-        </p:spPr>
-      </p:pic>
-      <p:sp>
-        <p:nvSpPr>
-          <p:cNvPr id="5" name="TextBox 4">
-            <a:extLst>
-              <a:ext uri="{FF2B5EF4-FFF2-40B4-BE49-F238E27FC236}">
-                <a16:creationId xmlns:a16="http://schemas.microsoft.com/office/drawing/2014/main" id="{CD251D4B-2747-44C5-820F-CFDD74DCF907}"/>
-              </a:ext>
-            </a:extLst>
-          </p:cNvPr>
-          <p:cNvSpPr txBox="1"/>
-          <p:nvPr/>
-        </p:nvSpPr>
-        <p:spPr>
-          <a:xfrm>
-            <a:off x="1617405" y="1574672"/>
-            <a:ext cx="3362479" cy="338554"/>
-          </a:xfrm>
-          <a:prstGeom prst="rect">
-            <a:avLst/>
-          </a:prstGeom>
-          <a:noFill/>
-        </p:spPr>
-        <p:txBody>
-          <a:bodyPr wrap="square" rtlCol="0">
-            <a:spAutoFit/>
-          </a:bodyPr>
-          <a:lstStyle/>
-          <a:p>
-            <a:r>
-              <a:rPr lang="en-US" sz="1600" dirty="0"/>
-              <a:t>Hour vs. Day of the Week</a:t>
-            </a:r>
-          </a:p>
-        </p:txBody>
-      </p:sp>
-      <p:sp>
-        <p:nvSpPr>
-          <p:cNvPr id="6" name="TextBox 5">
-            <a:extLst>
-              <a:ext uri="{FF2B5EF4-FFF2-40B4-BE49-F238E27FC236}">
-                <a16:creationId xmlns:a16="http://schemas.microsoft.com/office/drawing/2014/main" id="{099D9FFB-88CD-445A-BF08-589858D83480}"/>
-              </a:ext>
-            </a:extLst>
-          </p:cNvPr>
-          <p:cNvSpPr txBox="1"/>
-          <p:nvPr/>
-        </p:nvSpPr>
-        <p:spPr>
-          <a:xfrm>
-            <a:off x="1359084" y="163477"/>
-            <a:ext cx="5846786" cy="584775"/>
-          </a:xfrm>
-          <a:prstGeom prst="rect">
-            <a:avLst/>
-          </a:prstGeom>
-          <a:noFill/>
-        </p:spPr>
-        <p:txBody>
-          <a:bodyPr wrap="square" rtlCol="0">
-            <a:spAutoFit/>
-          </a:bodyPr>
-          <a:lstStyle/>
-          <a:p>
-            <a:r>
-              <a:rPr lang="en-US" sz="3200" dirty="0"/>
-              <a:t>When Will I See</a:t>
-            </a:r>
-            <a:r>
-              <a:rPr lang="en-US" sz="2800" dirty="0"/>
-              <a:t> </a:t>
-            </a:r>
-            <a:r>
-              <a:rPr lang="en-US" sz="3200" dirty="0"/>
-              <a:t>a UFO (cont.) ?</a:t>
-            </a:r>
-            <a:endParaRPr lang="en-US" sz="2800" dirty="0"/>
-          </a:p>
-        </p:txBody>
-      </p:sp>
     </p:spTree>
     <p:extLst>
       <p:ext uri="{BB962C8B-B14F-4D97-AF65-F5344CB8AC3E}">
-        <p14:creationId xmlns:p14="http://schemas.microsoft.com/office/powerpoint/2010/main" val="931946553"/>
+        <p14:creationId xmlns:p14="http://schemas.microsoft.com/office/powerpoint/2010/main" val="1107746179"/>
       </p:ext>
     </p:extLst>
   </p:cSld>

</xml_diff>